<commit_message>
Añadidas imagenes del docx Desarrollado parte de perspectiva.
</commit_message>
<xml_diff>
--- a/Imagenes/imagenesGeneradas.pptx
+++ b/Imagenes/imagenesGeneradas.pptx
@@ -9,6 +9,7 @@
     <p:sldId id="257" r:id="rId3"/>
     <p:sldId id="258" r:id="rId4"/>
     <p:sldId id="259" r:id="rId5"/>
+    <p:sldId id="260" r:id="rId6"/>
   </p:sldIdLst>
   <p:sldSz cx="9144000" cy="6858000" type="screen4x3"/>
   <p:notesSz cx="6858000" cy="9144000"/>
@@ -291,7 +292,8 @@
           <a:p>
             <a:fld id="{D4B18A11-21C1-4B8F-B2BB-5EB1E0F497C6}" type="datetimeFigureOut">
               <a:rPr lang="en-US" smtClean="0"/>
-              <a:t>5/28/2010</a:t>
+              <a:pPr/>
+              <a:t>5/31/2010</a:t>
             </a:fld>
             <a:endParaRPr lang="en-US"/>
           </a:p>
@@ -333,6 +335,7 @@
           <a:p>
             <a:fld id="{B0BB0BB3-A537-45E4-8E0C-02DD8FBC3DF8}" type="slidenum">
               <a:rPr lang="en-US" smtClean="0"/>
+              <a:pPr/>
               <a:t>‹#›</a:t>
             </a:fld>
             <a:endParaRPr lang="en-US"/>
@@ -456,7 +459,8 @@
           <a:p>
             <a:fld id="{D4B18A11-21C1-4B8F-B2BB-5EB1E0F497C6}" type="datetimeFigureOut">
               <a:rPr lang="en-US" smtClean="0"/>
-              <a:t>5/28/2010</a:t>
+              <a:pPr/>
+              <a:t>5/31/2010</a:t>
             </a:fld>
             <a:endParaRPr lang="en-US"/>
           </a:p>
@@ -498,6 +502,7 @@
           <a:p>
             <a:fld id="{B0BB0BB3-A537-45E4-8E0C-02DD8FBC3DF8}" type="slidenum">
               <a:rPr lang="en-US" smtClean="0"/>
+              <a:pPr/>
               <a:t>‹#›</a:t>
             </a:fld>
             <a:endParaRPr lang="en-US"/>
@@ -631,7 +636,8 @@
           <a:p>
             <a:fld id="{D4B18A11-21C1-4B8F-B2BB-5EB1E0F497C6}" type="datetimeFigureOut">
               <a:rPr lang="en-US" smtClean="0"/>
-              <a:t>5/28/2010</a:t>
+              <a:pPr/>
+              <a:t>5/31/2010</a:t>
             </a:fld>
             <a:endParaRPr lang="en-US"/>
           </a:p>
@@ -673,6 +679,7 @@
           <a:p>
             <a:fld id="{B0BB0BB3-A537-45E4-8E0C-02DD8FBC3DF8}" type="slidenum">
               <a:rPr lang="en-US" smtClean="0"/>
+              <a:pPr/>
               <a:t>‹#›</a:t>
             </a:fld>
             <a:endParaRPr lang="en-US"/>
@@ -796,7 +803,8 @@
           <a:p>
             <a:fld id="{D4B18A11-21C1-4B8F-B2BB-5EB1E0F497C6}" type="datetimeFigureOut">
               <a:rPr lang="en-US" smtClean="0"/>
-              <a:t>5/28/2010</a:t>
+              <a:pPr/>
+              <a:t>5/31/2010</a:t>
             </a:fld>
             <a:endParaRPr lang="en-US"/>
           </a:p>
@@ -838,6 +846,7 @@
           <a:p>
             <a:fld id="{B0BB0BB3-A537-45E4-8E0C-02DD8FBC3DF8}" type="slidenum">
               <a:rPr lang="en-US" smtClean="0"/>
+              <a:pPr/>
               <a:t>‹#›</a:t>
             </a:fld>
             <a:endParaRPr lang="en-US"/>
@@ -1037,7 +1046,8 @@
           <a:p>
             <a:fld id="{D4B18A11-21C1-4B8F-B2BB-5EB1E0F497C6}" type="datetimeFigureOut">
               <a:rPr lang="en-US" smtClean="0"/>
-              <a:t>5/28/2010</a:t>
+              <a:pPr/>
+              <a:t>5/31/2010</a:t>
             </a:fld>
             <a:endParaRPr lang="en-US"/>
           </a:p>
@@ -1079,6 +1089,7 @@
           <a:p>
             <a:fld id="{B0BB0BB3-A537-45E4-8E0C-02DD8FBC3DF8}" type="slidenum">
               <a:rPr lang="en-US" smtClean="0"/>
+              <a:pPr/>
               <a:t>‹#›</a:t>
             </a:fld>
             <a:endParaRPr lang="en-US"/>
@@ -1320,7 +1331,8 @@
           <a:p>
             <a:fld id="{D4B18A11-21C1-4B8F-B2BB-5EB1E0F497C6}" type="datetimeFigureOut">
               <a:rPr lang="en-US" smtClean="0"/>
-              <a:t>5/28/2010</a:t>
+              <a:pPr/>
+              <a:t>5/31/2010</a:t>
             </a:fld>
             <a:endParaRPr lang="en-US"/>
           </a:p>
@@ -1362,6 +1374,7 @@
           <a:p>
             <a:fld id="{B0BB0BB3-A537-45E4-8E0C-02DD8FBC3DF8}" type="slidenum">
               <a:rPr lang="en-US" smtClean="0"/>
+              <a:pPr/>
               <a:t>‹#›</a:t>
             </a:fld>
             <a:endParaRPr lang="en-US"/>
@@ -1737,7 +1750,8 @@
           <a:p>
             <a:fld id="{D4B18A11-21C1-4B8F-B2BB-5EB1E0F497C6}" type="datetimeFigureOut">
               <a:rPr lang="en-US" smtClean="0"/>
-              <a:t>5/28/2010</a:t>
+              <a:pPr/>
+              <a:t>5/31/2010</a:t>
             </a:fld>
             <a:endParaRPr lang="en-US"/>
           </a:p>
@@ -1779,6 +1793,7 @@
           <a:p>
             <a:fld id="{B0BB0BB3-A537-45E4-8E0C-02DD8FBC3DF8}" type="slidenum">
               <a:rPr lang="en-US" smtClean="0"/>
+              <a:pPr/>
               <a:t>‹#›</a:t>
             </a:fld>
             <a:endParaRPr lang="en-US"/>
@@ -1850,7 +1865,8 @@
           <a:p>
             <a:fld id="{D4B18A11-21C1-4B8F-B2BB-5EB1E0F497C6}" type="datetimeFigureOut">
               <a:rPr lang="en-US" smtClean="0"/>
-              <a:t>5/28/2010</a:t>
+              <a:pPr/>
+              <a:t>5/31/2010</a:t>
             </a:fld>
             <a:endParaRPr lang="en-US"/>
           </a:p>
@@ -1892,6 +1908,7 @@
           <a:p>
             <a:fld id="{B0BB0BB3-A537-45E4-8E0C-02DD8FBC3DF8}" type="slidenum">
               <a:rPr lang="en-US" smtClean="0"/>
+              <a:pPr/>
               <a:t>‹#›</a:t>
             </a:fld>
             <a:endParaRPr lang="en-US"/>
@@ -1940,7 +1957,8 @@
           <a:p>
             <a:fld id="{D4B18A11-21C1-4B8F-B2BB-5EB1E0F497C6}" type="datetimeFigureOut">
               <a:rPr lang="en-US" smtClean="0"/>
-              <a:t>5/28/2010</a:t>
+              <a:pPr/>
+              <a:t>5/31/2010</a:t>
             </a:fld>
             <a:endParaRPr lang="en-US"/>
           </a:p>
@@ -1982,6 +2000,7 @@
           <a:p>
             <a:fld id="{B0BB0BB3-A537-45E4-8E0C-02DD8FBC3DF8}" type="slidenum">
               <a:rPr lang="en-US" smtClean="0"/>
+              <a:pPr/>
               <a:t>‹#›</a:t>
             </a:fld>
             <a:endParaRPr lang="en-US"/>
@@ -2212,7 +2231,8 @@
           <a:p>
             <a:fld id="{D4B18A11-21C1-4B8F-B2BB-5EB1E0F497C6}" type="datetimeFigureOut">
               <a:rPr lang="en-US" smtClean="0"/>
-              <a:t>5/28/2010</a:t>
+              <a:pPr/>
+              <a:t>5/31/2010</a:t>
             </a:fld>
             <a:endParaRPr lang="en-US"/>
           </a:p>
@@ -2254,6 +2274,7 @@
           <a:p>
             <a:fld id="{B0BB0BB3-A537-45E4-8E0C-02DD8FBC3DF8}" type="slidenum">
               <a:rPr lang="en-US" smtClean="0"/>
+              <a:pPr/>
               <a:t>‹#›</a:t>
             </a:fld>
             <a:endParaRPr lang="en-US"/>
@@ -2460,7 +2481,8 @@
           <a:p>
             <a:fld id="{D4B18A11-21C1-4B8F-B2BB-5EB1E0F497C6}" type="datetimeFigureOut">
               <a:rPr lang="en-US" smtClean="0"/>
-              <a:t>5/28/2010</a:t>
+              <a:pPr/>
+              <a:t>5/31/2010</a:t>
             </a:fld>
             <a:endParaRPr lang="en-US"/>
           </a:p>
@@ -2502,6 +2524,7 @@
           <a:p>
             <a:fld id="{B0BB0BB3-A537-45E4-8E0C-02DD8FBC3DF8}" type="slidenum">
               <a:rPr lang="en-US" smtClean="0"/>
+              <a:pPr/>
               <a:t>‹#›</a:t>
             </a:fld>
             <a:endParaRPr lang="en-US"/>
@@ -2668,7 +2691,8 @@
           <a:p>
             <a:fld id="{D4B18A11-21C1-4B8F-B2BB-5EB1E0F497C6}" type="datetimeFigureOut">
               <a:rPr lang="en-US" smtClean="0"/>
-              <a:t>5/28/2010</a:t>
+              <a:pPr/>
+              <a:t>5/31/2010</a:t>
             </a:fld>
             <a:endParaRPr lang="en-US"/>
           </a:p>
@@ -2746,6 +2770,7 @@
           <a:p>
             <a:fld id="{B0BB0BB3-A537-45E4-8E0C-02DD8FBC3DF8}" type="slidenum">
               <a:rPr lang="en-US" smtClean="0"/>
+              <a:pPr/>
               <a:t>‹#›</a:t>
             </a:fld>
             <a:endParaRPr lang="en-US"/>
@@ -5375,6 +5400,960 @@
 </p:sld>
 </file>
 
+<file path=ppt/slides/slide5.xml><?xml version="1.0" encoding="utf-8"?>
+<p:sld xmlns:a="http://schemas.openxmlformats.org/drawingml/2006/main" xmlns:r="http://schemas.openxmlformats.org/officeDocument/2006/relationships" xmlns:p="http://schemas.openxmlformats.org/presentationml/2006/main">
+  <p:cSld>
+    <p:spTree>
+      <p:nvGrpSpPr>
+        <p:cNvPr id="1" name=""/>
+        <p:cNvGrpSpPr/>
+        <p:nvPr/>
+      </p:nvGrpSpPr>
+      <p:grpSpPr>
+        <a:xfrm>
+          <a:off x="0" y="0"/>
+          <a:ext cx="0" cy="0"/>
+          <a:chOff x="0" y="0"/>
+          <a:chExt cx="0" cy="0"/>
+        </a:xfrm>
+      </p:grpSpPr>
+      <p:grpSp>
+        <p:nvGrpSpPr>
+          <p:cNvPr id="7" name="Group 6"/>
+          <p:cNvGrpSpPr/>
+          <p:nvPr/>
+        </p:nvGrpSpPr>
+        <p:grpSpPr>
+          <a:xfrm>
+            <a:off x="785786" y="1643050"/>
+            <a:ext cx="2872034" cy="3199064"/>
+            <a:chOff x="1414214" y="801440"/>
+            <a:chExt cx="4143404" cy="4214842"/>
+          </a:xfrm>
+        </p:grpSpPr>
+        <p:sp>
+          <p:nvSpPr>
+            <p:cNvPr id="6" name="Isosceles Triangle 5"/>
+            <p:cNvSpPr/>
+            <p:nvPr/>
+          </p:nvSpPr>
+          <p:spPr>
+            <a:xfrm rot="10800000">
+              <a:off x="1414214" y="801440"/>
+              <a:ext cx="4143404" cy="4214842"/>
+            </a:xfrm>
+            <a:prstGeom prst="triangle">
+              <a:avLst/>
+            </a:prstGeom>
+            <a:noFill/>
+          </p:spPr>
+          <p:style>
+            <a:lnRef idx="2">
+              <a:schemeClr val="accent1">
+                <a:shade val="50000"/>
+              </a:schemeClr>
+            </a:lnRef>
+            <a:fillRef idx="1">
+              <a:schemeClr val="accent1"/>
+            </a:fillRef>
+            <a:effectRef idx="0">
+              <a:schemeClr val="accent1"/>
+            </a:effectRef>
+            <a:fontRef idx="minor">
+              <a:schemeClr val="lt1"/>
+            </a:fontRef>
+          </p:style>
+          <p:txBody>
+            <a:bodyPr rtlCol="0" anchor="ctr"/>
+            <a:lstStyle/>
+            <a:p>
+              <a:pPr algn="ctr"/>
+              <a:endParaRPr lang="en-US"/>
+            </a:p>
+          </p:txBody>
+        </p:sp>
+        <p:cxnSp>
+          <p:nvCxnSpPr>
+            <p:cNvPr id="3" name="Straight Connector 2"/>
+            <p:cNvCxnSpPr/>
+            <p:nvPr/>
+          </p:nvCxnSpPr>
+          <p:spPr>
+            <a:xfrm>
+              <a:off x="2214546" y="2500306"/>
+              <a:ext cx="2500330" cy="0"/>
+            </a:xfrm>
+            <a:prstGeom prst="line">
+              <a:avLst/>
+            </a:prstGeom>
+            <a:ln>
+              <a:solidFill>
+                <a:srgbClr val="FF0000"/>
+              </a:solidFill>
+            </a:ln>
+          </p:spPr>
+          <p:style>
+            <a:lnRef idx="1">
+              <a:schemeClr val="accent1"/>
+            </a:lnRef>
+            <a:fillRef idx="0">
+              <a:schemeClr val="accent1"/>
+            </a:fillRef>
+            <a:effectRef idx="0">
+              <a:schemeClr val="accent1"/>
+            </a:effectRef>
+            <a:fontRef idx="minor">
+              <a:schemeClr val="tx1"/>
+            </a:fontRef>
+          </p:style>
+        </p:cxnSp>
+      </p:grpSp>
+      <p:sp>
+        <p:nvSpPr>
+          <p:cNvPr id="9" name="Isosceles Triangle 8"/>
+          <p:cNvSpPr/>
+          <p:nvPr/>
+        </p:nvSpPr>
+        <p:spPr>
+          <a:xfrm rot="10800000">
+            <a:off x="5429256" y="1643050"/>
+            <a:ext cx="2872034" cy="3199064"/>
+          </a:xfrm>
+          <a:prstGeom prst="triangle">
+            <a:avLst>
+              <a:gd name="adj" fmla="val 90429"/>
+            </a:avLst>
+          </a:prstGeom>
+          <a:noFill/>
+        </p:spPr>
+        <p:style>
+          <a:lnRef idx="2">
+            <a:schemeClr val="accent1">
+              <a:shade val="50000"/>
+            </a:schemeClr>
+          </a:lnRef>
+          <a:fillRef idx="1">
+            <a:schemeClr val="accent1"/>
+          </a:fillRef>
+          <a:effectRef idx="0">
+            <a:schemeClr val="accent1"/>
+          </a:effectRef>
+          <a:fontRef idx="minor">
+            <a:schemeClr val="lt1"/>
+          </a:fontRef>
+        </p:style>
+        <p:txBody>
+          <a:bodyPr rtlCol="0" anchor="ctr"/>
+          <a:lstStyle/>
+          <a:p>
+            <a:pPr algn="ctr"/>
+            <a:endParaRPr lang="en-US"/>
+          </a:p>
+        </p:txBody>
+      </p:sp>
+      <p:cxnSp>
+        <p:nvCxnSpPr>
+          <p:cNvPr id="10" name="Straight Connector 9"/>
+          <p:cNvCxnSpPr/>
+          <p:nvPr/>
+        </p:nvCxnSpPr>
+        <p:spPr>
+          <a:xfrm>
+            <a:off x="5555385" y="2932489"/>
+            <a:ext cx="1733124" cy="0"/>
+          </a:xfrm>
+          <a:prstGeom prst="line">
+            <a:avLst/>
+          </a:prstGeom>
+          <a:ln>
+            <a:solidFill>
+              <a:srgbClr val="FF0000"/>
+            </a:solidFill>
+          </a:ln>
+        </p:spPr>
+        <p:style>
+          <a:lnRef idx="1">
+            <a:schemeClr val="accent1"/>
+          </a:lnRef>
+          <a:fillRef idx="0">
+            <a:schemeClr val="accent1"/>
+          </a:fillRef>
+          <a:effectRef idx="0">
+            <a:schemeClr val="accent1"/>
+          </a:effectRef>
+          <a:fontRef idx="minor">
+            <a:schemeClr val="tx1"/>
+          </a:fontRef>
+        </p:style>
+      </p:cxnSp>
+      <p:sp>
+        <p:nvSpPr>
+          <p:cNvPr id="11" name="Multiply 10"/>
+          <p:cNvSpPr/>
+          <p:nvPr/>
+        </p:nvSpPr>
+        <p:spPr>
+          <a:xfrm>
+            <a:off x="714348" y="1357298"/>
+            <a:ext cx="500066" cy="500066"/>
+          </a:xfrm>
+          <a:prstGeom prst="mathMultiply">
+            <a:avLst/>
+          </a:prstGeom>
+        </p:spPr>
+        <p:style>
+          <a:lnRef idx="2">
+            <a:schemeClr val="accent6"/>
+          </a:lnRef>
+          <a:fillRef idx="1">
+            <a:schemeClr val="lt1"/>
+          </a:fillRef>
+          <a:effectRef idx="0">
+            <a:schemeClr val="accent6"/>
+          </a:effectRef>
+          <a:fontRef idx="minor">
+            <a:schemeClr val="dk1"/>
+          </a:fontRef>
+        </p:style>
+        <p:txBody>
+          <a:bodyPr rtlCol="0" anchor="ctr"/>
+          <a:lstStyle/>
+          <a:p>
+            <a:pPr algn="ctr"/>
+            <a:endParaRPr lang="en-US"/>
+          </a:p>
+        </p:txBody>
+      </p:sp>
+      <p:sp>
+        <p:nvSpPr>
+          <p:cNvPr id="12" name="Multiply 11"/>
+          <p:cNvSpPr/>
+          <p:nvPr/>
+        </p:nvSpPr>
+        <p:spPr>
+          <a:xfrm>
+            <a:off x="1071538" y="1357298"/>
+            <a:ext cx="500066" cy="500066"/>
+          </a:xfrm>
+          <a:prstGeom prst="mathMultiply">
+            <a:avLst/>
+          </a:prstGeom>
+        </p:spPr>
+        <p:style>
+          <a:lnRef idx="2">
+            <a:schemeClr val="accent6"/>
+          </a:lnRef>
+          <a:fillRef idx="1">
+            <a:schemeClr val="lt1"/>
+          </a:fillRef>
+          <a:effectRef idx="0">
+            <a:schemeClr val="accent6"/>
+          </a:effectRef>
+          <a:fontRef idx="minor">
+            <a:schemeClr val="dk1"/>
+          </a:fontRef>
+        </p:style>
+        <p:txBody>
+          <a:bodyPr rtlCol="0" anchor="ctr"/>
+          <a:lstStyle/>
+          <a:p>
+            <a:pPr algn="ctr"/>
+            <a:endParaRPr lang="en-US"/>
+          </a:p>
+        </p:txBody>
+      </p:sp>
+      <p:sp>
+        <p:nvSpPr>
+          <p:cNvPr id="13" name="Multiply 12"/>
+          <p:cNvSpPr/>
+          <p:nvPr/>
+        </p:nvSpPr>
+        <p:spPr>
+          <a:xfrm>
+            <a:off x="1428728" y="1357298"/>
+            <a:ext cx="500066" cy="500066"/>
+          </a:xfrm>
+          <a:prstGeom prst="mathMultiply">
+            <a:avLst/>
+          </a:prstGeom>
+        </p:spPr>
+        <p:style>
+          <a:lnRef idx="2">
+            <a:schemeClr val="accent6"/>
+          </a:lnRef>
+          <a:fillRef idx="1">
+            <a:schemeClr val="lt1"/>
+          </a:fillRef>
+          <a:effectRef idx="0">
+            <a:schemeClr val="accent6"/>
+          </a:effectRef>
+          <a:fontRef idx="minor">
+            <a:schemeClr val="dk1"/>
+          </a:fontRef>
+        </p:style>
+        <p:txBody>
+          <a:bodyPr rtlCol="0" anchor="ctr"/>
+          <a:lstStyle/>
+          <a:p>
+            <a:pPr algn="ctr"/>
+            <a:endParaRPr lang="en-US"/>
+          </a:p>
+        </p:txBody>
+      </p:sp>
+      <p:sp>
+        <p:nvSpPr>
+          <p:cNvPr id="14" name="Multiply 13"/>
+          <p:cNvSpPr/>
+          <p:nvPr/>
+        </p:nvSpPr>
+        <p:spPr>
+          <a:xfrm>
+            <a:off x="1785918" y="1357298"/>
+            <a:ext cx="500066" cy="500066"/>
+          </a:xfrm>
+          <a:prstGeom prst="mathMultiply">
+            <a:avLst/>
+          </a:prstGeom>
+        </p:spPr>
+        <p:style>
+          <a:lnRef idx="2">
+            <a:schemeClr val="accent6"/>
+          </a:lnRef>
+          <a:fillRef idx="1">
+            <a:schemeClr val="lt1"/>
+          </a:fillRef>
+          <a:effectRef idx="0">
+            <a:schemeClr val="accent6"/>
+          </a:effectRef>
+          <a:fontRef idx="minor">
+            <a:schemeClr val="dk1"/>
+          </a:fontRef>
+        </p:style>
+        <p:txBody>
+          <a:bodyPr rtlCol="0" anchor="ctr"/>
+          <a:lstStyle/>
+          <a:p>
+            <a:pPr algn="ctr"/>
+            <a:endParaRPr lang="en-US"/>
+          </a:p>
+        </p:txBody>
+      </p:sp>
+      <p:sp>
+        <p:nvSpPr>
+          <p:cNvPr id="15" name="Multiply 14"/>
+          <p:cNvSpPr/>
+          <p:nvPr/>
+        </p:nvSpPr>
+        <p:spPr>
+          <a:xfrm>
+            <a:off x="2143108" y="1357298"/>
+            <a:ext cx="500066" cy="500066"/>
+          </a:xfrm>
+          <a:prstGeom prst="mathMultiply">
+            <a:avLst/>
+          </a:prstGeom>
+        </p:spPr>
+        <p:style>
+          <a:lnRef idx="2">
+            <a:schemeClr val="accent6"/>
+          </a:lnRef>
+          <a:fillRef idx="1">
+            <a:schemeClr val="lt1"/>
+          </a:fillRef>
+          <a:effectRef idx="0">
+            <a:schemeClr val="accent6"/>
+          </a:effectRef>
+          <a:fontRef idx="minor">
+            <a:schemeClr val="dk1"/>
+          </a:fontRef>
+        </p:style>
+        <p:txBody>
+          <a:bodyPr rtlCol="0" anchor="ctr"/>
+          <a:lstStyle/>
+          <a:p>
+            <a:pPr algn="ctr"/>
+            <a:endParaRPr lang="en-US"/>
+          </a:p>
+        </p:txBody>
+      </p:sp>
+      <p:sp>
+        <p:nvSpPr>
+          <p:cNvPr id="16" name="Multiply 15"/>
+          <p:cNvSpPr/>
+          <p:nvPr/>
+        </p:nvSpPr>
+        <p:spPr>
+          <a:xfrm>
+            <a:off x="2500298" y="1357298"/>
+            <a:ext cx="500066" cy="500066"/>
+          </a:xfrm>
+          <a:prstGeom prst="mathMultiply">
+            <a:avLst/>
+          </a:prstGeom>
+        </p:spPr>
+        <p:style>
+          <a:lnRef idx="2">
+            <a:schemeClr val="accent6"/>
+          </a:lnRef>
+          <a:fillRef idx="1">
+            <a:schemeClr val="lt1"/>
+          </a:fillRef>
+          <a:effectRef idx="0">
+            <a:schemeClr val="accent6"/>
+          </a:effectRef>
+          <a:fontRef idx="minor">
+            <a:schemeClr val="dk1"/>
+          </a:fontRef>
+        </p:style>
+        <p:txBody>
+          <a:bodyPr rtlCol="0" anchor="ctr"/>
+          <a:lstStyle/>
+          <a:p>
+            <a:pPr algn="ctr"/>
+            <a:endParaRPr lang="en-US"/>
+          </a:p>
+        </p:txBody>
+      </p:sp>
+      <p:sp>
+        <p:nvSpPr>
+          <p:cNvPr id="17" name="Multiply 16"/>
+          <p:cNvSpPr/>
+          <p:nvPr/>
+        </p:nvSpPr>
+        <p:spPr>
+          <a:xfrm>
+            <a:off x="2857488" y="1357298"/>
+            <a:ext cx="500066" cy="500066"/>
+          </a:xfrm>
+          <a:prstGeom prst="mathMultiply">
+            <a:avLst/>
+          </a:prstGeom>
+        </p:spPr>
+        <p:style>
+          <a:lnRef idx="2">
+            <a:schemeClr val="accent6"/>
+          </a:lnRef>
+          <a:fillRef idx="1">
+            <a:schemeClr val="lt1"/>
+          </a:fillRef>
+          <a:effectRef idx="0">
+            <a:schemeClr val="accent6"/>
+          </a:effectRef>
+          <a:fontRef idx="minor">
+            <a:schemeClr val="dk1"/>
+          </a:fontRef>
+        </p:style>
+        <p:txBody>
+          <a:bodyPr rtlCol="0" anchor="ctr"/>
+          <a:lstStyle/>
+          <a:p>
+            <a:pPr algn="ctr"/>
+            <a:endParaRPr lang="en-US"/>
+          </a:p>
+        </p:txBody>
+      </p:sp>
+      <p:sp>
+        <p:nvSpPr>
+          <p:cNvPr id="18" name="Multiply 17"/>
+          <p:cNvSpPr/>
+          <p:nvPr/>
+        </p:nvSpPr>
+        <p:spPr>
+          <a:xfrm>
+            <a:off x="3214678" y="1357298"/>
+            <a:ext cx="500066" cy="500066"/>
+          </a:xfrm>
+          <a:prstGeom prst="mathMultiply">
+            <a:avLst/>
+          </a:prstGeom>
+        </p:spPr>
+        <p:style>
+          <a:lnRef idx="2">
+            <a:schemeClr val="accent6"/>
+          </a:lnRef>
+          <a:fillRef idx="1">
+            <a:schemeClr val="lt1"/>
+          </a:fillRef>
+          <a:effectRef idx="0">
+            <a:schemeClr val="accent6"/>
+          </a:effectRef>
+          <a:fontRef idx="minor">
+            <a:schemeClr val="dk1"/>
+          </a:fontRef>
+        </p:style>
+        <p:txBody>
+          <a:bodyPr rtlCol="0" anchor="ctr"/>
+          <a:lstStyle/>
+          <a:p>
+            <a:pPr algn="ctr"/>
+            <a:endParaRPr lang="en-US"/>
+          </a:p>
+        </p:txBody>
+      </p:sp>
+      <p:sp>
+        <p:nvSpPr>
+          <p:cNvPr id="19" name="Multiply 18"/>
+          <p:cNvSpPr/>
+          <p:nvPr/>
+        </p:nvSpPr>
+        <p:spPr>
+          <a:xfrm>
+            <a:off x="3571868" y="1357298"/>
+            <a:ext cx="500066" cy="500066"/>
+          </a:xfrm>
+          <a:prstGeom prst="mathMultiply">
+            <a:avLst/>
+          </a:prstGeom>
+        </p:spPr>
+        <p:style>
+          <a:lnRef idx="2">
+            <a:schemeClr val="accent2"/>
+          </a:lnRef>
+          <a:fillRef idx="1">
+            <a:schemeClr val="lt1"/>
+          </a:fillRef>
+          <a:effectRef idx="0">
+            <a:schemeClr val="accent2"/>
+          </a:effectRef>
+          <a:fontRef idx="minor">
+            <a:schemeClr val="dk1"/>
+          </a:fontRef>
+        </p:style>
+        <p:txBody>
+          <a:bodyPr rtlCol="0" anchor="ctr"/>
+          <a:lstStyle/>
+          <a:p>
+            <a:pPr algn="ctr"/>
+            <a:endParaRPr lang="en-US"/>
+          </a:p>
+        </p:txBody>
+      </p:sp>
+      <p:sp>
+        <p:nvSpPr>
+          <p:cNvPr id="20" name="Multiply 19"/>
+          <p:cNvSpPr/>
+          <p:nvPr/>
+        </p:nvSpPr>
+        <p:spPr>
+          <a:xfrm>
+            <a:off x="357158" y="1357298"/>
+            <a:ext cx="500066" cy="500066"/>
+          </a:xfrm>
+          <a:prstGeom prst="mathMultiply">
+            <a:avLst/>
+          </a:prstGeom>
+        </p:spPr>
+        <p:style>
+          <a:lnRef idx="2">
+            <a:schemeClr val="accent2"/>
+          </a:lnRef>
+          <a:fillRef idx="1">
+            <a:schemeClr val="lt1"/>
+          </a:fillRef>
+          <a:effectRef idx="0">
+            <a:schemeClr val="accent2"/>
+          </a:effectRef>
+          <a:fontRef idx="minor">
+            <a:schemeClr val="dk1"/>
+          </a:fontRef>
+        </p:style>
+        <p:txBody>
+          <a:bodyPr rtlCol="0" anchor="ctr"/>
+          <a:lstStyle/>
+          <a:p>
+            <a:pPr algn="ctr"/>
+            <a:endParaRPr lang="en-US"/>
+          </a:p>
+        </p:txBody>
+      </p:sp>
+      <p:sp>
+        <p:nvSpPr>
+          <p:cNvPr id="21" name="Multiply 20"/>
+          <p:cNvSpPr/>
+          <p:nvPr/>
+        </p:nvSpPr>
+        <p:spPr>
+          <a:xfrm>
+            <a:off x="5072066" y="1357298"/>
+            <a:ext cx="500066" cy="500066"/>
+          </a:xfrm>
+          <a:prstGeom prst="mathMultiply">
+            <a:avLst/>
+          </a:prstGeom>
+        </p:spPr>
+        <p:style>
+          <a:lnRef idx="2">
+            <a:schemeClr val="accent6"/>
+          </a:lnRef>
+          <a:fillRef idx="1">
+            <a:schemeClr val="lt1"/>
+          </a:fillRef>
+          <a:effectRef idx="0">
+            <a:schemeClr val="accent6"/>
+          </a:effectRef>
+          <a:fontRef idx="minor">
+            <a:schemeClr val="dk1"/>
+          </a:fontRef>
+        </p:style>
+        <p:txBody>
+          <a:bodyPr rtlCol="0" anchor="ctr"/>
+          <a:lstStyle/>
+          <a:p>
+            <a:pPr algn="ctr"/>
+            <a:endParaRPr lang="en-US"/>
+          </a:p>
+        </p:txBody>
+      </p:sp>
+      <p:sp>
+        <p:nvSpPr>
+          <p:cNvPr id="22" name="Multiply 21"/>
+          <p:cNvSpPr/>
+          <p:nvPr/>
+        </p:nvSpPr>
+        <p:spPr>
+          <a:xfrm>
+            <a:off x="5429256" y="1357298"/>
+            <a:ext cx="500066" cy="500066"/>
+          </a:xfrm>
+          <a:prstGeom prst="mathMultiply">
+            <a:avLst/>
+          </a:prstGeom>
+        </p:spPr>
+        <p:style>
+          <a:lnRef idx="2">
+            <a:schemeClr val="accent6"/>
+          </a:lnRef>
+          <a:fillRef idx="1">
+            <a:schemeClr val="lt1"/>
+          </a:fillRef>
+          <a:effectRef idx="0">
+            <a:schemeClr val="accent6"/>
+          </a:effectRef>
+          <a:fontRef idx="minor">
+            <a:schemeClr val="dk1"/>
+          </a:fontRef>
+        </p:style>
+        <p:txBody>
+          <a:bodyPr rtlCol="0" anchor="ctr"/>
+          <a:lstStyle/>
+          <a:p>
+            <a:pPr algn="ctr"/>
+            <a:endParaRPr lang="en-US"/>
+          </a:p>
+        </p:txBody>
+      </p:sp>
+      <p:sp>
+        <p:nvSpPr>
+          <p:cNvPr id="23" name="Multiply 22"/>
+          <p:cNvSpPr/>
+          <p:nvPr/>
+        </p:nvSpPr>
+        <p:spPr>
+          <a:xfrm>
+            <a:off x="5786446" y="1357298"/>
+            <a:ext cx="500066" cy="500066"/>
+          </a:xfrm>
+          <a:prstGeom prst="mathMultiply">
+            <a:avLst/>
+          </a:prstGeom>
+        </p:spPr>
+        <p:style>
+          <a:lnRef idx="2">
+            <a:schemeClr val="accent6"/>
+          </a:lnRef>
+          <a:fillRef idx="1">
+            <a:schemeClr val="lt1"/>
+          </a:fillRef>
+          <a:effectRef idx="0">
+            <a:schemeClr val="accent6"/>
+          </a:effectRef>
+          <a:fontRef idx="minor">
+            <a:schemeClr val="dk1"/>
+          </a:fontRef>
+        </p:style>
+        <p:txBody>
+          <a:bodyPr rtlCol="0" anchor="ctr"/>
+          <a:lstStyle/>
+          <a:p>
+            <a:pPr algn="ctr"/>
+            <a:endParaRPr lang="en-US"/>
+          </a:p>
+        </p:txBody>
+      </p:sp>
+      <p:sp>
+        <p:nvSpPr>
+          <p:cNvPr id="24" name="Multiply 23"/>
+          <p:cNvSpPr/>
+          <p:nvPr/>
+        </p:nvSpPr>
+        <p:spPr>
+          <a:xfrm>
+            <a:off x="6143636" y="1357298"/>
+            <a:ext cx="500066" cy="500066"/>
+          </a:xfrm>
+          <a:prstGeom prst="mathMultiply">
+            <a:avLst/>
+          </a:prstGeom>
+        </p:spPr>
+        <p:style>
+          <a:lnRef idx="2">
+            <a:schemeClr val="accent6"/>
+          </a:lnRef>
+          <a:fillRef idx="1">
+            <a:schemeClr val="lt1"/>
+          </a:fillRef>
+          <a:effectRef idx="0">
+            <a:schemeClr val="accent6"/>
+          </a:effectRef>
+          <a:fontRef idx="minor">
+            <a:schemeClr val="dk1"/>
+          </a:fontRef>
+        </p:style>
+        <p:txBody>
+          <a:bodyPr rtlCol="0" anchor="ctr"/>
+          <a:lstStyle/>
+          <a:p>
+            <a:pPr algn="ctr"/>
+            <a:endParaRPr lang="en-US"/>
+          </a:p>
+        </p:txBody>
+      </p:sp>
+      <p:sp>
+        <p:nvSpPr>
+          <p:cNvPr id="25" name="Multiply 24"/>
+          <p:cNvSpPr/>
+          <p:nvPr/>
+        </p:nvSpPr>
+        <p:spPr>
+          <a:xfrm>
+            <a:off x="6500826" y="1357298"/>
+            <a:ext cx="500066" cy="500066"/>
+          </a:xfrm>
+          <a:prstGeom prst="mathMultiply">
+            <a:avLst/>
+          </a:prstGeom>
+        </p:spPr>
+        <p:style>
+          <a:lnRef idx="2">
+            <a:schemeClr val="accent6"/>
+          </a:lnRef>
+          <a:fillRef idx="1">
+            <a:schemeClr val="lt1"/>
+          </a:fillRef>
+          <a:effectRef idx="0">
+            <a:schemeClr val="accent6"/>
+          </a:effectRef>
+          <a:fontRef idx="minor">
+            <a:schemeClr val="dk1"/>
+          </a:fontRef>
+        </p:style>
+        <p:txBody>
+          <a:bodyPr rtlCol="0" anchor="ctr"/>
+          <a:lstStyle/>
+          <a:p>
+            <a:pPr algn="ctr"/>
+            <a:endParaRPr lang="en-US"/>
+          </a:p>
+        </p:txBody>
+      </p:sp>
+      <p:sp>
+        <p:nvSpPr>
+          <p:cNvPr id="26" name="Multiply 25"/>
+          <p:cNvSpPr/>
+          <p:nvPr/>
+        </p:nvSpPr>
+        <p:spPr>
+          <a:xfrm>
+            <a:off x="6858016" y="1357298"/>
+            <a:ext cx="500066" cy="500066"/>
+          </a:xfrm>
+          <a:prstGeom prst="mathMultiply">
+            <a:avLst/>
+          </a:prstGeom>
+        </p:spPr>
+        <p:style>
+          <a:lnRef idx="2">
+            <a:schemeClr val="accent6"/>
+          </a:lnRef>
+          <a:fillRef idx="1">
+            <a:schemeClr val="lt1"/>
+          </a:fillRef>
+          <a:effectRef idx="0">
+            <a:schemeClr val="accent6"/>
+          </a:effectRef>
+          <a:fontRef idx="minor">
+            <a:schemeClr val="dk1"/>
+          </a:fontRef>
+        </p:style>
+        <p:txBody>
+          <a:bodyPr rtlCol="0" anchor="ctr"/>
+          <a:lstStyle/>
+          <a:p>
+            <a:pPr algn="ctr"/>
+            <a:endParaRPr lang="en-US"/>
+          </a:p>
+        </p:txBody>
+      </p:sp>
+      <p:sp>
+        <p:nvSpPr>
+          <p:cNvPr id="27" name="Multiply 26"/>
+          <p:cNvSpPr/>
+          <p:nvPr/>
+        </p:nvSpPr>
+        <p:spPr>
+          <a:xfrm>
+            <a:off x="7215206" y="1357298"/>
+            <a:ext cx="500066" cy="500066"/>
+          </a:xfrm>
+          <a:prstGeom prst="mathMultiply">
+            <a:avLst/>
+          </a:prstGeom>
+        </p:spPr>
+        <p:style>
+          <a:lnRef idx="2">
+            <a:schemeClr val="accent6"/>
+          </a:lnRef>
+          <a:fillRef idx="1">
+            <a:schemeClr val="lt1"/>
+          </a:fillRef>
+          <a:effectRef idx="0">
+            <a:schemeClr val="accent6"/>
+          </a:effectRef>
+          <a:fontRef idx="minor">
+            <a:schemeClr val="dk1"/>
+          </a:fontRef>
+        </p:style>
+        <p:txBody>
+          <a:bodyPr rtlCol="0" anchor="ctr"/>
+          <a:lstStyle/>
+          <a:p>
+            <a:pPr algn="ctr"/>
+            <a:endParaRPr lang="en-US"/>
+          </a:p>
+        </p:txBody>
+      </p:sp>
+      <p:sp>
+        <p:nvSpPr>
+          <p:cNvPr id="28" name="Multiply 27"/>
+          <p:cNvSpPr/>
+          <p:nvPr/>
+        </p:nvSpPr>
+        <p:spPr>
+          <a:xfrm>
+            <a:off x="7572396" y="1357298"/>
+            <a:ext cx="500066" cy="500066"/>
+          </a:xfrm>
+          <a:prstGeom prst="mathMultiply">
+            <a:avLst/>
+          </a:prstGeom>
+        </p:spPr>
+        <p:style>
+          <a:lnRef idx="2">
+            <a:schemeClr val="accent6"/>
+          </a:lnRef>
+          <a:fillRef idx="1">
+            <a:schemeClr val="lt1"/>
+          </a:fillRef>
+          <a:effectRef idx="0">
+            <a:schemeClr val="accent6"/>
+          </a:effectRef>
+          <a:fontRef idx="minor">
+            <a:schemeClr val="dk1"/>
+          </a:fontRef>
+        </p:style>
+        <p:txBody>
+          <a:bodyPr rtlCol="0" anchor="ctr"/>
+          <a:lstStyle/>
+          <a:p>
+            <a:pPr algn="ctr"/>
+            <a:endParaRPr lang="en-US"/>
+          </a:p>
+        </p:txBody>
+      </p:sp>
+      <p:sp>
+        <p:nvSpPr>
+          <p:cNvPr id="29" name="Multiply 28"/>
+          <p:cNvSpPr/>
+          <p:nvPr/>
+        </p:nvSpPr>
+        <p:spPr>
+          <a:xfrm>
+            <a:off x="7929586" y="1357298"/>
+            <a:ext cx="500066" cy="500066"/>
+          </a:xfrm>
+          <a:prstGeom prst="mathMultiply">
+            <a:avLst/>
+          </a:prstGeom>
+        </p:spPr>
+        <p:style>
+          <a:lnRef idx="2">
+            <a:schemeClr val="accent2"/>
+          </a:lnRef>
+          <a:fillRef idx="1">
+            <a:schemeClr val="lt1"/>
+          </a:fillRef>
+          <a:effectRef idx="0">
+            <a:schemeClr val="accent2"/>
+          </a:effectRef>
+          <a:fontRef idx="minor">
+            <a:schemeClr val="dk1"/>
+          </a:fontRef>
+        </p:style>
+        <p:txBody>
+          <a:bodyPr rtlCol="0" anchor="ctr"/>
+          <a:lstStyle/>
+          <a:p>
+            <a:pPr algn="ctr"/>
+            <a:endParaRPr lang="en-US"/>
+          </a:p>
+        </p:txBody>
+      </p:sp>
+      <p:sp>
+        <p:nvSpPr>
+          <p:cNvPr id="30" name="Multiply 29"/>
+          <p:cNvSpPr/>
+          <p:nvPr/>
+        </p:nvSpPr>
+        <p:spPr>
+          <a:xfrm>
+            <a:off x="4714876" y="1357298"/>
+            <a:ext cx="500066" cy="500066"/>
+          </a:xfrm>
+          <a:prstGeom prst="mathMultiply">
+            <a:avLst/>
+          </a:prstGeom>
+        </p:spPr>
+        <p:style>
+          <a:lnRef idx="2">
+            <a:schemeClr val="accent2"/>
+          </a:lnRef>
+          <a:fillRef idx="1">
+            <a:schemeClr val="lt1"/>
+          </a:fillRef>
+          <a:effectRef idx="0">
+            <a:schemeClr val="accent2"/>
+          </a:effectRef>
+          <a:fontRef idx="minor">
+            <a:schemeClr val="dk1"/>
+          </a:fontRef>
+        </p:style>
+        <p:txBody>
+          <a:bodyPr rtlCol="0" anchor="ctr"/>
+          <a:lstStyle/>
+          <a:p>
+            <a:pPr algn="ctr"/>
+            <a:endParaRPr lang="en-US"/>
+          </a:p>
+        </p:txBody>
+      </p:sp>
+    </p:spTree>
+  </p:cSld>
+  <p:clrMapOvr>
+    <a:masterClrMapping/>
+  </p:clrMapOvr>
+</p:sld>
+</file>
+
 <file path=ppt/theme/theme1.xml><?xml version="1.0" encoding="utf-8"?>
 <a:theme xmlns:a="http://schemas.openxmlformats.org/drawingml/2006/main" name="Office Theme">
   <a:themeElements>

</xml_diff>

<commit_message>
Desarrolladas varias partes. Cambiada la versión de lyx a la 1.6.6.1. se le ha pasado el corrector de ortografía
</commit_message>
<xml_diff>
--- a/Imagenes/imagenesGeneradas.pptx
+++ b/Imagenes/imagenesGeneradas.pptx
@@ -10,6 +10,8 @@
     <p:sldId id="258" r:id="rId4"/>
     <p:sldId id="259" r:id="rId5"/>
     <p:sldId id="260" r:id="rId6"/>
+    <p:sldId id="261" r:id="rId7"/>
+    <p:sldId id="262" r:id="rId8"/>
   </p:sldIdLst>
   <p:sldSz cx="9144000" cy="6858000" type="screen4x3"/>
   <p:notesSz cx="6858000" cy="9144000"/>
@@ -293,7 +295,7 @@
             <a:fld id="{D4B18A11-21C1-4B8F-B2BB-5EB1E0F497C6}" type="datetimeFigureOut">
               <a:rPr lang="en-US" smtClean="0"/>
               <a:pPr/>
-              <a:t>5/31/2010</a:t>
+              <a:t>6/1/2010</a:t>
             </a:fld>
             <a:endParaRPr lang="en-US"/>
           </a:p>
@@ -460,7 +462,7 @@
             <a:fld id="{D4B18A11-21C1-4B8F-B2BB-5EB1E0F497C6}" type="datetimeFigureOut">
               <a:rPr lang="en-US" smtClean="0"/>
               <a:pPr/>
-              <a:t>5/31/2010</a:t>
+              <a:t>6/1/2010</a:t>
             </a:fld>
             <a:endParaRPr lang="en-US"/>
           </a:p>
@@ -637,7 +639,7 @@
             <a:fld id="{D4B18A11-21C1-4B8F-B2BB-5EB1E0F497C6}" type="datetimeFigureOut">
               <a:rPr lang="en-US" smtClean="0"/>
               <a:pPr/>
-              <a:t>5/31/2010</a:t>
+              <a:t>6/1/2010</a:t>
             </a:fld>
             <a:endParaRPr lang="en-US"/>
           </a:p>
@@ -804,7 +806,7 @@
             <a:fld id="{D4B18A11-21C1-4B8F-B2BB-5EB1E0F497C6}" type="datetimeFigureOut">
               <a:rPr lang="en-US" smtClean="0"/>
               <a:pPr/>
-              <a:t>5/31/2010</a:t>
+              <a:t>6/1/2010</a:t>
             </a:fld>
             <a:endParaRPr lang="en-US"/>
           </a:p>
@@ -1047,7 +1049,7 @@
             <a:fld id="{D4B18A11-21C1-4B8F-B2BB-5EB1E0F497C6}" type="datetimeFigureOut">
               <a:rPr lang="en-US" smtClean="0"/>
               <a:pPr/>
-              <a:t>5/31/2010</a:t>
+              <a:t>6/1/2010</a:t>
             </a:fld>
             <a:endParaRPr lang="en-US"/>
           </a:p>
@@ -1332,7 +1334,7 @@
             <a:fld id="{D4B18A11-21C1-4B8F-B2BB-5EB1E0F497C6}" type="datetimeFigureOut">
               <a:rPr lang="en-US" smtClean="0"/>
               <a:pPr/>
-              <a:t>5/31/2010</a:t>
+              <a:t>6/1/2010</a:t>
             </a:fld>
             <a:endParaRPr lang="en-US"/>
           </a:p>
@@ -1751,7 +1753,7 @@
             <a:fld id="{D4B18A11-21C1-4B8F-B2BB-5EB1E0F497C6}" type="datetimeFigureOut">
               <a:rPr lang="en-US" smtClean="0"/>
               <a:pPr/>
-              <a:t>5/31/2010</a:t>
+              <a:t>6/1/2010</a:t>
             </a:fld>
             <a:endParaRPr lang="en-US"/>
           </a:p>
@@ -1866,7 +1868,7 @@
             <a:fld id="{D4B18A11-21C1-4B8F-B2BB-5EB1E0F497C6}" type="datetimeFigureOut">
               <a:rPr lang="en-US" smtClean="0"/>
               <a:pPr/>
-              <a:t>5/31/2010</a:t>
+              <a:t>6/1/2010</a:t>
             </a:fld>
             <a:endParaRPr lang="en-US"/>
           </a:p>
@@ -1958,7 +1960,7 @@
             <a:fld id="{D4B18A11-21C1-4B8F-B2BB-5EB1E0F497C6}" type="datetimeFigureOut">
               <a:rPr lang="en-US" smtClean="0"/>
               <a:pPr/>
-              <a:t>5/31/2010</a:t>
+              <a:t>6/1/2010</a:t>
             </a:fld>
             <a:endParaRPr lang="en-US"/>
           </a:p>
@@ -2232,7 +2234,7 @@
             <a:fld id="{D4B18A11-21C1-4B8F-B2BB-5EB1E0F497C6}" type="datetimeFigureOut">
               <a:rPr lang="en-US" smtClean="0"/>
               <a:pPr/>
-              <a:t>5/31/2010</a:t>
+              <a:t>6/1/2010</a:t>
             </a:fld>
             <a:endParaRPr lang="en-US"/>
           </a:p>
@@ -2482,7 +2484,7 @@
             <a:fld id="{D4B18A11-21C1-4B8F-B2BB-5EB1E0F497C6}" type="datetimeFigureOut">
               <a:rPr lang="en-US" smtClean="0"/>
               <a:pPr/>
-              <a:t>5/31/2010</a:t>
+              <a:t>6/1/2010</a:t>
             </a:fld>
             <a:endParaRPr lang="en-US"/>
           </a:p>
@@ -2692,7 +2694,7 @@
             <a:fld id="{D4B18A11-21C1-4B8F-B2BB-5EB1E0F497C6}" type="datetimeFigureOut">
               <a:rPr lang="en-US" smtClean="0"/>
               <a:pPr/>
-              <a:t>5/31/2010</a:t>
+              <a:t>6/1/2010</a:t>
             </a:fld>
             <a:endParaRPr lang="en-US"/>
           </a:p>
@@ -5417,15 +5419,2158 @@
           <a:chExt cx="0" cy="0"/>
         </a:xfrm>
       </p:grpSpPr>
+      <p:cxnSp>
+        <p:nvCxnSpPr>
+          <p:cNvPr id="103" name="Straight Connector 102"/>
+          <p:cNvCxnSpPr/>
+          <p:nvPr/>
+        </p:nvCxnSpPr>
+        <p:spPr>
+          <a:xfrm rot="5400000">
+            <a:off x="1143000" y="3429000"/>
+            <a:ext cx="6858000" cy="0"/>
+          </a:xfrm>
+          <a:prstGeom prst="line">
+            <a:avLst/>
+          </a:prstGeom>
+          <a:ln w="38100">
+            <a:solidFill>
+              <a:schemeClr val="tx1"/>
+            </a:solidFill>
+            <a:prstDash val="dash"/>
+          </a:ln>
+        </p:spPr>
+        <p:style>
+          <a:lnRef idx="1">
+            <a:schemeClr val="accent1"/>
+          </a:lnRef>
+          <a:fillRef idx="0">
+            <a:schemeClr val="accent1"/>
+          </a:fillRef>
+          <a:effectRef idx="0">
+            <a:schemeClr val="accent1"/>
+          </a:effectRef>
+          <a:fontRef idx="minor">
+            <a:schemeClr val="tx1"/>
+          </a:fontRef>
+        </p:style>
+      </p:cxnSp>
+      <p:sp>
+        <p:nvSpPr>
+          <p:cNvPr id="64" name="Right Arrow 63"/>
+          <p:cNvSpPr/>
+          <p:nvPr/>
+        </p:nvSpPr>
+        <p:spPr>
+          <a:xfrm>
+            <a:off x="3786182" y="2928934"/>
+            <a:ext cx="1571636" cy="1214446"/>
+          </a:xfrm>
+          <a:prstGeom prst="rightArrow">
+            <a:avLst/>
+          </a:prstGeom>
+        </p:spPr>
+        <p:style>
+          <a:lnRef idx="0">
+            <a:schemeClr val="accent1"/>
+          </a:lnRef>
+          <a:fillRef idx="3">
+            <a:schemeClr val="accent1"/>
+          </a:fillRef>
+          <a:effectRef idx="3">
+            <a:schemeClr val="accent1"/>
+          </a:effectRef>
+          <a:fontRef idx="minor">
+            <a:schemeClr val="lt1"/>
+          </a:fontRef>
+        </p:style>
+        <p:txBody>
+          <a:bodyPr rtlCol="0" anchor="ctr"/>
+          <a:lstStyle/>
+          <a:p>
+            <a:pPr algn="ctr"/>
+            <a:endParaRPr lang="en-US"/>
+          </a:p>
+        </p:txBody>
+      </p:sp>
+      <p:sp>
+        <p:nvSpPr>
+          <p:cNvPr id="92" name="TextBox 91"/>
+          <p:cNvSpPr txBox="1"/>
+          <p:nvPr/>
+        </p:nvSpPr>
+        <p:spPr>
+          <a:xfrm>
+            <a:off x="3714744" y="1500174"/>
+            <a:ext cx="1674817" cy="646331"/>
+          </a:xfrm>
+          <a:prstGeom prst="rect">
+            <a:avLst/>
+          </a:prstGeom>
+          <a:noFill/>
+        </p:spPr>
+        <p:txBody>
+          <a:bodyPr wrap="none" rtlCol="0">
+            <a:spAutoFit/>
+          </a:bodyPr>
+          <a:lstStyle/>
+          <a:p>
+            <a:r>
+              <a:rPr lang="es-ES" sz="3600" dirty="0" smtClean="0">
+                <a:solidFill>
+                  <a:srgbClr val="FF0000"/>
+                </a:solidFill>
+              </a:rPr>
+              <a:t>Pantalla</a:t>
+            </a:r>
+            <a:endParaRPr lang="en-US" sz="3600" dirty="0">
+              <a:solidFill>
+                <a:srgbClr val="FF0000"/>
+              </a:solidFill>
+            </a:endParaRPr>
+          </a:p>
+        </p:txBody>
+      </p:sp>
+      <p:cxnSp>
+        <p:nvCxnSpPr>
+          <p:cNvPr id="94" name="Straight Arrow Connector 93"/>
+          <p:cNvCxnSpPr>
+            <a:stCxn id="92" idx="1"/>
+          </p:cNvCxnSpPr>
+          <p:nvPr/>
+        </p:nvCxnSpPr>
+        <p:spPr>
+          <a:xfrm rot="10800000" flipV="1">
+            <a:off x="3286116" y="1823340"/>
+            <a:ext cx="428628" cy="34024"/>
+          </a:xfrm>
+          <a:prstGeom prst="straightConnector1">
+            <a:avLst/>
+          </a:prstGeom>
+          <a:ln>
+            <a:tailEnd type="arrow"/>
+          </a:ln>
+        </p:spPr>
+        <p:style>
+          <a:lnRef idx="1">
+            <a:schemeClr val="accent1"/>
+          </a:lnRef>
+          <a:fillRef idx="0">
+            <a:schemeClr val="accent1"/>
+          </a:fillRef>
+          <a:effectRef idx="0">
+            <a:schemeClr val="accent1"/>
+          </a:effectRef>
+          <a:fontRef idx="minor">
+            <a:schemeClr val="tx1"/>
+          </a:fontRef>
+        </p:style>
+      </p:cxnSp>
+      <p:cxnSp>
+        <p:nvCxnSpPr>
+          <p:cNvPr id="97" name="Straight Arrow Connector 96"/>
+          <p:cNvCxnSpPr>
+            <a:stCxn id="92" idx="3"/>
+          </p:cNvCxnSpPr>
+          <p:nvPr/>
+        </p:nvCxnSpPr>
+        <p:spPr>
+          <a:xfrm>
+            <a:off x="5389561" y="1823340"/>
+            <a:ext cx="396885" cy="34024"/>
+          </a:xfrm>
+          <a:prstGeom prst="straightConnector1">
+            <a:avLst/>
+          </a:prstGeom>
+          <a:ln>
+            <a:tailEnd type="arrow"/>
+          </a:ln>
+        </p:spPr>
+        <p:style>
+          <a:lnRef idx="1">
+            <a:schemeClr val="accent1"/>
+          </a:lnRef>
+          <a:fillRef idx="0">
+            <a:schemeClr val="accent1"/>
+          </a:fillRef>
+          <a:effectRef idx="0">
+            <a:schemeClr val="accent1"/>
+          </a:effectRef>
+          <a:fontRef idx="minor">
+            <a:schemeClr val="tx1"/>
+          </a:fontRef>
+        </p:style>
+      </p:cxnSp>
+      <p:sp>
+        <p:nvSpPr>
+          <p:cNvPr id="100" name="Oval 99"/>
+          <p:cNvSpPr/>
+          <p:nvPr/>
+        </p:nvSpPr>
+        <p:spPr>
+          <a:xfrm>
+            <a:off x="928662" y="3214686"/>
+            <a:ext cx="571504" cy="500066"/>
+          </a:xfrm>
+          <a:prstGeom prst="ellipse">
+            <a:avLst/>
+          </a:prstGeom>
+        </p:spPr>
+        <p:style>
+          <a:lnRef idx="2">
+            <a:schemeClr val="accent1"/>
+          </a:lnRef>
+          <a:fillRef idx="1">
+            <a:schemeClr val="lt1"/>
+          </a:fillRef>
+          <a:effectRef idx="0">
+            <a:schemeClr val="accent1"/>
+          </a:effectRef>
+          <a:fontRef idx="minor">
+            <a:schemeClr val="dk1"/>
+          </a:fontRef>
+        </p:style>
+        <p:txBody>
+          <a:bodyPr rtlCol="0" anchor="ctr"/>
+          <a:lstStyle/>
+          <a:p>
+            <a:pPr algn="ctr"/>
+            <a:r>
+              <a:rPr lang="es-ES" sz="4400" dirty="0" smtClean="0"/>
+              <a:t>1</a:t>
+            </a:r>
+            <a:endParaRPr lang="en-US" sz="4400" dirty="0"/>
+          </a:p>
+        </p:txBody>
+      </p:sp>
+      <p:sp>
+        <p:nvSpPr>
+          <p:cNvPr id="101" name="Oval 100"/>
+          <p:cNvSpPr/>
+          <p:nvPr/>
+        </p:nvSpPr>
+        <p:spPr>
+          <a:xfrm>
+            <a:off x="7643834" y="3286124"/>
+            <a:ext cx="571504" cy="500066"/>
+          </a:xfrm>
+          <a:prstGeom prst="ellipse">
+            <a:avLst/>
+          </a:prstGeom>
+        </p:spPr>
+        <p:style>
+          <a:lnRef idx="2">
+            <a:schemeClr val="accent1"/>
+          </a:lnRef>
+          <a:fillRef idx="1">
+            <a:schemeClr val="lt1"/>
+          </a:fillRef>
+          <a:effectRef idx="0">
+            <a:schemeClr val="accent1"/>
+          </a:effectRef>
+          <a:fontRef idx="minor">
+            <a:schemeClr val="dk1"/>
+          </a:fontRef>
+        </p:style>
+        <p:txBody>
+          <a:bodyPr rtlCol="0" anchor="ctr"/>
+          <a:lstStyle/>
+          <a:p>
+            <a:pPr algn="ctr"/>
+            <a:r>
+              <a:rPr lang="es-ES" sz="4400" dirty="0" smtClean="0"/>
+              <a:t>2</a:t>
+            </a:r>
+            <a:endParaRPr lang="en-US" sz="4400" dirty="0"/>
+          </a:p>
+        </p:txBody>
+      </p:sp>
       <p:grpSp>
         <p:nvGrpSpPr>
-          <p:cNvPr id="7" name="Group 6"/>
+          <p:cNvPr id="119" name="Group 118"/>
           <p:cNvGrpSpPr/>
           <p:nvPr/>
         </p:nvGrpSpPr>
         <p:grpSpPr>
           <a:xfrm>
-            <a:off x="785786" y="1643050"/>
+            <a:off x="1428728" y="4643446"/>
+            <a:ext cx="1800238" cy="1071570"/>
+            <a:chOff x="642910" y="4500570"/>
+            <a:chExt cx="3000396" cy="1785950"/>
+          </a:xfrm>
+        </p:grpSpPr>
+        <p:sp>
+          <p:nvSpPr>
+            <p:cNvPr id="80" name="Multiply 79"/>
+            <p:cNvSpPr/>
+            <p:nvPr/>
+          </p:nvSpPr>
+          <p:spPr>
+            <a:xfrm>
+              <a:off x="642910" y="5143512"/>
+              <a:ext cx="500066" cy="500066"/>
+            </a:xfrm>
+            <a:prstGeom prst="mathMultiply">
+              <a:avLst/>
+            </a:prstGeom>
+          </p:spPr>
+          <p:style>
+            <a:lnRef idx="2">
+              <a:schemeClr val="accent6"/>
+            </a:lnRef>
+            <a:fillRef idx="1">
+              <a:schemeClr val="lt1"/>
+            </a:fillRef>
+            <a:effectRef idx="0">
+              <a:schemeClr val="accent6"/>
+            </a:effectRef>
+            <a:fontRef idx="minor">
+              <a:schemeClr val="dk1"/>
+            </a:fontRef>
+          </p:style>
+          <p:txBody>
+            <a:bodyPr rtlCol="0" anchor="ctr"/>
+            <a:lstStyle/>
+            <a:p>
+              <a:pPr algn="ctr"/>
+              <a:endParaRPr lang="en-US"/>
+            </a:p>
+          </p:txBody>
+        </p:sp>
+        <p:sp>
+          <p:nvSpPr>
+            <p:cNvPr id="81" name="Multiply 80"/>
+            <p:cNvSpPr/>
+            <p:nvPr/>
+          </p:nvSpPr>
+          <p:spPr>
+            <a:xfrm>
+              <a:off x="1000100" y="5143512"/>
+              <a:ext cx="500066" cy="500066"/>
+            </a:xfrm>
+            <a:prstGeom prst="mathMultiply">
+              <a:avLst/>
+            </a:prstGeom>
+          </p:spPr>
+          <p:style>
+            <a:lnRef idx="2">
+              <a:schemeClr val="accent6"/>
+            </a:lnRef>
+            <a:fillRef idx="1">
+              <a:schemeClr val="lt1"/>
+            </a:fillRef>
+            <a:effectRef idx="0">
+              <a:schemeClr val="accent6"/>
+            </a:effectRef>
+            <a:fontRef idx="minor">
+              <a:schemeClr val="dk1"/>
+            </a:fontRef>
+          </p:style>
+          <p:txBody>
+            <a:bodyPr rtlCol="0" anchor="ctr"/>
+            <a:lstStyle/>
+            <a:p>
+              <a:pPr algn="ctr"/>
+              <a:endParaRPr lang="en-US"/>
+            </a:p>
+          </p:txBody>
+        </p:sp>
+        <p:sp>
+          <p:nvSpPr>
+            <p:cNvPr id="82" name="Multiply 81"/>
+            <p:cNvSpPr/>
+            <p:nvPr/>
+          </p:nvSpPr>
+          <p:spPr>
+            <a:xfrm>
+              <a:off x="1357290" y="5143512"/>
+              <a:ext cx="500066" cy="500066"/>
+            </a:xfrm>
+            <a:prstGeom prst="mathMultiply">
+              <a:avLst/>
+            </a:prstGeom>
+          </p:spPr>
+          <p:style>
+            <a:lnRef idx="2">
+              <a:schemeClr val="accent6"/>
+            </a:lnRef>
+            <a:fillRef idx="1">
+              <a:schemeClr val="lt1"/>
+            </a:fillRef>
+            <a:effectRef idx="0">
+              <a:schemeClr val="accent6"/>
+            </a:effectRef>
+            <a:fontRef idx="minor">
+              <a:schemeClr val="dk1"/>
+            </a:fontRef>
+          </p:style>
+          <p:txBody>
+            <a:bodyPr rtlCol="0" anchor="ctr"/>
+            <a:lstStyle/>
+            <a:p>
+              <a:pPr algn="ctr"/>
+              <a:endParaRPr lang="en-US"/>
+            </a:p>
+          </p:txBody>
+        </p:sp>
+        <p:sp>
+          <p:nvSpPr>
+            <p:cNvPr id="83" name="Multiply 82"/>
+            <p:cNvSpPr/>
+            <p:nvPr/>
+          </p:nvSpPr>
+          <p:spPr>
+            <a:xfrm>
+              <a:off x="1714480" y="5143512"/>
+              <a:ext cx="500066" cy="500066"/>
+            </a:xfrm>
+            <a:prstGeom prst="mathMultiply">
+              <a:avLst/>
+            </a:prstGeom>
+          </p:spPr>
+          <p:style>
+            <a:lnRef idx="2">
+              <a:schemeClr val="accent6"/>
+            </a:lnRef>
+            <a:fillRef idx="1">
+              <a:schemeClr val="lt1"/>
+            </a:fillRef>
+            <a:effectRef idx="0">
+              <a:schemeClr val="accent6"/>
+            </a:effectRef>
+            <a:fontRef idx="minor">
+              <a:schemeClr val="dk1"/>
+            </a:fontRef>
+          </p:style>
+          <p:txBody>
+            <a:bodyPr rtlCol="0" anchor="ctr"/>
+            <a:lstStyle/>
+            <a:p>
+              <a:pPr algn="ctr"/>
+              <a:endParaRPr lang="en-US"/>
+            </a:p>
+          </p:txBody>
+        </p:sp>
+        <p:sp>
+          <p:nvSpPr>
+            <p:cNvPr id="84" name="Multiply 83"/>
+            <p:cNvSpPr/>
+            <p:nvPr/>
+          </p:nvSpPr>
+          <p:spPr>
+            <a:xfrm>
+              <a:off x="2071670" y="5143512"/>
+              <a:ext cx="500066" cy="500066"/>
+            </a:xfrm>
+            <a:prstGeom prst="mathMultiply">
+              <a:avLst/>
+            </a:prstGeom>
+          </p:spPr>
+          <p:style>
+            <a:lnRef idx="2">
+              <a:schemeClr val="accent6"/>
+            </a:lnRef>
+            <a:fillRef idx="1">
+              <a:schemeClr val="lt1"/>
+            </a:fillRef>
+            <a:effectRef idx="0">
+              <a:schemeClr val="accent6"/>
+            </a:effectRef>
+            <a:fontRef idx="minor">
+              <a:schemeClr val="dk1"/>
+            </a:fontRef>
+          </p:style>
+          <p:txBody>
+            <a:bodyPr rtlCol="0" anchor="ctr"/>
+            <a:lstStyle/>
+            <a:p>
+              <a:pPr algn="ctr"/>
+              <a:endParaRPr lang="en-US"/>
+            </a:p>
+          </p:txBody>
+        </p:sp>
+        <p:sp>
+          <p:nvSpPr>
+            <p:cNvPr id="85" name="Multiply 84"/>
+            <p:cNvSpPr/>
+            <p:nvPr/>
+          </p:nvSpPr>
+          <p:spPr>
+            <a:xfrm>
+              <a:off x="2428860" y="5143512"/>
+              <a:ext cx="500066" cy="500066"/>
+            </a:xfrm>
+            <a:prstGeom prst="mathMultiply">
+              <a:avLst/>
+            </a:prstGeom>
+          </p:spPr>
+          <p:style>
+            <a:lnRef idx="2">
+              <a:schemeClr val="accent6"/>
+            </a:lnRef>
+            <a:fillRef idx="1">
+              <a:schemeClr val="lt1"/>
+            </a:fillRef>
+            <a:effectRef idx="0">
+              <a:schemeClr val="accent6"/>
+            </a:effectRef>
+            <a:fontRef idx="minor">
+              <a:schemeClr val="dk1"/>
+            </a:fontRef>
+          </p:style>
+          <p:txBody>
+            <a:bodyPr rtlCol="0" anchor="ctr"/>
+            <a:lstStyle/>
+            <a:p>
+              <a:pPr algn="ctr"/>
+              <a:endParaRPr lang="en-US"/>
+            </a:p>
+          </p:txBody>
+        </p:sp>
+        <p:sp>
+          <p:nvSpPr>
+            <p:cNvPr id="86" name="Multiply 85"/>
+            <p:cNvSpPr/>
+            <p:nvPr/>
+          </p:nvSpPr>
+          <p:spPr>
+            <a:xfrm>
+              <a:off x="2786050" y="5143512"/>
+              <a:ext cx="500066" cy="500066"/>
+            </a:xfrm>
+            <a:prstGeom prst="mathMultiply">
+              <a:avLst/>
+            </a:prstGeom>
+          </p:spPr>
+          <p:style>
+            <a:lnRef idx="2">
+              <a:schemeClr val="accent6"/>
+            </a:lnRef>
+            <a:fillRef idx="1">
+              <a:schemeClr val="lt1"/>
+            </a:fillRef>
+            <a:effectRef idx="0">
+              <a:schemeClr val="accent6"/>
+            </a:effectRef>
+            <a:fontRef idx="minor">
+              <a:schemeClr val="dk1"/>
+            </a:fontRef>
+          </p:style>
+          <p:txBody>
+            <a:bodyPr rtlCol="0" anchor="ctr"/>
+            <a:lstStyle/>
+            <a:p>
+              <a:pPr algn="ctr"/>
+              <a:endParaRPr lang="en-US"/>
+            </a:p>
+          </p:txBody>
+        </p:sp>
+        <p:sp>
+          <p:nvSpPr>
+            <p:cNvPr id="87" name="Multiply 86"/>
+            <p:cNvSpPr/>
+            <p:nvPr/>
+          </p:nvSpPr>
+          <p:spPr>
+            <a:xfrm>
+              <a:off x="3143240" y="5143512"/>
+              <a:ext cx="500066" cy="500066"/>
+            </a:xfrm>
+            <a:prstGeom prst="mathMultiply">
+              <a:avLst/>
+            </a:prstGeom>
+          </p:spPr>
+          <p:style>
+            <a:lnRef idx="2">
+              <a:schemeClr val="accent6"/>
+            </a:lnRef>
+            <a:fillRef idx="1">
+              <a:schemeClr val="lt1"/>
+            </a:fillRef>
+            <a:effectRef idx="0">
+              <a:schemeClr val="accent6"/>
+            </a:effectRef>
+            <a:fontRef idx="minor">
+              <a:schemeClr val="dk1"/>
+            </a:fontRef>
+          </p:style>
+          <p:txBody>
+            <a:bodyPr rtlCol="0" anchor="ctr"/>
+            <a:lstStyle/>
+            <a:p>
+              <a:pPr algn="ctr"/>
+              <a:endParaRPr lang="en-US"/>
+            </a:p>
+          </p:txBody>
+        </p:sp>
+        <p:sp>
+          <p:nvSpPr>
+            <p:cNvPr id="104" name="Rectangle 103"/>
+            <p:cNvSpPr/>
+            <p:nvPr/>
+          </p:nvSpPr>
+          <p:spPr>
+            <a:xfrm>
+              <a:off x="714348" y="4500570"/>
+              <a:ext cx="2857520" cy="1785950"/>
+            </a:xfrm>
+            <a:prstGeom prst="rect">
+              <a:avLst/>
+            </a:prstGeom>
+            <a:noFill/>
+          </p:spPr>
+          <p:style>
+            <a:lnRef idx="2">
+              <a:schemeClr val="accent1"/>
+            </a:lnRef>
+            <a:fillRef idx="1">
+              <a:schemeClr val="lt1"/>
+            </a:fillRef>
+            <a:effectRef idx="0">
+              <a:schemeClr val="accent1"/>
+            </a:effectRef>
+            <a:fontRef idx="minor">
+              <a:schemeClr val="dk1"/>
+            </a:fontRef>
+          </p:style>
+          <p:txBody>
+            <a:bodyPr rtlCol="0" anchor="ctr"/>
+            <a:lstStyle/>
+            <a:p>
+              <a:pPr algn="ctr"/>
+              <a:endParaRPr lang="en-US"/>
+            </a:p>
+          </p:txBody>
+        </p:sp>
+      </p:grpSp>
+      <p:grpSp>
+        <p:nvGrpSpPr>
+          <p:cNvPr id="130" name="Group 129"/>
+          <p:cNvGrpSpPr/>
+          <p:nvPr/>
+        </p:nvGrpSpPr>
+        <p:grpSpPr>
+          <a:xfrm>
+            <a:off x="571472" y="285728"/>
+            <a:ext cx="3571900" cy="3484816"/>
+            <a:chOff x="571472" y="285728"/>
+            <a:chExt cx="3571900" cy="3484816"/>
+          </a:xfrm>
+        </p:grpSpPr>
+        <p:grpSp>
+          <p:nvGrpSpPr>
+            <p:cNvPr id="31" name="Group 30"/>
+            <p:cNvGrpSpPr/>
+            <p:nvPr/>
+          </p:nvGrpSpPr>
+          <p:grpSpPr>
+            <a:xfrm>
+              <a:off x="857224" y="285728"/>
+              <a:ext cx="3000396" cy="3484816"/>
+              <a:chOff x="714348" y="1357298"/>
+              <a:chExt cx="3000396" cy="3484816"/>
+            </a:xfrm>
+          </p:grpSpPr>
+          <p:grpSp>
+            <p:nvGrpSpPr>
+              <p:cNvPr id="7" name="Group 6"/>
+              <p:cNvGrpSpPr/>
+              <p:nvPr/>
+            </p:nvGrpSpPr>
+            <p:grpSpPr>
+              <a:xfrm>
+                <a:off x="785786" y="1643050"/>
+                <a:ext cx="2872034" cy="3199064"/>
+                <a:chOff x="1414214" y="801440"/>
+                <a:chExt cx="4143404" cy="4214842"/>
+              </a:xfrm>
+            </p:grpSpPr>
+            <p:sp>
+              <p:nvSpPr>
+                <p:cNvPr id="6" name="Isosceles Triangle 5"/>
+                <p:cNvSpPr/>
+                <p:nvPr/>
+              </p:nvSpPr>
+              <p:spPr>
+                <a:xfrm rot="10800000">
+                  <a:off x="1414214" y="801440"/>
+                  <a:ext cx="4143404" cy="4214842"/>
+                </a:xfrm>
+                <a:prstGeom prst="triangle">
+                  <a:avLst/>
+                </a:prstGeom>
+                <a:noFill/>
+              </p:spPr>
+              <p:style>
+                <a:lnRef idx="2">
+                  <a:schemeClr val="accent1">
+                    <a:shade val="50000"/>
+                  </a:schemeClr>
+                </a:lnRef>
+                <a:fillRef idx="1">
+                  <a:schemeClr val="accent1"/>
+                </a:fillRef>
+                <a:effectRef idx="0">
+                  <a:schemeClr val="accent1"/>
+                </a:effectRef>
+                <a:fontRef idx="minor">
+                  <a:schemeClr val="lt1"/>
+                </a:fontRef>
+              </p:style>
+              <p:txBody>
+                <a:bodyPr rtlCol="0" anchor="ctr"/>
+                <a:lstStyle/>
+                <a:p>
+                  <a:pPr algn="ctr"/>
+                  <a:endParaRPr lang="en-US"/>
+                </a:p>
+              </p:txBody>
+            </p:sp>
+            <p:cxnSp>
+              <p:nvCxnSpPr>
+                <p:cNvPr id="3" name="Straight Connector 2"/>
+                <p:cNvCxnSpPr/>
+                <p:nvPr/>
+              </p:nvCxnSpPr>
+              <p:spPr>
+                <a:xfrm>
+                  <a:off x="2214546" y="2500306"/>
+                  <a:ext cx="2500330" cy="0"/>
+                </a:xfrm>
+                <a:prstGeom prst="line">
+                  <a:avLst/>
+                </a:prstGeom>
+                <a:ln>
+                  <a:solidFill>
+                    <a:srgbClr val="FF0000"/>
+                  </a:solidFill>
+                </a:ln>
+              </p:spPr>
+              <p:style>
+                <a:lnRef idx="1">
+                  <a:schemeClr val="accent1"/>
+                </a:lnRef>
+                <a:fillRef idx="0">
+                  <a:schemeClr val="accent1"/>
+                </a:fillRef>
+                <a:effectRef idx="0">
+                  <a:schemeClr val="accent1"/>
+                </a:effectRef>
+                <a:fontRef idx="minor">
+                  <a:schemeClr val="tx1"/>
+                </a:fontRef>
+              </p:style>
+            </p:cxnSp>
+          </p:grpSp>
+          <p:sp>
+            <p:nvSpPr>
+              <p:cNvPr id="11" name="Multiply 10"/>
+              <p:cNvSpPr/>
+              <p:nvPr/>
+            </p:nvSpPr>
+            <p:spPr>
+              <a:xfrm>
+                <a:off x="714348" y="1357298"/>
+                <a:ext cx="500066" cy="500066"/>
+              </a:xfrm>
+              <a:prstGeom prst="mathMultiply">
+                <a:avLst/>
+              </a:prstGeom>
+            </p:spPr>
+            <p:style>
+              <a:lnRef idx="2">
+                <a:schemeClr val="accent6"/>
+              </a:lnRef>
+              <a:fillRef idx="1">
+                <a:schemeClr val="lt1"/>
+              </a:fillRef>
+              <a:effectRef idx="0">
+                <a:schemeClr val="accent6"/>
+              </a:effectRef>
+              <a:fontRef idx="minor">
+                <a:schemeClr val="dk1"/>
+              </a:fontRef>
+            </p:style>
+            <p:txBody>
+              <a:bodyPr rtlCol="0" anchor="ctr"/>
+              <a:lstStyle/>
+              <a:p>
+                <a:pPr algn="ctr"/>
+                <a:endParaRPr lang="en-US"/>
+              </a:p>
+            </p:txBody>
+          </p:sp>
+          <p:sp>
+            <p:nvSpPr>
+              <p:cNvPr id="12" name="Multiply 11"/>
+              <p:cNvSpPr/>
+              <p:nvPr/>
+            </p:nvSpPr>
+            <p:spPr>
+              <a:xfrm>
+                <a:off x="1071538" y="1357298"/>
+                <a:ext cx="500066" cy="500066"/>
+              </a:xfrm>
+              <a:prstGeom prst="mathMultiply">
+                <a:avLst/>
+              </a:prstGeom>
+            </p:spPr>
+            <p:style>
+              <a:lnRef idx="2">
+                <a:schemeClr val="accent6"/>
+              </a:lnRef>
+              <a:fillRef idx="1">
+                <a:schemeClr val="lt1"/>
+              </a:fillRef>
+              <a:effectRef idx="0">
+                <a:schemeClr val="accent6"/>
+              </a:effectRef>
+              <a:fontRef idx="minor">
+                <a:schemeClr val="dk1"/>
+              </a:fontRef>
+            </p:style>
+            <p:txBody>
+              <a:bodyPr rtlCol="0" anchor="ctr"/>
+              <a:lstStyle/>
+              <a:p>
+                <a:pPr algn="ctr"/>
+                <a:endParaRPr lang="en-US"/>
+              </a:p>
+            </p:txBody>
+          </p:sp>
+          <p:sp>
+            <p:nvSpPr>
+              <p:cNvPr id="13" name="Multiply 12"/>
+              <p:cNvSpPr/>
+              <p:nvPr/>
+            </p:nvSpPr>
+            <p:spPr>
+              <a:xfrm>
+                <a:off x="1428728" y="1357298"/>
+                <a:ext cx="500066" cy="500066"/>
+              </a:xfrm>
+              <a:prstGeom prst="mathMultiply">
+                <a:avLst/>
+              </a:prstGeom>
+            </p:spPr>
+            <p:style>
+              <a:lnRef idx="2">
+                <a:schemeClr val="accent6"/>
+              </a:lnRef>
+              <a:fillRef idx="1">
+                <a:schemeClr val="lt1"/>
+              </a:fillRef>
+              <a:effectRef idx="0">
+                <a:schemeClr val="accent6"/>
+              </a:effectRef>
+              <a:fontRef idx="minor">
+                <a:schemeClr val="dk1"/>
+              </a:fontRef>
+            </p:style>
+            <p:txBody>
+              <a:bodyPr rtlCol="0" anchor="ctr"/>
+              <a:lstStyle/>
+              <a:p>
+                <a:pPr algn="ctr"/>
+                <a:endParaRPr lang="en-US"/>
+              </a:p>
+            </p:txBody>
+          </p:sp>
+          <p:sp>
+            <p:nvSpPr>
+              <p:cNvPr id="14" name="Multiply 13"/>
+              <p:cNvSpPr/>
+              <p:nvPr/>
+            </p:nvSpPr>
+            <p:spPr>
+              <a:xfrm>
+                <a:off x="1785918" y="1357298"/>
+                <a:ext cx="500066" cy="500066"/>
+              </a:xfrm>
+              <a:prstGeom prst="mathMultiply">
+                <a:avLst/>
+              </a:prstGeom>
+            </p:spPr>
+            <p:style>
+              <a:lnRef idx="2">
+                <a:schemeClr val="accent6"/>
+              </a:lnRef>
+              <a:fillRef idx="1">
+                <a:schemeClr val="lt1"/>
+              </a:fillRef>
+              <a:effectRef idx="0">
+                <a:schemeClr val="accent6"/>
+              </a:effectRef>
+              <a:fontRef idx="minor">
+                <a:schemeClr val="dk1"/>
+              </a:fontRef>
+            </p:style>
+            <p:txBody>
+              <a:bodyPr rtlCol="0" anchor="ctr"/>
+              <a:lstStyle/>
+              <a:p>
+                <a:pPr algn="ctr"/>
+                <a:endParaRPr lang="en-US"/>
+              </a:p>
+            </p:txBody>
+          </p:sp>
+          <p:sp>
+            <p:nvSpPr>
+              <p:cNvPr id="15" name="Multiply 14"/>
+              <p:cNvSpPr/>
+              <p:nvPr/>
+            </p:nvSpPr>
+            <p:spPr>
+              <a:xfrm>
+                <a:off x="2143108" y="1357298"/>
+                <a:ext cx="500066" cy="500066"/>
+              </a:xfrm>
+              <a:prstGeom prst="mathMultiply">
+                <a:avLst/>
+              </a:prstGeom>
+            </p:spPr>
+            <p:style>
+              <a:lnRef idx="2">
+                <a:schemeClr val="accent6"/>
+              </a:lnRef>
+              <a:fillRef idx="1">
+                <a:schemeClr val="lt1"/>
+              </a:fillRef>
+              <a:effectRef idx="0">
+                <a:schemeClr val="accent6"/>
+              </a:effectRef>
+              <a:fontRef idx="minor">
+                <a:schemeClr val="dk1"/>
+              </a:fontRef>
+            </p:style>
+            <p:txBody>
+              <a:bodyPr rtlCol="0" anchor="ctr"/>
+              <a:lstStyle/>
+              <a:p>
+                <a:pPr algn="ctr"/>
+                <a:endParaRPr lang="en-US"/>
+              </a:p>
+            </p:txBody>
+          </p:sp>
+          <p:sp>
+            <p:nvSpPr>
+              <p:cNvPr id="16" name="Multiply 15"/>
+              <p:cNvSpPr/>
+              <p:nvPr/>
+            </p:nvSpPr>
+            <p:spPr>
+              <a:xfrm>
+                <a:off x="2500298" y="1357298"/>
+                <a:ext cx="500066" cy="500066"/>
+              </a:xfrm>
+              <a:prstGeom prst="mathMultiply">
+                <a:avLst/>
+              </a:prstGeom>
+            </p:spPr>
+            <p:style>
+              <a:lnRef idx="2">
+                <a:schemeClr val="accent6"/>
+              </a:lnRef>
+              <a:fillRef idx="1">
+                <a:schemeClr val="lt1"/>
+              </a:fillRef>
+              <a:effectRef idx="0">
+                <a:schemeClr val="accent6"/>
+              </a:effectRef>
+              <a:fontRef idx="minor">
+                <a:schemeClr val="dk1"/>
+              </a:fontRef>
+            </p:style>
+            <p:txBody>
+              <a:bodyPr rtlCol="0" anchor="ctr"/>
+              <a:lstStyle/>
+              <a:p>
+                <a:pPr algn="ctr"/>
+                <a:endParaRPr lang="en-US"/>
+              </a:p>
+            </p:txBody>
+          </p:sp>
+          <p:sp>
+            <p:nvSpPr>
+              <p:cNvPr id="17" name="Multiply 16"/>
+              <p:cNvSpPr/>
+              <p:nvPr/>
+            </p:nvSpPr>
+            <p:spPr>
+              <a:xfrm>
+                <a:off x="2857488" y="1357298"/>
+                <a:ext cx="500066" cy="500066"/>
+              </a:xfrm>
+              <a:prstGeom prst="mathMultiply">
+                <a:avLst/>
+              </a:prstGeom>
+            </p:spPr>
+            <p:style>
+              <a:lnRef idx="2">
+                <a:schemeClr val="accent6"/>
+              </a:lnRef>
+              <a:fillRef idx="1">
+                <a:schemeClr val="lt1"/>
+              </a:fillRef>
+              <a:effectRef idx="0">
+                <a:schemeClr val="accent6"/>
+              </a:effectRef>
+              <a:fontRef idx="minor">
+                <a:schemeClr val="dk1"/>
+              </a:fontRef>
+            </p:style>
+            <p:txBody>
+              <a:bodyPr rtlCol="0" anchor="ctr"/>
+              <a:lstStyle/>
+              <a:p>
+                <a:pPr algn="ctr"/>
+                <a:endParaRPr lang="en-US"/>
+              </a:p>
+            </p:txBody>
+          </p:sp>
+          <p:sp>
+            <p:nvSpPr>
+              <p:cNvPr id="18" name="Multiply 17"/>
+              <p:cNvSpPr/>
+              <p:nvPr/>
+            </p:nvSpPr>
+            <p:spPr>
+              <a:xfrm>
+                <a:off x="3214678" y="1357298"/>
+                <a:ext cx="500066" cy="500066"/>
+              </a:xfrm>
+              <a:prstGeom prst="mathMultiply">
+                <a:avLst/>
+              </a:prstGeom>
+            </p:spPr>
+            <p:style>
+              <a:lnRef idx="2">
+                <a:schemeClr val="accent6"/>
+              </a:lnRef>
+              <a:fillRef idx="1">
+                <a:schemeClr val="lt1"/>
+              </a:fillRef>
+              <a:effectRef idx="0">
+                <a:schemeClr val="accent6"/>
+              </a:effectRef>
+              <a:fontRef idx="minor">
+                <a:schemeClr val="dk1"/>
+              </a:fontRef>
+            </p:style>
+            <p:txBody>
+              <a:bodyPr rtlCol="0" anchor="ctr"/>
+              <a:lstStyle/>
+              <a:p>
+                <a:pPr algn="ctr"/>
+                <a:endParaRPr lang="en-US"/>
+              </a:p>
+            </p:txBody>
+          </p:sp>
+        </p:grpSp>
+        <p:sp>
+          <p:nvSpPr>
+            <p:cNvPr id="123" name="Isosceles Triangle 122"/>
+            <p:cNvSpPr/>
+            <p:nvPr/>
+          </p:nvSpPr>
+          <p:spPr>
+            <a:xfrm>
+              <a:off x="571472" y="357166"/>
+              <a:ext cx="357190" cy="357190"/>
+            </a:xfrm>
+            <a:prstGeom prst="triangle">
+              <a:avLst/>
+            </a:prstGeom>
+          </p:spPr>
+          <p:style>
+            <a:lnRef idx="2">
+              <a:schemeClr val="accent2"/>
+            </a:lnRef>
+            <a:fillRef idx="1">
+              <a:schemeClr val="lt1"/>
+            </a:fillRef>
+            <a:effectRef idx="0">
+              <a:schemeClr val="accent2"/>
+            </a:effectRef>
+            <a:fontRef idx="minor">
+              <a:schemeClr val="dk1"/>
+            </a:fontRef>
+          </p:style>
+          <p:txBody>
+            <a:bodyPr rtlCol="0" anchor="ctr"/>
+            <a:lstStyle/>
+            <a:p>
+              <a:pPr algn="ctr"/>
+              <a:endParaRPr lang="en-US"/>
+            </a:p>
+          </p:txBody>
+        </p:sp>
+        <p:sp>
+          <p:nvSpPr>
+            <p:cNvPr id="124" name="Isosceles Triangle 123"/>
+            <p:cNvSpPr/>
+            <p:nvPr/>
+          </p:nvSpPr>
+          <p:spPr>
+            <a:xfrm>
+              <a:off x="3786182" y="357166"/>
+              <a:ext cx="357190" cy="357190"/>
+            </a:xfrm>
+            <a:prstGeom prst="triangle">
+              <a:avLst/>
+            </a:prstGeom>
+          </p:spPr>
+          <p:style>
+            <a:lnRef idx="2">
+              <a:schemeClr val="accent2"/>
+            </a:lnRef>
+            <a:fillRef idx="1">
+              <a:schemeClr val="lt1"/>
+            </a:fillRef>
+            <a:effectRef idx="0">
+              <a:schemeClr val="accent2"/>
+            </a:effectRef>
+            <a:fontRef idx="minor">
+              <a:schemeClr val="dk1"/>
+            </a:fontRef>
+          </p:style>
+          <p:txBody>
+            <a:bodyPr rtlCol="0" anchor="ctr"/>
+            <a:lstStyle/>
+            <a:p>
+              <a:pPr algn="ctr"/>
+              <a:endParaRPr lang="en-US"/>
+            </a:p>
+          </p:txBody>
+        </p:sp>
+      </p:grpSp>
+      <p:grpSp>
+        <p:nvGrpSpPr>
+          <p:cNvPr id="129" name="Group 128"/>
+          <p:cNvGrpSpPr/>
+          <p:nvPr/>
+        </p:nvGrpSpPr>
+        <p:grpSpPr>
+          <a:xfrm>
+            <a:off x="4929190" y="285728"/>
+            <a:ext cx="3714776" cy="3485611"/>
+            <a:chOff x="4929190" y="285728"/>
+            <a:chExt cx="3714776" cy="3485611"/>
+          </a:xfrm>
+        </p:grpSpPr>
+        <p:grpSp>
+          <p:nvGrpSpPr>
+            <p:cNvPr id="90" name="Group 89"/>
+            <p:cNvGrpSpPr/>
+            <p:nvPr/>
+          </p:nvGrpSpPr>
+          <p:grpSpPr>
+            <a:xfrm>
+              <a:off x="5214942" y="285728"/>
+              <a:ext cx="3429024" cy="3485611"/>
+              <a:chOff x="5214942" y="285728"/>
+              <a:chExt cx="3429024" cy="3485611"/>
+            </a:xfrm>
+          </p:grpSpPr>
+          <p:sp>
+            <p:nvSpPr>
+              <p:cNvPr id="9" name="Isosceles Triangle 8"/>
+              <p:cNvSpPr/>
+              <p:nvPr/>
+            </p:nvSpPr>
+            <p:spPr>
+              <a:xfrm rot="10800000">
+                <a:off x="5771932" y="571480"/>
+                <a:ext cx="2872034" cy="3199064"/>
+              </a:xfrm>
+              <a:prstGeom prst="triangle">
+                <a:avLst>
+                  <a:gd name="adj" fmla="val 90429"/>
+                </a:avLst>
+              </a:prstGeom>
+              <a:noFill/>
+            </p:spPr>
+            <p:style>
+              <a:lnRef idx="2">
+                <a:schemeClr val="accent1">
+                  <a:shade val="50000"/>
+                </a:schemeClr>
+              </a:lnRef>
+              <a:fillRef idx="1">
+                <a:schemeClr val="accent1"/>
+              </a:fillRef>
+              <a:effectRef idx="0">
+                <a:schemeClr val="accent1"/>
+              </a:effectRef>
+              <a:fontRef idx="minor">
+                <a:schemeClr val="lt1"/>
+              </a:fontRef>
+            </p:style>
+            <p:txBody>
+              <a:bodyPr rtlCol="0" anchor="ctr"/>
+              <a:lstStyle/>
+              <a:p>
+                <a:pPr algn="ctr"/>
+                <a:endParaRPr lang="en-US"/>
+              </a:p>
+            </p:txBody>
+          </p:sp>
+          <p:cxnSp>
+            <p:nvCxnSpPr>
+              <p:cNvPr id="10" name="Straight Connector 9"/>
+              <p:cNvCxnSpPr/>
+              <p:nvPr/>
+            </p:nvCxnSpPr>
+            <p:spPr>
+              <a:xfrm>
+                <a:off x="5898061" y="1860919"/>
+                <a:ext cx="1733124" cy="0"/>
+              </a:xfrm>
+              <a:prstGeom prst="line">
+                <a:avLst/>
+              </a:prstGeom>
+              <a:ln>
+                <a:solidFill>
+                  <a:srgbClr val="FF0000"/>
+                </a:solidFill>
+              </a:ln>
+            </p:spPr>
+            <p:style>
+              <a:lnRef idx="1">
+                <a:schemeClr val="accent1"/>
+              </a:lnRef>
+              <a:fillRef idx="0">
+                <a:schemeClr val="accent1"/>
+              </a:fillRef>
+              <a:effectRef idx="0">
+                <a:schemeClr val="accent1"/>
+              </a:effectRef>
+              <a:fontRef idx="minor">
+                <a:schemeClr val="tx1"/>
+              </a:fontRef>
+            </p:style>
+          </p:cxnSp>
+          <p:sp>
+            <p:nvSpPr>
+              <p:cNvPr id="21" name="Multiply 20"/>
+              <p:cNvSpPr/>
+              <p:nvPr/>
+            </p:nvSpPr>
+            <p:spPr>
+              <a:xfrm>
+                <a:off x="5214942" y="285728"/>
+                <a:ext cx="500066" cy="500066"/>
+              </a:xfrm>
+              <a:prstGeom prst="mathMultiply">
+                <a:avLst/>
+              </a:prstGeom>
+            </p:spPr>
+            <p:style>
+              <a:lnRef idx="2">
+                <a:schemeClr val="accent6"/>
+              </a:lnRef>
+              <a:fillRef idx="1">
+                <a:schemeClr val="lt1"/>
+              </a:fillRef>
+              <a:effectRef idx="0">
+                <a:schemeClr val="accent6"/>
+              </a:effectRef>
+              <a:fontRef idx="minor">
+                <a:schemeClr val="dk1"/>
+              </a:fontRef>
+            </p:style>
+            <p:txBody>
+              <a:bodyPr rtlCol="0" anchor="ctr"/>
+              <a:lstStyle/>
+              <a:p>
+                <a:pPr algn="ctr"/>
+                <a:endParaRPr lang="en-US"/>
+              </a:p>
+            </p:txBody>
+          </p:sp>
+          <p:sp>
+            <p:nvSpPr>
+              <p:cNvPr id="22" name="Multiply 21"/>
+              <p:cNvSpPr/>
+              <p:nvPr/>
+            </p:nvSpPr>
+            <p:spPr>
+              <a:xfrm>
+                <a:off x="5572132" y="285728"/>
+                <a:ext cx="500066" cy="500066"/>
+              </a:xfrm>
+              <a:prstGeom prst="mathMultiply">
+                <a:avLst/>
+              </a:prstGeom>
+            </p:spPr>
+            <p:style>
+              <a:lnRef idx="2">
+                <a:schemeClr val="accent6"/>
+              </a:lnRef>
+              <a:fillRef idx="1">
+                <a:schemeClr val="lt1"/>
+              </a:fillRef>
+              <a:effectRef idx="0">
+                <a:schemeClr val="accent6"/>
+              </a:effectRef>
+              <a:fontRef idx="minor">
+                <a:schemeClr val="dk1"/>
+              </a:fontRef>
+            </p:style>
+            <p:txBody>
+              <a:bodyPr rtlCol="0" anchor="ctr"/>
+              <a:lstStyle/>
+              <a:p>
+                <a:pPr algn="ctr"/>
+                <a:endParaRPr lang="en-US"/>
+              </a:p>
+            </p:txBody>
+          </p:sp>
+          <p:sp>
+            <p:nvSpPr>
+              <p:cNvPr id="23" name="Multiply 22"/>
+              <p:cNvSpPr/>
+              <p:nvPr/>
+            </p:nvSpPr>
+            <p:spPr>
+              <a:xfrm>
+                <a:off x="5929322" y="285728"/>
+                <a:ext cx="500066" cy="500066"/>
+              </a:xfrm>
+              <a:prstGeom prst="mathMultiply">
+                <a:avLst/>
+              </a:prstGeom>
+            </p:spPr>
+            <p:style>
+              <a:lnRef idx="2">
+                <a:schemeClr val="accent6"/>
+              </a:lnRef>
+              <a:fillRef idx="1">
+                <a:schemeClr val="lt1"/>
+              </a:fillRef>
+              <a:effectRef idx="0">
+                <a:schemeClr val="accent6"/>
+              </a:effectRef>
+              <a:fontRef idx="minor">
+                <a:schemeClr val="dk1"/>
+              </a:fontRef>
+            </p:style>
+            <p:txBody>
+              <a:bodyPr rtlCol="0" anchor="ctr"/>
+              <a:lstStyle/>
+              <a:p>
+                <a:pPr algn="ctr"/>
+                <a:endParaRPr lang="en-US"/>
+              </a:p>
+            </p:txBody>
+          </p:sp>
+          <p:sp>
+            <p:nvSpPr>
+              <p:cNvPr id="24" name="Multiply 23"/>
+              <p:cNvSpPr/>
+              <p:nvPr/>
+            </p:nvSpPr>
+            <p:spPr>
+              <a:xfrm>
+                <a:off x="6286512" y="285728"/>
+                <a:ext cx="500066" cy="500066"/>
+              </a:xfrm>
+              <a:prstGeom prst="mathMultiply">
+                <a:avLst/>
+              </a:prstGeom>
+            </p:spPr>
+            <p:style>
+              <a:lnRef idx="2">
+                <a:schemeClr val="accent6"/>
+              </a:lnRef>
+              <a:fillRef idx="1">
+                <a:schemeClr val="lt1"/>
+              </a:fillRef>
+              <a:effectRef idx="0">
+                <a:schemeClr val="accent6"/>
+              </a:effectRef>
+              <a:fontRef idx="minor">
+                <a:schemeClr val="dk1"/>
+              </a:fontRef>
+            </p:style>
+            <p:txBody>
+              <a:bodyPr rtlCol="0" anchor="ctr"/>
+              <a:lstStyle/>
+              <a:p>
+                <a:pPr algn="ctr"/>
+                <a:endParaRPr lang="en-US"/>
+              </a:p>
+            </p:txBody>
+          </p:sp>
+          <p:sp>
+            <p:nvSpPr>
+              <p:cNvPr id="25" name="Multiply 24"/>
+              <p:cNvSpPr/>
+              <p:nvPr/>
+            </p:nvSpPr>
+            <p:spPr>
+              <a:xfrm>
+                <a:off x="6643702" y="285728"/>
+                <a:ext cx="500066" cy="500066"/>
+              </a:xfrm>
+              <a:prstGeom prst="mathMultiply">
+                <a:avLst/>
+              </a:prstGeom>
+            </p:spPr>
+            <p:style>
+              <a:lnRef idx="2">
+                <a:schemeClr val="accent6"/>
+              </a:lnRef>
+              <a:fillRef idx="1">
+                <a:schemeClr val="lt1"/>
+              </a:fillRef>
+              <a:effectRef idx="0">
+                <a:schemeClr val="accent6"/>
+              </a:effectRef>
+              <a:fontRef idx="minor">
+                <a:schemeClr val="dk1"/>
+              </a:fontRef>
+            </p:style>
+            <p:txBody>
+              <a:bodyPr rtlCol="0" anchor="ctr"/>
+              <a:lstStyle/>
+              <a:p>
+                <a:pPr algn="ctr"/>
+                <a:endParaRPr lang="en-US"/>
+              </a:p>
+            </p:txBody>
+          </p:sp>
+          <p:sp>
+            <p:nvSpPr>
+              <p:cNvPr id="26" name="Multiply 25"/>
+              <p:cNvSpPr/>
+              <p:nvPr/>
+            </p:nvSpPr>
+            <p:spPr>
+              <a:xfrm>
+                <a:off x="7000892" y="285728"/>
+                <a:ext cx="500066" cy="500066"/>
+              </a:xfrm>
+              <a:prstGeom prst="mathMultiply">
+                <a:avLst/>
+              </a:prstGeom>
+            </p:spPr>
+            <p:style>
+              <a:lnRef idx="2">
+                <a:schemeClr val="accent6"/>
+              </a:lnRef>
+              <a:fillRef idx="1">
+                <a:schemeClr val="lt1"/>
+              </a:fillRef>
+              <a:effectRef idx="0">
+                <a:schemeClr val="accent6"/>
+              </a:effectRef>
+              <a:fontRef idx="minor">
+                <a:schemeClr val="dk1"/>
+              </a:fontRef>
+            </p:style>
+            <p:txBody>
+              <a:bodyPr rtlCol="0" anchor="ctr"/>
+              <a:lstStyle/>
+              <a:p>
+                <a:pPr algn="ctr"/>
+                <a:endParaRPr lang="en-US"/>
+              </a:p>
+            </p:txBody>
+          </p:sp>
+          <p:sp>
+            <p:nvSpPr>
+              <p:cNvPr id="27" name="Multiply 26"/>
+              <p:cNvSpPr/>
+              <p:nvPr/>
+            </p:nvSpPr>
+            <p:spPr>
+              <a:xfrm>
+                <a:off x="7358082" y="285728"/>
+                <a:ext cx="500066" cy="500066"/>
+              </a:xfrm>
+              <a:prstGeom prst="mathMultiply">
+                <a:avLst/>
+              </a:prstGeom>
+            </p:spPr>
+            <p:style>
+              <a:lnRef idx="2">
+                <a:schemeClr val="accent6"/>
+              </a:lnRef>
+              <a:fillRef idx="1">
+                <a:schemeClr val="lt1"/>
+              </a:fillRef>
+              <a:effectRef idx="0">
+                <a:schemeClr val="accent6"/>
+              </a:effectRef>
+              <a:fontRef idx="minor">
+                <a:schemeClr val="dk1"/>
+              </a:fontRef>
+            </p:style>
+            <p:txBody>
+              <a:bodyPr rtlCol="0" anchor="ctr"/>
+              <a:lstStyle/>
+              <a:p>
+                <a:pPr algn="ctr"/>
+                <a:endParaRPr lang="en-US"/>
+              </a:p>
+            </p:txBody>
+          </p:sp>
+          <p:sp>
+            <p:nvSpPr>
+              <p:cNvPr id="28" name="Multiply 27"/>
+              <p:cNvSpPr/>
+              <p:nvPr/>
+            </p:nvSpPr>
+            <p:spPr>
+              <a:xfrm>
+                <a:off x="7715272" y="285728"/>
+                <a:ext cx="500066" cy="500066"/>
+              </a:xfrm>
+              <a:prstGeom prst="mathMultiply">
+                <a:avLst/>
+              </a:prstGeom>
+            </p:spPr>
+            <p:style>
+              <a:lnRef idx="2">
+                <a:schemeClr val="accent6"/>
+              </a:lnRef>
+              <a:fillRef idx="1">
+                <a:schemeClr val="lt1"/>
+              </a:fillRef>
+              <a:effectRef idx="0">
+                <a:schemeClr val="accent6"/>
+              </a:effectRef>
+              <a:fontRef idx="minor">
+                <a:schemeClr val="dk1"/>
+              </a:fontRef>
+            </p:style>
+            <p:txBody>
+              <a:bodyPr rtlCol="0" anchor="ctr"/>
+              <a:lstStyle/>
+              <a:p>
+                <a:pPr algn="ctr"/>
+                <a:endParaRPr lang="en-US"/>
+              </a:p>
+            </p:txBody>
+          </p:sp>
+          <p:cxnSp>
+            <p:nvCxnSpPr>
+              <p:cNvPr id="62" name="Straight Arrow Connector 61"/>
+              <p:cNvCxnSpPr>
+                <a:stCxn id="77" idx="0"/>
+                <a:endCxn id="9" idx="0"/>
+              </p:cNvCxnSpPr>
+              <p:nvPr/>
+            </p:nvCxnSpPr>
+            <p:spPr>
+              <a:xfrm rot="5400000">
+                <a:off x="6384606" y="3432753"/>
+                <a:ext cx="1588" cy="675583"/>
+              </a:xfrm>
+              <a:prstGeom prst="straightConnector1">
+                <a:avLst/>
+              </a:prstGeom>
+              <a:ln w="38100">
+                <a:solidFill>
+                  <a:schemeClr val="tx1"/>
+                </a:solidFill>
+                <a:prstDash val="sysDot"/>
+                <a:headEnd type="oval"/>
+                <a:tailEnd type="triangle"/>
+              </a:ln>
+            </p:spPr>
+            <p:style>
+              <a:lnRef idx="1">
+                <a:schemeClr val="accent1"/>
+              </a:lnRef>
+              <a:fillRef idx="0">
+                <a:schemeClr val="accent1"/>
+              </a:fillRef>
+              <a:effectRef idx="0">
+                <a:schemeClr val="accent1"/>
+              </a:effectRef>
+              <a:fontRef idx="minor">
+                <a:schemeClr val="tx1"/>
+              </a:fontRef>
+            </p:style>
+          </p:cxnSp>
+        </p:grpSp>
+        <p:sp>
+          <p:nvSpPr>
+            <p:cNvPr id="125" name="Isosceles Triangle 124"/>
+            <p:cNvSpPr/>
+            <p:nvPr/>
+          </p:nvSpPr>
+          <p:spPr>
+            <a:xfrm>
+              <a:off x="4929190" y="357166"/>
+              <a:ext cx="357190" cy="357190"/>
+            </a:xfrm>
+            <a:prstGeom prst="triangle">
+              <a:avLst/>
+            </a:prstGeom>
+          </p:spPr>
+          <p:style>
+            <a:lnRef idx="2">
+              <a:schemeClr val="accent2"/>
+            </a:lnRef>
+            <a:fillRef idx="1">
+              <a:schemeClr val="lt1"/>
+            </a:fillRef>
+            <a:effectRef idx="0">
+              <a:schemeClr val="accent2"/>
+            </a:effectRef>
+            <a:fontRef idx="minor">
+              <a:schemeClr val="dk1"/>
+            </a:fontRef>
+          </p:style>
+          <p:txBody>
+            <a:bodyPr rtlCol="0" anchor="ctr"/>
+            <a:lstStyle/>
+            <a:p>
+              <a:pPr algn="ctr"/>
+              <a:endParaRPr lang="en-US"/>
+            </a:p>
+          </p:txBody>
+        </p:sp>
+        <p:sp>
+          <p:nvSpPr>
+            <p:cNvPr id="126" name="Isosceles Triangle 125"/>
+            <p:cNvSpPr/>
+            <p:nvPr/>
+          </p:nvSpPr>
+          <p:spPr>
+            <a:xfrm>
+              <a:off x="8143900" y="357166"/>
+              <a:ext cx="357190" cy="357190"/>
+            </a:xfrm>
+            <a:prstGeom prst="triangle">
+              <a:avLst/>
+            </a:prstGeom>
+          </p:spPr>
+          <p:style>
+            <a:lnRef idx="2">
+              <a:schemeClr val="accent2"/>
+            </a:lnRef>
+            <a:fillRef idx="1">
+              <a:schemeClr val="lt1"/>
+            </a:fillRef>
+            <a:effectRef idx="0">
+              <a:schemeClr val="accent2"/>
+            </a:effectRef>
+            <a:fontRef idx="minor">
+              <a:schemeClr val="dk1"/>
+            </a:fontRef>
+          </p:style>
+          <p:txBody>
+            <a:bodyPr rtlCol="0" anchor="ctr"/>
+            <a:lstStyle/>
+            <a:p>
+              <a:pPr algn="ctr"/>
+              <a:endParaRPr lang="en-US"/>
+            </a:p>
+          </p:txBody>
+        </p:sp>
+      </p:grpSp>
+      <p:grpSp>
+        <p:nvGrpSpPr>
+          <p:cNvPr id="128" name="Group 127"/>
+          <p:cNvGrpSpPr/>
+          <p:nvPr/>
+        </p:nvGrpSpPr>
+        <p:grpSpPr>
+          <a:xfrm>
+            <a:off x="5757418" y="4643446"/>
+            <a:ext cx="1848816" cy="1071570"/>
+            <a:chOff x="5757418" y="4643446"/>
+            <a:chExt cx="1848816" cy="1071570"/>
+          </a:xfrm>
+        </p:grpSpPr>
+        <p:grpSp>
+          <p:nvGrpSpPr>
+            <p:cNvPr id="120" name="Group 119"/>
+            <p:cNvGrpSpPr/>
+            <p:nvPr/>
+          </p:nvGrpSpPr>
+          <p:grpSpPr>
+            <a:xfrm>
+              <a:off x="5757418" y="4643446"/>
+              <a:ext cx="1848816" cy="1071570"/>
+              <a:chOff x="5205416" y="4500570"/>
+              <a:chExt cx="3081360" cy="1785950"/>
+            </a:xfrm>
+          </p:grpSpPr>
+          <p:grpSp>
+            <p:nvGrpSpPr>
+              <p:cNvPr id="118" name="Group 117"/>
+              <p:cNvGrpSpPr/>
+              <p:nvPr/>
+            </p:nvGrpSpPr>
+            <p:grpSpPr>
+              <a:xfrm>
+                <a:off x="5205416" y="5143512"/>
+                <a:ext cx="509592" cy="500066"/>
+                <a:chOff x="5205416" y="5143512"/>
+                <a:chExt cx="509592" cy="500066"/>
+              </a:xfrm>
+            </p:grpSpPr>
+            <p:sp>
+              <p:nvSpPr>
+                <p:cNvPr id="107" name="Multiply 106"/>
+                <p:cNvSpPr/>
+                <p:nvPr/>
+              </p:nvSpPr>
+              <p:spPr>
+                <a:xfrm>
+                  <a:off x="5214942" y="5143512"/>
+                  <a:ext cx="500066" cy="500066"/>
+                </a:xfrm>
+                <a:prstGeom prst="mathMultiply">
+                  <a:avLst/>
+                </a:prstGeom>
+              </p:spPr>
+              <p:style>
+                <a:lnRef idx="2">
+                  <a:schemeClr val="accent6"/>
+                </a:lnRef>
+                <a:fillRef idx="1">
+                  <a:schemeClr val="lt1"/>
+                </a:fillRef>
+                <a:effectRef idx="0">
+                  <a:schemeClr val="accent6"/>
+                </a:effectRef>
+                <a:fontRef idx="minor">
+                  <a:schemeClr val="dk1"/>
+                </a:fontRef>
+              </p:style>
+              <p:txBody>
+                <a:bodyPr rtlCol="0" anchor="ctr"/>
+                <a:lstStyle/>
+                <a:p>
+                  <a:pPr algn="ctr"/>
+                  <a:endParaRPr lang="en-US"/>
+                </a:p>
+              </p:txBody>
+            </p:sp>
+            <p:sp>
+              <p:nvSpPr>
+                <p:cNvPr id="117" name="Rectangle 116"/>
+                <p:cNvSpPr/>
+                <p:nvPr/>
+              </p:nvSpPr>
+              <p:spPr>
+                <a:xfrm>
+                  <a:off x="5205416" y="5143512"/>
+                  <a:ext cx="214314" cy="500066"/>
+                </a:xfrm>
+                <a:prstGeom prst="rect">
+                  <a:avLst/>
+                </a:prstGeom>
+                <a:solidFill>
+                  <a:schemeClr val="bg1"/>
+                </a:solidFill>
+                <a:ln>
+                  <a:noFill/>
+                </a:ln>
+              </p:spPr>
+              <p:style>
+                <a:lnRef idx="2">
+                  <a:schemeClr val="accent1">
+                    <a:shade val="50000"/>
+                  </a:schemeClr>
+                </a:lnRef>
+                <a:fillRef idx="1">
+                  <a:schemeClr val="accent1"/>
+                </a:fillRef>
+                <a:effectRef idx="0">
+                  <a:schemeClr val="accent1"/>
+                </a:effectRef>
+                <a:fontRef idx="minor">
+                  <a:schemeClr val="lt1"/>
+                </a:fontRef>
+              </p:style>
+              <p:txBody>
+                <a:bodyPr rtlCol="0" anchor="ctr"/>
+                <a:lstStyle/>
+                <a:p>
+                  <a:pPr algn="ctr"/>
+                  <a:endParaRPr lang="en-US"/>
+                </a:p>
+              </p:txBody>
+            </p:sp>
+          </p:grpSp>
+          <p:sp>
+            <p:nvSpPr>
+              <p:cNvPr id="108" name="Multiply 107"/>
+              <p:cNvSpPr/>
+              <p:nvPr/>
+            </p:nvSpPr>
+            <p:spPr>
+              <a:xfrm>
+                <a:off x="5572132" y="5143512"/>
+                <a:ext cx="500066" cy="500066"/>
+              </a:xfrm>
+              <a:prstGeom prst="mathMultiply">
+                <a:avLst/>
+              </a:prstGeom>
+            </p:spPr>
+            <p:style>
+              <a:lnRef idx="2">
+                <a:schemeClr val="accent6"/>
+              </a:lnRef>
+              <a:fillRef idx="1">
+                <a:schemeClr val="lt1"/>
+              </a:fillRef>
+              <a:effectRef idx="0">
+                <a:schemeClr val="accent6"/>
+              </a:effectRef>
+              <a:fontRef idx="minor">
+                <a:schemeClr val="dk1"/>
+              </a:fontRef>
+            </p:style>
+            <p:txBody>
+              <a:bodyPr rtlCol="0" anchor="ctr"/>
+              <a:lstStyle/>
+              <a:p>
+                <a:pPr algn="ctr"/>
+                <a:endParaRPr lang="en-US"/>
+              </a:p>
+            </p:txBody>
+          </p:sp>
+          <p:sp>
+            <p:nvSpPr>
+              <p:cNvPr id="109" name="Multiply 108"/>
+              <p:cNvSpPr/>
+              <p:nvPr/>
+            </p:nvSpPr>
+            <p:spPr>
+              <a:xfrm>
+                <a:off x="5929322" y="5143512"/>
+                <a:ext cx="500066" cy="500066"/>
+              </a:xfrm>
+              <a:prstGeom prst="mathMultiply">
+                <a:avLst/>
+              </a:prstGeom>
+            </p:spPr>
+            <p:style>
+              <a:lnRef idx="2">
+                <a:schemeClr val="accent6"/>
+              </a:lnRef>
+              <a:fillRef idx="1">
+                <a:schemeClr val="lt1"/>
+              </a:fillRef>
+              <a:effectRef idx="0">
+                <a:schemeClr val="accent6"/>
+              </a:effectRef>
+              <a:fontRef idx="minor">
+                <a:schemeClr val="dk1"/>
+              </a:fontRef>
+            </p:style>
+            <p:txBody>
+              <a:bodyPr rtlCol="0" anchor="ctr"/>
+              <a:lstStyle/>
+              <a:p>
+                <a:pPr algn="ctr"/>
+                <a:endParaRPr lang="en-US"/>
+              </a:p>
+            </p:txBody>
+          </p:sp>
+          <p:sp>
+            <p:nvSpPr>
+              <p:cNvPr id="110" name="Multiply 109"/>
+              <p:cNvSpPr/>
+              <p:nvPr/>
+            </p:nvSpPr>
+            <p:spPr>
+              <a:xfrm>
+                <a:off x="6286512" y="5143512"/>
+                <a:ext cx="500066" cy="500066"/>
+              </a:xfrm>
+              <a:prstGeom prst="mathMultiply">
+                <a:avLst/>
+              </a:prstGeom>
+            </p:spPr>
+            <p:style>
+              <a:lnRef idx="2">
+                <a:schemeClr val="accent6"/>
+              </a:lnRef>
+              <a:fillRef idx="1">
+                <a:schemeClr val="lt1"/>
+              </a:fillRef>
+              <a:effectRef idx="0">
+                <a:schemeClr val="accent6"/>
+              </a:effectRef>
+              <a:fontRef idx="minor">
+                <a:schemeClr val="dk1"/>
+              </a:fontRef>
+            </p:style>
+            <p:txBody>
+              <a:bodyPr rtlCol="0" anchor="ctr"/>
+              <a:lstStyle/>
+              <a:p>
+                <a:pPr algn="ctr"/>
+                <a:endParaRPr lang="en-US"/>
+              </a:p>
+            </p:txBody>
+          </p:sp>
+          <p:sp>
+            <p:nvSpPr>
+              <p:cNvPr id="111" name="Multiply 110"/>
+              <p:cNvSpPr/>
+              <p:nvPr/>
+            </p:nvSpPr>
+            <p:spPr>
+              <a:xfrm>
+                <a:off x="6643702" y="5143512"/>
+                <a:ext cx="500066" cy="500066"/>
+              </a:xfrm>
+              <a:prstGeom prst="mathMultiply">
+                <a:avLst/>
+              </a:prstGeom>
+            </p:spPr>
+            <p:style>
+              <a:lnRef idx="2">
+                <a:schemeClr val="accent6"/>
+              </a:lnRef>
+              <a:fillRef idx="1">
+                <a:schemeClr val="lt1"/>
+              </a:fillRef>
+              <a:effectRef idx="0">
+                <a:schemeClr val="accent6"/>
+              </a:effectRef>
+              <a:fontRef idx="minor">
+                <a:schemeClr val="dk1"/>
+              </a:fontRef>
+            </p:style>
+            <p:txBody>
+              <a:bodyPr rtlCol="0" anchor="ctr"/>
+              <a:lstStyle/>
+              <a:p>
+                <a:pPr algn="ctr"/>
+                <a:endParaRPr lang="en-US"/>
+              </a:p>
+            </p:txBody>
+          </p:sp>
+          <p:sp>
+            <p:nvSpPr>
+              <p:cNvPr id="112" name="Multiply 111"/>
+              <p:cNvSpPr/>
+              <p:nvPr/>
+            </p:nvSpPr>
+            <p:spPr>
+              <a:xfrm>
+                <a:off x="7000892" y="5143512"/>
+                <a:ext cx="500066" cy="500066"/>
+              </a:xfrm>
+              <a:prstGeom prst="mathMultiply">
+                <a:avLst/>
+              </a:prstGeom>
+            </p:spPr>
+            <p:style>
+              <a:lnRef idx="2">
+                <a:schemeClr val="accent6"/>
+              </a:lnRef>
+              <a:fillRef idx="1">
+                <a:schemeClr val="lt1"/>
+              </a:fillRef>
+              <a:effectRef idx="0">
+                <a:schemeClr val="accent6"/>
+              </a:effectRef>
+              <a:fontRef idx="minor">
+                <a:schemeClr val="dk1"/>
+              </a:fontRef>
+            </p:style>
+            <p:txBody>
+              <a:bodyPr rtlCol="0" anchor="ctr"/>
+              <a:lstStyle/>
+              <a:p>
+                <a:pPr algn="ctr"/>
+                <a:endParaRPr lang="en-US"/>
+              </a:p>
+            </p:txBody>
+          </p:sp>
+          <p:sp>
+            <p:nvSpPr>
+              <p:cNvPr id="113" name="Multiply 112"/>
+              <p:cNvSpPr/>
+              <p:nvPr/>
+            </p:nvSpPr>
+            <p:spPr>
+              <a:xfrm>
+                <a:off x="7358082" y="5143512"/>
+                <a:ext cx="500066" cy="500066"/>
+              </a:xfrm>
+              <a:prstGeom prst="mathMultiply">
+                <a:avLst/>
+              </a:prstGeom>
+            </p:spPr>
+            <p:style>
+              <a:lnRef idx="2">
+                <a:schemeClr val="accent6"/>
+              </a:lnRef>
+              <a:fillRef idx="1">
+                <a:schemeClr val="lt1"/>
+              </a:fillRef>
+              <a:effectRef idx="0">
+                <a:schemeClr val="accent6"/>
+              </a:effectRef>
+              <a:fontRef idx="minor">
+                <a:schemeClr val="dk1"/>
+              </a:fontRef>
+            </p:style>
+            <p:txBody>
+              <a:bodyPr rtlCol="0" anchor="ctr"/>
+              <a:lstStyle/>
+              <a:p>
+                <a:pPr algn="ctr"/>
+                <a:endParaRPr lang="en-US"/>
+              </a:p>
+            </p:txBody>
+          </p:sp>
+          <p:sp>
+            <p:nvSpPr>
+              <p:cNvPr id="116" name="Rectangle 115"/>
+              <p:cNvSpPr/>
+              <p:nvPr/>
+            </p:nvSpPr>
+            <p:spPr>
+              <a:xfrm>
+                <a:off x="5429256" y="4500570"/>
+                <a:ext cx="2857520" cy="1785950"/>
+              </a:xfrm>
+              <a:prstGeom prst="rect">
+                <a:avLst/>
+              </a:prstGeom>
+              <a:noFill/>
+            </p:spPr>
+            <p:style>
+              <a:lnRef idx="2">
+                <a:schemeClr val="accent1"/>
+              </a:lnRef>
+              <a:fillRef idx="1">
+                <a:schemeClr val="lt1"/>
+              </a:fillRef>
+              <a:effectRef idx="0">
+                <a:schemeClr val="accent1"/>
+              </a:effectRef>
+              <a:fontRef idx="minor">
+                <a:schemeClr val="dk1"/>
+              </a:fontRef>
+            </p:style>
+            <p:txBody>
+              <a:bodyPr rtlCol="0" anchor="ctr"/>
+              <a:lstStyle/>
+              <a:p>
+                <a:pPr algn="ctr"/>
+                <a:endParaRPr lang="en-US"/>
+              </a:p>
+            </p:txBody>
+          </p:sp>
+        </p:grpSp>
+        <p:sp>
+          <p:nvSpPr>
+            <p:cNvPr id="127" name="Isosceles Triangle 126"/>
+            <p:cNvSpPr/>
+            <p:nvPr/>
+          </p:nvSpPr>
+          <p:spPr>
+            <a:xfrm>
+              <a:off x="7286644" y="5072074"/>
+              <a:ext cx="214314" cy="214314"/>
+            </a:xfrm>
+            <a:prstGeom prst="triangle">
+              <a:avLst/>
+            </a:prstGeom>
+          </p:spPr>
+          <p:style>
+            <a:lnRef idx="2">
+              <a:schemeClr val="accent2"/>
+            </a:lnRef>
+            <a:fillRef idx="1">
+              <a:schemeClr val="lt1"/>
+            </a:fillRef>
+            <a:effectRef idx="0">
+              <a:schemeClr val="accent2"/>
+            </a:effectRef>
+            <a:fontRef idx="minor">
+              <a:schemeClr val="dk1"/>
+            </a:fontRef>
+          </p:style>
+          <p:txBody>
+            <a:bodyPr rtlCol="0" anchor="ctr"/>
+            <a:lstStyle/>
+            <a:p>
+              <a:pPr algn="ctr"/>
+              <a:endParaRPr lang="en-US"/>
+            </a:p>
+          </p:txBody>
+        </p:sp>
+      </p:grpSp>
+      <p:sp>
+        <p:nvSpPr>
+          <p:cNvPr id="131" name="TextBox 130"/>
+          <p:cNvSpPr txBox="1"/>
+          <p:nvPr/>
+        </p:nvSpPr>
+        <p:spPr>
+          <a:xfrm>
+            <a:off x="5214942" y="3857628"/>
+            <a:ext cx="2658052" cy="369332"/>
+          </a:xfrm>
+          <a:prstGeom prst="rect">
+            <a:avLst/>
+          </a:prstGeom>
+          <a:noFill/>
+        </p:spPr>
+        <p:txBody>
+          <a:bodyPr wrap="square" rtlCol="0">
+            <a:spAutoFit/>
+          </a:bodyPr>
+          <a:lstStyle/>
+          <a:p>
+            <a:r>
+              <a:rPr lang="es-ES" dirty="0" err="1" smtClean="0"/>
+              <a:t>desplazamientoHorizontal</a:t>
+            </a:r>
+            <a:endParaRPr lang="en-US" dirty="0"/>
+          </a:p>
+        </p:txBody>
+      </p:sp>
+    </p:spTree>
+  </p:cSld>
+  <p:clrMapOvr>
+    <a:masterClrMapping/>
+  </p:clrMapOvr>
+</p:sld>
+</file>
+
+<file path=ppt/slides/slide6.xml><?xml version="1.0" encoding="utf-8"?>
+<p:sld xmlns:a="http://schemas.openxmlformats.org/drawingml/2006/main" xmlns:r="http://schemas.openxmlformats.org/officeDocument/2006/relationships" xmlns:p="http://schemas.openxmlformats.org/presentationml/2006/main">
+  <p:cSld>
+    <p:spTree>
+      <p:nvGrpSpPr>
+        <p:cNvPr id="1" name=""/>
+        <p:cNvGrpSpPr/>
+        <p:nvPr/>
+      </p:nvGrpSpPr>
+      <p:grpSpPr>
+        <a:xfrm>
+          <a:off x="0" y="0"/>
+          <a:ext cx="0" cy="0"/>
+          <a:chOff x="0" y="0"/>
+          <a:chExt cx="0" cy="0"/>
+        </a:xfrm>
+      </p:grpSpPr>
+      <p:grpSp>
+        <p:nvGrpSpPr>
+          <p:cNvPr id="6" name="Group 6"/>
+          <p:cNvGrpSpPr/>
+          <p:nvPr/>
+        </p:nvGrpSpPr>
+        <p:grpSpPr>
+          <a:xfrm>
+            <a:off x="285720" y="357166"/>
             <a:ext cx="2872034" cy="3199064"/>
             <a:chOff x="1414214" y="801440"/>
             <a:chExt cx="4143404" cy="4214842"/>
@@ -5433,7 +7578,7 @@
         </p:grpSpPr>
         <p:sp>
           <p:nvSpPr>
-            <p:cNvPr id="6" name="Isosceles Triangle 5"/>
+            <p:cNvPr id="15" name="Isosceles Triangle 5"/>
             <p:cNvSpPr/>
             <p:nvPr/>
           </p:nvSpPr>
@@ -5474,7 +7619,7 @@
         </p:sp>
         <p:cxnSp>
           <p:nvCxnSpPr>
-            <p:cNvPr id="3" name="Straight Connector 2"/>
+            <p:cNvPr id="16" name="Straight Connector 2"/>
             <p:cNvCxnSpPr/>
             <p:nvPr/>
           </p:nvCxnSpPr>
@@ -5510,65 +7655,95 @@
       </p:grpSp>
       <p:sp>
         <p:nvSpPr>
-          <p:cNvPr id="9" name="Isosceles Triangle 8"/>
-          <p:cNvSpPr/>
+          <p:cNvPr id="17" name="TextBox 16"/>
+          <p:cNvSpPr txBox="1"/>
           <p:nvPr/>
         </p:nvSpPr>
         <p:spPr>
-          <a:xfrm rot="10800000">
-            <a:off x="5429256" y="1643050"/>
-            <a:ext cx="2872034" cy="3199064"/>
+          <a:xfrm>
+            <a:off x="3286116" y="1571612"/>
+            <a:ext cx="3190040" cy="954107"/>
           </a:xfrm>
-          <a:prstGeom prst="triangle">
-            <a:avLst>
-              <a:gd name="adj" fmla="val 90429"/>
-            </a:avLst>
+          <a:prstGeom prst="rect">
+            <a:avLst/>
           </a:prstGeom>
           <a:noFill/>
         </p:spPr>
+        <p:txBody>
+          <a:bodyPr wrap="none" rtlCol="0">
+            <a:spAutoFit/>
+          </a:bodyPr>
+          <a:lstStyle/>
+          <a:p>
+            <a:r>
+              <a:rPr lang="es-ES" sz="2800" dirty="0" smtClean="0"/>
+              <a:t>Márgenes ajustados </a:t>
+            </a:r>
+          </a:p>
+          <a:p>
+            <a:r>
+              <a:rPr lang="es-ES" sz="2800" dirty="0" smtClean="0"/>
+              <a:t>a la pantalla</a:t>
+            </a:r>
+            <a:endParaRPr lang="en-US" sz="2800" dirty="0"/>
+          </a:p>
+        </p:txBody>
+      </p:sp>
+      <p:cxnSp>
+        <p:nvCxnSpPr>
+          <p:cNvPr id="19" name="Straight Arrow Connector 18"/>
+          <p:cNvCxnSpPr/>
+          <p:nvPr/>
+        </p:nvCxnSpPr>
+        <p:spPr>
+          <a:xfrm rot="10800000">
+            <a:off x="2643174" y="1643050"/>
+            <a:ext cx="500066" cy="142876"/>
+          </a:xfrm>
+          <a:prstGeom prst="straightConnector1">
+            <a:avLst/>
+          </a:prstGeom>
+          <a:ln w="25400">
+            <a:solidFill>
+              <a:schemeClr val="tx1"/>
+            </a:solidFill>
+            <a:tailEnd type="arrow"/>
+          </a:ln>
+        </p:spPr>
         <p:style>
-          <a:lnRef idx="2">
-            <a:schemeClr val="accent1">
-              <a:shade val="50000"/>
-            </a:schemeClr>
+          <a:lnRef idx="1">
+            <a:schemeClr val="accent1"/>
           </a:lnRef>
-          <a:fillRef idx="1">
+          <a:fillRef idx="0">
             <a:schemeClr val="accent1"/>
           </a:fillRef>
           <a:effectRef idx="0">
             <a:schemeClr val="accent1"/>
           </a:effectRef>
           <a:fontRef idx="minor">
-            <a:schemeClr val="lt1"/>
+            <a:schemeClr val="tx1"/>
           </a:fontRef>
         </p:style>
-        <p:txBody>
-          <a:bodyPr rtlCol="0" anchor="ctr"/>
-          <a:lstStyle/>
-          <a:p>
-            <a:pPr algn="ctr"/>
-            <a:endParaRPr lang="en-US"/>
-          </a:p>
-        </p:txBody>
-      </p:sp>
+      </p:cxnSp>
       <p:cxnSp>
         <p:nvCxnSpPr>
-          <p:cNvPr id="10" name="Straight Connector 9"/>
+          <p:cNvPr id="21" name="Straight Arrow Connector 20"/>
           <p:cNvCxnSpPr/>
           <p:nvPr/>
         </p:nvCxnSpPr>
         <p:spPr>
-          <a:xfrm>
-            <a:off x="5555385" y="2932489"/>
-            <a:ext cx="1733124" cy="0"/>
+          <a:xfrm rot="10800000">
+            <a:off x="928662" y="1714488"/>
+            <a:ext cx="2143140" cy="500066"/>
           </a:xfrm>
-          <a:prstGeom prst="line">
+          <a:prstGeom prst="straightConnector1">
             <a:avLst/>
           </a:prstGeom>
-          <a:ln>
+          <a:ln w="25400">
             <a:solidFill>
-              <a:srgbClr val="FF0000"/>
+              <a:schemeClr val="tx1"/>
             </a:solidFill>
+            <a:tailEnd type="arrow"/>
           </a:ln>
         </p:spPr>
         <p:style>
@@ -5588,764 +7763,559 @@
       </p:cxnSp>
       <p:sp>
         <p:nvSpPr>
-          <p:cNvPr id="11" name="Multiply 10"/>
-          <p:cNvSpPr/>
+          <p:cNvPr id="22" name="TextBox 21"/>
+          <p:cNvSpPr txBox="1"/>
           <p:nvPr/>
         </p:nvSpPr>
         <p:spPr>
           <a:xfrm>
-            <a:off x="714348" y="1357298"/>
-            <a:ext cx="500066" cy="500066"/>
+            <a:off x="3118570" y="642918"/>
+            <a:ext cx="1674817" cy="646331"/>
           </a:xfrm>
-          <a:prstGeom prst="mathMultiply">
+          <a:prstGeom prst="rect">
             <a:avLst/>
           </a:prstGeom>
+          <a:noFill/>
+        </p:spPr>
+        <p:txBody>
+          <a:bodyPr wrap="none" rtlCol="0">
+            <a:spAutoFit/>
+          </a:bodyPr>
+          <a:lstStyle/>
+          <a:p>
+            <a:r>
+              <a:rPr lang="es-ES" sz="3600" dirty="0" smtClean="0">
+                <a:solidFill>
+                  <a:srgbClr val="FF0000"/>
+                </a:solidFill>
+              </a:rPr>
+              <a:t>Pantalla</a:t>
+            </a:r>
+            <a:endParaRPr lang="en-US" sz="3600" dirty="0">
+              <a:solidFill>
+                <a:srgbClr val="FF0000"/>
+              </a:solidFill>
+            </a:endParaRPr>
+          </a:p>
+        </p:txBody>
+      </p:sp>
+      <p:cxnSp>
+        <p:nvCxnSpPr>
+          <p:cNvPr id="23" name="Straight Arrow Connector 22"/>
+          <p:cNvCxnSpPr>
+            <a:stCxn id="22" idx="1"/>
+          </p:cNvCxnSpPr>
+          <p:nvPr/>
+        </p:nvCxnSpPr>
+        <p:spPr>
+          <a:xfrm rot="10800000" flipV="1">
+            <a:off x="1904124" y="966084"/>
+            <a:ext cx="1214446" cy="534090"/>
+          </a:xfrm>
+          <a:prstGeom prst="straightConnector1">
+            <a:avLst/>
+          </a:prstGeom>
+          <a:ln>
+            <a:tailEnd type="arrow"/>
+          </a:ln>
         </p:spPr>
         <p:style>
-          <a:lnRef idx="2">
-            <a:schemeClr val="accent6"/>
+          <a:lnRef idx="1">
+            <a:schemeClr val="accent1"/>
           </a:lnRef>
-          <a:fillRef idx="1">
-            <a:schemeClr val="lt1"/>
+          <a:fillRef idx="0">
+            <a:schemeClr val="accent1"/>
           </a:fillRef>
           <a:effectRef idx="0">
-            <a:schemeClr val="accent6"/>
+            <a:schemeClr val="accent1"/>
           </a:effectRef>
           <a:fontRef idx="minor">
-            <a:schemeClr val="dk1"/>
+            <a:schemeClr val="tx1"/>
           </a:fontRef>
         </p:style>
-        <p:txBody>
-          <a:bodyPr rtlCol="0" anchor="ctr"/>
-          <a:lstStyle/>
-          <a:p>
-            <a:pPr algn="ctr"/>
-            <a:endParaRPr lang="en-US"/>
-          </a:p>
-        </p:txBody>
-      </p:sp>
-      <p:sp>
-        <p:nvSpPr>
-          <p:cNvPr id="12" name="Multiply 11"/>
-          <p:cNvSpPr/>
+      </p:cxnSp>
+    </p:spTree>
+  </p:cSld>
+  <p:clrMapOvr>
+    <a:masterClrMapping/>
+  </p:clrMapOvr>
+</p:sld>
+</file>
+
+<file path=ppt/slides/slide7.xml><?xml version="1.0" encoding="utf-8"?>
+<p:sld xmlns:a="http://schemas.openxmlformats.org/drawingml/2006/main" xmlns:r="http://schemas.openxmlformats.org/officeDocument/2006/relationships" xmlns:p="http://schemas.openxmlformats.org/presentationml/2006/main">
+  <p:cSld>
+    <p:spTree>
+      <p:nvGrpSpPr>
+        <p:cNvPr id="1" name=""/>
+        <p:cNvGrpSpPr/>
+        <p:nvPr/>
+      </p:nvGrpSpPr>
+      <p:grpSpPr>
+        <a:xfrm>
+          <a:off x="0" y="0"/>
+          <a:ext cx="0" cy="0"/>
+          <a:chOff x="0" y="0"/>
+          <a:chExt cx="0" cy="0"/>
+        </a:xfrm>
+      </p:grpSpPr>
+      <p:grpSp>
+        <p:nvGrpSpPr>
+          <p:cNvPr id="27" name="Group 26"/>
+          <p:cNvGrpSpPr/>
           <p:nvPr/>
-        </p:nvSpPr>
-        <p:spPr>
+        </p:nvGrpSpPr>
+        <p:grpSpPr>
           <a:xfrm>
-            <a:off x="1071538" y="1357298"/>
-            <a:ext cx="500066" cy="500066"/>
+            <a:off x="142844" y="-24"/>
+            <a:ext cx="4357718" cy="4214842"/>
+            <a:chOff x="1000100" y="214290"/>
+            <a:chExt cx="4357718" cy="4214842"/>
           </a:xfrm>
-          <a:prstGeom prst="mathMultiply">
-            <a:avLst/>
-          </a:prstGeom>
-        </p:spPr>
-        <p:style>
-          <a:lnRef idx="2">
-            <a:schemeClr val="accent6"/>
-          </a:lnRef>
-          <a:fillRef idx="1">
-            <a:schemeClr val="lt1"/>
-          </a:fillRef>
-          <a:effectRef idx="0">
-            <a:schemeClr val="accent6"/>
-          </a:effectRef>
-          <a:fontRef idx="minor">
-            <a:schemeClr val="dk1"/>
-          </a:fontRef>
-        </p:style>
-        <p:txBody>
-          <a:bodyPr rtlCol="0" anchor="ctr"/>
-          <a:lstStyle/>
-          <a:p>
-            <a:pPr algn="ctr"/>
-            <a:endParaRPr lang="en-US"/>
-          </a:p>
-        </p:txBody>
-      </p:sp>
-      <p:sp>
-        <p:nvSpPr>
-          <p:cNvPr id="13" name="Multiply 12"/>
-          <p:cNvSpPr/>
-          <p:nvPr/>
-        </p:nvSpPr>
-        <p:spPr>
-          <a:xfrm>
-            <a:off x="1428728" y="1357298"/>
-            <a:ext cx="500066" cy="500066"/>
-          </a:xfrm>
-          <a:prstGeom prst="mathMultiply">
-            <a:avLst/>
-          </a:prstGeom>
-        </p:spPr>
-        <p:style>
-          <a:lnRef idx="2">
-            <a:schemeClr val="accent6"/>
-          </a:lnRef>
-          <a:fillRef idx="1">
-            <a:schemeClr val="lt1"/>
-          </a:fillRef>
-          <a:effectRef idx="0">
-            <a:schemeClr val="accent6"/>
-          </a:effectRef>
-          <a:fontRef idx="minor">
-            <a:schemeClr val="dk1"/>
-          </a:fontRef>
-        </p:style>
-        <p:txBody>
-          <a:bodyPr rtlCol="0" anchor="ctr"/>
-          <a:lstStyle/>
-          <a:p>
-            <a:pPr algn="ctr"/>
-            <a:endParaRPr lang="en-US"/>
-          </a:p>
-        </p:txBody>
-      </p:sp>
-      <p:sp>
-        <p:nvSpPr>
-          <p:cNvPr id="14" name="Multiply 13"/>
-          <p:cNvSpPr/>
-          <p:nvPr/>
-        </p:nvSpPr>
-        <p:spPr>
-          <a:xfrm>
-            <a:off x="1785918" y="1357298"/>
-            <a:ext cx="500066" cy="500066"/>
-          </a:xfrm>
-          <a:prstGeom prst="mathMultiply">
-            <a:avLst/>
-          </a:prstGeom>
-        </p:spPr>
-        <p:style>
-          <a:lnRef idx="2">
-            <a:schemeClr val="accent6"/>
-          </a:lnRef>
-          <a:fillRef idx="1">
-            <a:schemeClr val="lt1"/>
-          </a:fillRef>
-          <a:effectRef idx="0">
-            <a:schemeClr val="accent6"/>
-          </a:effectRef>
-          <a:fontRef idx="minor">
-            <a:schemeClr val="dk1"/>
-          </a:fontRef>
-        </p:style>
-        <p:txBody>
-          <a:bodyPr rtlCol="0" anchor="ctr"/>
-          <a:lstStyle/>
-          <a:p>
-            <a:pPr algn="ctr"/>
-            <a:endParaRPr lang="en-US"/>
-          </a:p>
-        </p:txBody>
-      </p:sp>
-      <p:sp>
-        <p:nvSpPr>
-          <p:cNvPr id="15" name="Multiply 14"/>
-          <p:cNvSpPr/>
-          <p:nvPr/>
-        </p:nvSpPr>
-        <p:spPr>
-          <a:xfrm>
-            <a:off x="2143108" y="1357298"/>
-            <a:ext cx="500066" cy="500066"/>
-          </a:xfrm>
-          <a:prstGeom prst="mathMultiply">
-            <a:avLst/>
-          </a:prstGeom>
-        </p:spPr>
-        <p:style>
-          <a:lnRef idx="2">
-            <a:schemeClr val="accent6"/>
-          </a:lnRef>
-          <a:fillRef idx="1">
-            <a:schemeClr val="lt1"/>
-          </a:fillRef>
-          <a:effectRef idx="0">
-            <a:schemeClr val="accent6"/>
-          </a:effectRef>
-          <a:fontRef idx="minor">
-            <a:schemeClr val="dk1"/>
-          </a:fontRef>
-        </p:style>
-        <p:txBody>
-          <a:bodyPr rtlCol="0" anchor="ctr"/>
-          <a:lstStyle/>
-          <a:p>
-            <a:pPr algn="ctr"/>
-            <a:endParaRPr lang="en-US"/>
-          </a:p>
-        </p:txBody>
-      </p:sp>
-      <p:sp>
-        <p:nvSpPr>
-          <p:cNvPr id="16" name="Multiply 15"/>
-          <p:cNvSpPr/>
-          <p:nvPr/>
-        </p:nvSpPr>
-        <p:spPr>
-          <a:xfrm>
-            <a:off x="2500298" y="1357298"/>
-            <a:ext cx="500066" cy="500066"/>
-          </a:xfrm>
-          <a:prstGeom prst="mathMultiply">
-            <a:avLst/>
-          </a:prstGeom>
-        </p:spPr>
-        <p:style>
-          <a:lnRef idx="2">
-            <a:schemeClr val="accent6"/>
-          </a:lnRef>
-          <a:fillRef idx="1">
-            <a:schemeClr val="lt1"/>
-          </a:fillRef>
-          <a:effectRef idx="0">
-            <a:schemeClr val="accent6"/>
-          </a:effectRef>
-          <a:fontRef idx="minor">
-            <a:schemeClr val="dk1"/>
-          </a:fontRef>
-        </p:style>
-        <p:txBody>
-          <a:bodyPr rtlCol="0" anchor="ctr"/>
-          <a:lstStyle/>
-          <a:p>
-            <a:pPr algn="ctr"/>
-            <a:endParaRPr lang="en-US"/>
-          </a:p>
-        </p:txBody>
-      </p:sp>
-      <p:sp>
-        <p:nvSpPr>
-          <p:cNvPr id="17" name="Multiply 16"/>
-          <p:cNvSpPr/>
-          <p:nvPr/>
-        </p:nvSpPr>
-        <p:spPr>
-          <a:xfrm>
-            <a:off x="2857488" y="1357298"/>
-            <a:ext cx="500066" cy="500066"/>
-          </a:xfrm>
-          <a:prstGeom prst="mathMultiply">
-            <a:avLst/>
-          </a:prstGeom>
-        </p:spPr>
-        <p:style>
-          <a:lnRef idx="2">
-            <a:schemeClr val="accent6"/>
-          </a:lnRef>
-          <a:fillRef idx="1">
-            <a:schemeClr val="lt1"/>
-          </a:fillRef>
-          <a:effectRef idx="0">
-            <a:schemeClr val="accent6"/>
-          </a:effectRef>
-          <a:fontRef idx="minor">
-            <a:schemeClr val="dk1"/>
-          </a:fontRef>
-        </p:style>
-        <p:txBody>
-          <a:bodyPr rtlCol="0" anchor="ctr"/>
-          <a:lstStyle/>
-          <a:p>
-            <a:pPr algn="ctr"/>
-            <a:endParaRPr lang="en-US"/>
-          </a:p>
-        </p:txBody>
-      </p:sp>
-      <p:sp>
-        <p:nvSpPr>
-          <p:cNvPr id="18" name="Multiply 17"/>
-          <p:cNvSpPr/>
-          <p:nvPr/>
-        </p:nvSpPr>
-        <p:spPr>
-          <a:xfrm>
-            <a:off x="3214678" y="1357298"/>
-            <a:ext cx="500066" cy="500066"/>
-          </a:xfrm>
-          <a:prstGeom prst="mathMultiply">
-            <a:avLst/>
-          </a:prstGeom>
-        </p:spPr>
-        <p:style>
-          <a:lnRef idx="2">
-            <a:schemeClr val="accent6"/>
-          </a:lnRef>
-          <a:fillRef idx="1">
-            <a:schemeClr val="lt1"/>
-          </a:fillRef>
-          <a:effectRef idx="0">
-            <a:schemeClr val="accent6"/>
-          </a:effectRef>
-          <a:fontRef idx="minor">
-            <a:schemeClr val="dk1"/>
-          </a:fontRef>
-        </p:style>
-        <p:txBody>
-          <a:bodyPr rtlCol="0" anchor="ctr"/>
-          <a:lstStyle/>
-          <a:p>
-            <a:pPr algn="ctr"/>
-            <a:endParaRPr lang="en-US"/>
-          </a:p>
-        </p:txBody>
-      </p:sp>
-      <p:sp>
-        <p:nvSpPr>
-          <p:cNvPr id="19" name="Multiply 18"/>
-          <p:cNvSpPr/>
-          <p:nvPr/>
-        </p:nvSpPr>
-        <p:spPr>
-          <a:xfrm>
-            <a:off x="3571868" y="1357298"/>
-            <a:ext cx="500066" cy="500066"/>
-          </a:xfrm>
-          <a:prstGeom prst="mathMultiply">
-            <a:avLst/>
-          </a:prstGeom>
-        </p:spPr>
-        <p:style>
-          <a:lnRef idx="2">
-            <a:schemeClr val="accent2"/>
-          </a:lnRef>
-          <a:fillRef idx="1">
-            <a:schemeClr val="lt1"/>
-          </a:fillRef>
-          <a:effectRef idx="0">
-            <a:schemeClr val="accent2"/>
-          </a:effectRef>
-          <a:fontRef idx="minor">
-            <a:schemeClr val="dk1"/>
-          </a:fontRef>
-        </p:style>
-        <p:txBody>
-          <a:bodyPr rtlCol="0" anchor="ctr"/>
-          <a:lstStyle/>
-          <a:p>
-            <a:pPr algn="ctr"/>
-            <a:endParaRPr lang="en-US"/>
-          </a:p>
-        </p:txBody>
-      </p:sp>
-      <p:sp>
-        <p:nvSpPr>
-          <p:cNvPr id="20" name="Multiply 19"/>
-          <p:cNvSpPr/>
-          <p:nvPr/>
-        </p:nvSpPr>
-        <p:spPr>
-          <a:xfrm>
-            <a:off x="357158" y="1357298"/>
-            <a:ext cx="500066" cy="500066"/>
-          </a:xfrm>
-          <a:prstGeom prst="mathMultiply">
-            <a:avLst/>
-          </a:prstGeom>
-        </p:spPr>
-        <p:style>
-          <a:lnRef idx="2">
-            <a:schemeClr val="accent2"/>
-          </a:lnRef>
-          <a:fillRef idx="1">
-            <a:schemeClr val="lt1"/>
-          </a:fillRef>
-          <a:effectRef idx="0">
-            <a:schemeClr val="accent2"/>
-          </a:effectRef>
-          <a:fontRef idx="minor">
-            <a:schemeClr val="dk1"/>
-          </a:fontRef>
-        </p:style>
-        <p:txBody>
-          <a:bodyPr rtlCol="0" anchor="ctr"/>
-          <a:lstStyle/>
-          <a:p>
-            <a:pPr algn="ctr"/>
-            <a:endParaRPr lang="en-US"/>
-          </a:p>
-        </p:txBody>
-      </p:sp>
-      <p:sp>
-        <p:nvSpPr>
-          <p:cNvPr id="21" name="Multiply 20"/>
-          <p:cNvSpPr/>
-          <p:nvPr/>
-        </p:nvSpPr>
-        <p:spPr>
-          <a:xfrm>
-            <a:off x="5072066" y="1357298"/>
-            <a:ext cx="500066" cy="500066"/>
-          </a:xfrm>
-          <a:prstGeom prst="mathMultiply">
-            <a:avLst/>
-          </a:prstGeom>
-        </p:spPr>
-        <p:style>
-          <a:lnRef idx="2">
-            <a:schemeClr val="accent6"/>
-          </a:lnRef>
-          <a:fillRef idx="1">
-            <a:schemeClr val="lt1"/>
-          </a:fillRef>
-          <a:effectRef idx="0">
-            <a:schemeClr val="accent6"/>
-          </a:effectRef>
-          <a:fontRef idx="minor">
-            <a:schemeClr val="dk1"/>
-          </a:fontRef>
-        </p:style>
-        <p:txBody>
-          <a:bodyPr rtlCol="0" anchor="ctr"/>
-          <a:lstStyle/>
-          <a:p>
-            <a:pPr algn="ctr"/>
-            <a:endParaRPr lang="en-US"/>
-          </a:p>
-        </p:txBody>
-      </p:sp>
-      <p:sp>
-        <p:nvSpPr>
-          <p:cNvPr id="22" name="Multiply 21"/>
-          <p:cNvSpPr/>
-          <p:nvPr/>
-        </p:nvSpPr>
-        <p:spPr>
-          <a:xfrm>
-            <a:off x="5429256" y="1357298"/>
-            <a:ext cx="500066" cy="500066"/>
-          </a:xfrm>
-          <a:prstGeom prst="mathMultiply">
-            <a:avLst/>
-          </a:prstGeom>
-        </p:spPr>
-        <p:style>
-          <a:lnRef idx="2">
-            <a:schemeClr val="accent6"/>
-          </a:lnRef>
-          <a:fillRef idx="1">
-            <a:schemeClr val="lt1"/>
-          </a:fillRef>
-          <a:effectRef idx="0">
-            <a:schemeClr val="accent6"/>
-          </a:effectRef>
-          <a:fontRef idx="minor">
-            <a:schemeClr val="dk1"/>
-          </a:fontRef>
-        </p:style>
-        <p:txBody>
-          <a:bodyPr rtlCol="0" anchor="ctr"/>
-          <a:lstStyle/>
-          <a:p>
-            <a:pPr algn="ctr"/>
-            <a:endParaRPr lang="en-US"/>
-          </a:p>
-        </p:txBody>
-      </p:sp>
-      <p:sp>
-        <p:nvSpPr>
-          <p:cNvPr id="23" name="Multiply 22"/>
-          <p:cNvSpPr/>
-          <p:nvPr/>
-        </p:nvSpPr>
-        <p:spPr>
-          <a:xfrm>
-            <a:off x="5786446" y="1357298"/>
-            <a:ext cx="500066" cy="500066"/>
-          </a:xfrm>
-          <a:prstGeom prst="mathMultiply">
-            <a:avLst/>
-          </a:prstGeom>
-        </p:spPr>
-        <p:style>
-          <a:lnRef idx="2">
-            <a:schemeClr val="accent6"/>
-          </a:lnRef>
-          <a:fillRef idx="1">
-            <a:schemeClr val="lt1"/>
-          </a:fillRef>
-          <a:effectRef idx="0">
-            <a:schemeClr val="accent6"/>
-          </a:effectRef>
-          <a:fontRef idx="minor">
-            <a:schemeClr val="dk1"/>
-          </a:fontRef>
-        </p:style>
-        <p:txBody>
-          <a:bodyPr rtlCol="0" anchor="ctr"/>
-          <a:lstStyle/>
-          <a:p>
-            <a:pPr algn="ctr"/>
-            <a:endParaRPr lang="en-US"/>
-          </a:p>
-        </p:txBody>
-      </p:sp>
-      <p:sp>
-        <p:nvSpPr>
-          <p:cNvPr id="24" name="Multiply 23"/>
-          <p:cNvSpPr/>
-          <p:nvPr/>
-        </p:nvSpPr>
-        <p:spPr>
-          <a:xfrm>
-            <a:off x="6143636" y="1357298"/>
-            <a:ext cx="500066" cy="500066"/>
-          </a:xfrm>
-          <a:prstGeom prst="mathMultiply">
-            <a:avLst/>
-          </a:prstGeom>
-        </p:spPr>
-        <p:style>
-          <a:lnRef idx="2">
-            <a:schemeClr val="accent6"/>
-          </a:lnRef>
-          <a:fillRef idx="1">
-            <a:schemeClr val="lt1"/>
-          </a:fillRef>
-          <a:effectRef idx="0">
-            <a:schemeClr val="accent6"/>
-          </a:effectRef>
-          <a:fontRef idx="minor">
-            <a:schemeClr val="dk1"/>
-          </a:fontRef>
-        </p:style>
-        <p:txBody>
-          <a:bodyPr rtlCol="0" anchor="ctr"/>
-          <a:lstStyle/>
-          <a:p>
-            <a:pPr algn="ctr"/>
-            <a:endParaRPr lang="en-US"/>
-          </a:p>
-        </p:txBody>
-      </p:sp>
-      <p:sp>
-        <p:nvSpPr>
-          <p:cNvPr id="25" name="Multiply 24"/>
-          <p:cNvSpPr/>
-          <p:nvPr/>
-        </p:nvSpPr>
-        <p:spPr>
-          <a:xfrm>
-            <a:off x="6500826" y="1357298"/>
-            <a:ext cx="500066" cy="500066"/>
-          </a:xfrm>
-          <a:prstGeom prst="mathMultiply">
-            <a:avLst/>
-          </a:prstGeom>
-        </p:spPr>
-        <p:style>
-          <a:lnRef idx="2">
-            <a:schemeClr val="accent6"/>
-          </a:lnRef>
-          <a:fillRef idx="1">
-            <a:schemeClr val="lt1"/>
-          </a:fillRef>
-          <a:effectRef idx="0">
-            <a:schemeClr val="accent6"/>
-          </a:effectRef>
-          <a:fontRef idx="minor">
-            <a:schemeClr val="dk1"/>
-          </a:fontRef>
-        </p:style>
-        <p:txBody>
-          <a:bodyPr rtlCol="0" anchor="ctr"/>
-          <a:lstStyle/>
-          <a:p>
-            <a:pPr algn="ctr"/>
-            <a:endParaRPr lang="en-US"/>
-          </a:p>
-        </p:txBody>
-      </p:sp>
-      <p:sp>
-        <p:nvSpPr>
-          <p:cNvPr id="26" name="Multiply 25"/>
-          <p:cNvSpPr/>
-          <p:nvPr/>
-        </p:nvSpPr>
-        <p:spPr>
-          <a:xfrm>
-            <a:off x="6858016" y="1357298"/>
-            <a:ext cx="500066" cy="500066"/>
-          </a:xfrm>
-          <a:prstGeom prst="mathMultiply">
-            <a:avLst/>
-          </a:prstGeom>
-        </p:spPr>
-        <p:style>
-          <a:lnRef idx="2">
-            <a:schemeClr val="accent6"/>
-          </a:lnRef>
-          <a:fillRef idx="1">
-            <a:schemeClr val="lt1"/>
-          </a:fillRef>
-          <a:effectRef idx="0">
-            <a:schemeClr val="accent6"/>
-          </a:effectRef>
-          <a:fontRef idx="minor">
-            <a:schemeClr val="dk1"/>
-          </a:fontRef>
-        </p:style>
-        <p:txBody>
-          <a:bodyPr rtlCol="0" anchor="ctr"/>
-          <a:lstStyle/>
-          <a:p>
-            <a:pPr algn="ctr"/>
-            <a:endParaRPr lang="en-US"/>
-          </a:p>
-        </p:txBody>
-      </p:sp>
-      <p:sp>
-        <p:nvSpPr>
-          <p:cNvPr id="27" name="Multiply 26"/>
-          <p:cNvSpPr/>
-          <p:nvPr/>
-        </p:nvSpPr>
-        <p:spPr>
-          <a:xfrm>
-            <a:off x="7215206" y="1357298"/>
-            <a:ext cx="500066" cy="500066"/>
-          </a:xfrm>
-          <a:prstGeom prst="mathMultiply">
-            <a:avLst/>
-          </a:prstGeom>
-        </p:spPr>
-        <p:style>
-          <a:lnRef idx="2">
-            <a:schemeClr val="accent6"/>
-          </a:lnRef>
-          <a:fillRef idx="1">
-            <a:schemeClr val="lt1"/>
-          </a:fillRef>
-          <a:effectRef idx="0">
-            <a:schemeClr val="accent6"/>
-          </a:effectRef>
-          <a:fontRef idx="minor">
-            <a:schemeClr val="dk1"/>
-          </a:fontRef>
-        </p:style>
-        <p:txBody>
-          <a:bodyPr rtlCol="0" anchor="ctr"/>
-          <a:lstStyle/>
-          <a:p>
-            <a:pPr algn="ctr"/>
-            <a:endParaRPr lang="en-US"/>
-          </a:p>
-        </p:txBody>
-      </p:sp>
-      <p:sp>
-        <p:nvSpPr>
-          <p:cNvPr id="28" name="Multiply 27"/>
-          <p:cNvSpPr/>
-          <p:nvPr/>
-        </p:nvSpPr>
-        <p:spPr>
-          <a:xfrm>
-            <a:off x="7572396" y="1357298"/>
-            <a:ext cx="500066" cy="500066"/>
-          </a:xfrm>
-          <a:prstGeom prst="mathMultiply">
-            <a:avLst/>
-          </a:prstGeom>
-        </p:spPr>
-        <p:style>
-          <a:lnRef idx="2">
-            <a:schemeClr val="accent6"/>
-          </a:lnRef>
-          <a:fillRef idx="1">
-            <a:schemeClr val="lt1"/>
-          </a:fillRef>
-          <a:effectRef idx="0">
-            <a:schemeClr val="accent6"/>
-          </a:effectRef>
-          <a:fontRef idx="minor">
-            <a:schemeClr val="dk1"/>
-          </a:fontRef>
-        </p:style>
-        <p:txBody>
-          <a:bodyPr rtlCol="0" anchor="ctr"/>
-          <a:lstStyle/>
-          <a:p>
-            <a:pPr algn="ctr"/>
-            <a:endParaRPr lang="en-US"/>
-          </a:p>
-        </p:txBody>
-      </p:sp>
-      <p:sp>
-        <p:nvSpPr>
-          <p:cNvPr id="29" name="Multiply 28"/>
-          <p:cNvSpPr/>
-          <p:nvPr/>
-        </p:nvSpPr>
-        <p:spPr>
-          <a:xfrm>
-            <a:off x="7929586" y="1357298"/>
-            <a:ext cx="500066" cy="500066"/>
-          </a:xfrm>
-          <a:prstGeom prst="mathMultiply">
-            <a:avLst/>
-          </a:prstGeom>
-        </p:spPr>
-        <p:style>
-          <a:lnRef idx="2">
-            <a:schemeClr val="accent2"/>
-          </a:lnRef>
-          <a:fillRef idx="1">
-            <a:schemeClr val="lt1"/>
-          </a:fillRef>
-          <a:effectRef idx="0">
-            <a:schemeClr val="accent2"/>
-          </a:effectRef>
-          <a:fontRef idx="minor">
-            <a:schemeClr val="dk1"/>
-          </a:fontRef>
-        </p:style>
-        <p:txBody>
-          <a:bodyPr rtlCol="0" anchor="ctr"/>
-          <a:lstStyle/>
-          <a:p>
-            <a:pPr algn="ctr"/>
-            <a:endParaRPr lang="en-US"/>
-          </a:p>
-        </p:txBody>
-      </p:sp>
-      <p:sp>
-        <p:nvSpPr>
-          <p:cNvPr id="30" name="Multiply 29"/>
-          <p:cNvSpPr/>
-          <p:nvPr/>
-        </p:nvSpPr>
-        <p:spPr>
-          <a:xfrm>
-            <a:off x="4714876" y="1357298"/>
-            <a:ext cx="500066" cy="500066"/>
-          </a:xfrm>
-          <a:prstGeom prst="mathMultiply">
-            <a:avLst/>
-          </a:prstGeom>
-        </p:spPr>
-        <p:style>
-          <a:lnRef idx="2">
-            <a:schemeClr val="accent2"/>
-          </a:lnRef>
-          <a:fillRef idx="1">
-            <a:schemeClr val="lt1"/>
-          </a:fillRef>
-          <a:effectRef idx="0">
-            <a:schemeClr val="accent2"/>
-          </a:effectRef>
-          <a:fontRef idx="minor">
-            <a:schemeClr val="dk1"/>
-          </a:fontRef>
-        </p:style>
-        <p:txBody>
-          <a:bodyPr rtlCol="0" anchor="ctr"/>
-          <a:lstStyle/>
-          <a:p>
-            <a:pPr algn="ctr"/>
-            <a:endParaRPr lang="en-US"/>
-          </a:p>
-        </p:txBody>
-      </p:sp>
+        </p:grpSpPr>
+        <p:sp>
+          <p:nvSpPr>
+            <p:cNvPr id="3" name="Isosceles Triangle 5"/>
+            <p:cNvSpPr/>
+            <p:nvPr/>
+          </p:nvSpPr>
+          <p:spPr>
+            <a:xfrm rot="10800000">
+              <a:off x="1000100" y="1214422"/>
+              <a:ext cx="2872034" cy="3199064"/>
+            </a:xfrm>
+            <a:prstGeom prst="triangle">
+              <a:avLst/>
+            </a:prstGeom>
+            <a:noFill/>
+          </p:spPr>
+          <p:style>
+            <a:lnRef idx="2">
+              <a:schemeClr val="accent1">
+                <a:shade val="50000"/>
+              </a:schemeClr>
+            </a:lnRef>
+            <a:fillRef idx="1">
+              <a:schemeClr val="accent1"/>
+            </a:fillRef>
+            <a:effectRef idx="0">
+              <a:schemeClr val="accent1"/>
+            </a:effectRef>
+            <a:fontRef idx="minor">
+              <a:schemeClr val="lt1"/>
+            </a:fontRef>
+          </p:style>
+          <p:txBody>
+            <a:bodyPr rtlCol="0" anchor="ctr"/>
+            <a:lstStyle/>
+            <a:p>
+              <a:pPr algn="ctr"/>
+              <a:endParaRPr lang="en-US"/>
+            </a:p>
+          </p:txBody>
+        </p:sp>
+        <p:cxnSp>
+          <p:nvCxnSpPr>
+            <p:cNvPr id="4" name="Straight Connector 2"/>
+            <p:cNvCxnSpPr>
+              <a:endCxn id="3" idx="2"/>
+            </p:cNvCxnSpPr>
+            <p:nvPr/>
+          </p:nvCxnSpPr>
+          <p:spPr>
+            <a:xfrm>
+              <a:off x="1000100" y="1214422"/>
+              <a:ext cx="2872034" cy="0"/>
+            </a:xfrm>
+            <a:prstGeom prst="line">
+              <a:avLst/>
+            </a:prstGeom>
+            <a:ln w="38100">
+              <a:solidFill>
+                <a:srgbClr val="FF0000"/>
+              </a:solidFill>
+            </a:ln>
+          </p:spPr>
+          <p:style>
+            <a:lnRef idx="1">
+              <a:schemeClr val="accent1"/>
+            </a:lnRef>
+            <a:fillRef idx="0">
+              <a:schemeClr val="accent1"/>
+            </a:fillRef>
+            <a:effectRef idx="0">
+              <a:schemeClr val="accent1"/>
+            </a:effectRef>
+            <a:fontRef idx="minor">
+              <a:schemeClr val="tx1"/>
+            </a:fontRef>
+          </p:style>
+        </p:cxnSp>
+        <p:cxnSp>
+          <p:nvCxnSpPr>
+            <p:cNvPr id="7" name="Straight Connector 6"/>
+            <p:cNvCxnSpPr/>
+            <p:nvPr/>
+          </p:nvCxnSpPr>
+          <p:spPr>
+            <a:xfrm>
+              <a:off x="3929058" y="1214422"/>
+              <a:ext cx="1428760" cy="0"/>
+            </a:xfrm>
+            <a:prstGeom prst="line">
+              <a:avLst/>
+            </a:prstGeom>
+            <a:ln w="25400">
+              <a:solidFill>
+                <a:schemeClr val="tx1"/>
+              </a:solidFill>
+              <a:prstDash val="sysDash"/>
+            </a:ln>
+          </p:spPr>
+          <p:style>
+            <a:lnRef idx="1">
+              <a:schemeClr val="accent1"/>
+            </a:lnRef>
+            <a:fillRef idx="0">
+              <a:schemeClr val="accent1"/>
+            </a:fillRef>
+            <a:effectRef idx="0">
+              <a:schemeClr val="accent1"/>
+            </a:effectRef>
+            <a:fontRef idx="minor">
+              <a:schemeClr val="tx1"/>
+            </a:fontRef>
+          </p:style>
+        </p:cxnSp>
+        <p:cxnSp>
+          <p:nvCxnSpPr>
+            <p:cNvPr id="9" name="Straight Connector 8"/>
+            <p:cNvCxnSpPr/>
+            <p:nvPr/>
+          </p:nvCxnSpPr>
+          <p:spPr>
+            <a:xfrm>
+              <a:off x="2571736" y="4429132"/>
+              <a:ext cx="2786082" cy="0"/>
+            </a:xfrm>
+            <a:prstGeom prst="line">
+              <a:avLst/>
+            </a:prstGeom>
+            <a:ln w="25400">
+              <a:solidFill>
+                <a:schemeClr val="tx1"/>
+              </a:solidFill>
+              <a:prstDash val="sysDash"/>
+            </a:ln>
+          </p:spPr>
+          <p:style>
+            <a:lnRef idx="1">
+              <a:schemeClr val="accent1"/>
+            </a:lnRef>
+            <a:fillRef idx="0">
+              <a:schemeClr val="accent1"/>
+            </a:fillRef>
+            <a:effectRef idx="0">
+              <a:schemeClr val="accent1"/>
+            </a:effectRef>
+            <a:fontRef idx="minor">
+              <a:schemeClr val="tx1"/>
+            </a:fontRef>
+          </p:style>
+        </p:cxnSp>
+        <p:cxnSp>
+          <p:nvCxnSpPr>
+            <p:cNvPr id="11" name="Straight Connector 10"/>
+            <p:cNvCxnSpPr/>
+            <p:nvPr/>
+          </p:nvCxnSpPr>
+          <p:spPr>
+            <a:xfrm rot="5400000">
+              <a:off x="3607587" y="2821777"/>
+              <a:ext cx="3214710" cy="0"/>
+            </a:xfrm>
+            <a:prstGeom prst="line">
+              <a:avLst/>
+            </a:prstGeom>
+            <a:ln>
+              <a:solidFill>
+                <a:schemeClr val="tx1"/>
+              </a:solidFill>
+              <a:headEnd type="triangle"/>
+              <a:tailEnd type="triangle"/>
+            </a:ln>
+          </p:spPr>
+          <p:style>
+            <a:lnRef idx="1">
+              <a:schemeClr val="accent1"/>
+            </a:lnRef>
+            <a:fillRef idx="0">
+              <a:schemeClr val="accent1"/>
+            </a:fillRef>
+            <a:effectRef idx="0">
+              <a:schemeClr val="accent1"/>
+            </a:effectRef>
+            <a:fontRef idx="minor">
+              <a:schemeClr val="tx1"/>
+            </a:fontRef>
+          </p:style>
+        </p:cxnSp>
+        <p:cxnSp>
+          <p:nvCxnSpPr>
+            <p:cNvPr id="19" name="Straight Connector 18"/>
+            <p:cNvCxnSpPr/>
+            <p:nvPr/>
+          </p:nvCxnSpPr>
+          <p:spPr>
+            <a:xfrm rot="5400000">
+              <a:off x="821505" y="892951"/>
+              <a:ext cx="357190" cy="0"/>
+            </a:xfrm>
+            <a:prstGeom prst="line">
+              <a:avLst/>
+            </a:prstGeom>
+            <a:ln w="25400">
+              <a:solidFill>
+                <a:schemeClr val="tx1"/>
+              </a:solidFill>
+              <a:prstDash val="sysDash"/>
+            </a:ln>
+          </p:spPr>
+          <p:style>
+            <a:lnRef idx="1">
+              <a:schemeClr val="accent1"/>
+            </a:lnRef>
+            <a:fillRef idx="0">
+              <a:schemeClr val="accent1"/>
+            </a:fillRef>
+            <a:effectRef idx="0">
+              <a:schemeClr val="accent1"/>
+            </a:effectRef>
+            <a:fontRef idx="minor">
+              <a:schemeClr val="tx1"/>
+            </a:fontRef>
+          </p:style>
+        </p:cxnSp>
+        <p:cxnSp>
+          <p:nvCxnSpPr>
+            <p:cNvPr id="20" name="Straight Connector 19"/>
+            <p:cNvCxnSpPr/>
+            <p:nvPr/>
+          </p:nvCxnSpPr>
+          <p:spPr>
+            <a:xfrm rot="5400000">
+              <a:off x="3679025" y="892951"/>
+              <a:ext cx="357190" cy="0"/>
+            </a:xfrm>
+            <a:prstGeom prst="line">
+              <a:avLst/>
+            </a:prstGeom>
+            <a:ln w="25400">
+              <a:solidFill>
+                <a:schemeClr val="tx1"/>
+              </a:solidFill>
+              <a:prstDash val="sysDash"/>
+            </a:ln>
+          </p:spPr>
+          <p:style>
+            <a:lnRef idx="1">
+              <a:schemeClr val="accent1"/>
+            </a:lnRef>
+            <a:fillRef idx="0">
+              <a:schemeClr val="accent1"/>
+            </a:fillRef>
+            <a:effectRef idx="0">
+              <a:schemeClr val="accent1"/>
+            </a:effectRef>
+            <a:fontRef idx="minor">
+              <a:schemeClr val="tx1"/>
+            </a:fontRef>
+          </p:style>
+        </p:cxnSp>
+        <p:cxnSp>
+          <p:nvCxnSpPr>
+            <p:cNvPr id="22" name="Straight Connector 21"/>
+            <p:cNvCxnSpPr/>
+            <p:nvPr/>
+          </p:nvCxnSpPr>
+          <p:spPr>
+            <a:xfrm>
+              <a:off x="1000100" y="857232"/>
+              <a:ext cx="2857520" cy="0"/>
+            </a:xfrm>
+            <a:prstGeom prst="line">
+              <a:avLst/>
+            </a:prstGeom>
+            <a:ln w="25400">
+              <a:solidFill>
+                <a:schemeClr val="tx1"/>
+              </a:solidFill>
+              <a:headEnd type="triangle"/>
+              <a:tailEnd type="triangle"/>
+            </a:ln>
+          </p:spPr>
+          <p:style>
+            <a:lnRef idx="1">
+              <a:schemeClr val="accent1"/>
+            </a:lnRef>
+            <a:fillRef idx="0">
+              <a:schemeClr val="accent1"/>
+            </a:fillRef>
+            <a:effectRef idx="0">
+              <a:schemeClr val="accent1"/>
+            </a:effectRef>
+            <a:fontRef idx="minor">
+              <a:schemeClr val="tx1"/>
+            </a:fontRef>
+          </p:style>
+        </p:cxnSp>
+        <p:sp>
+          <p:nvSpPr>
+            <p:cNvPr id="23" name="Arc 22"/>
+            <p:cNvSpPr/>
+            <p:nvPr/>
+          </p:nvSpPr>
+          <p:spPr>
+            <a:xfrm>
+              <a:off x="1857356" y="3143248"/>
+              <a:ext cx="1214446" cy="500066"/>
+            </a:xfrm>
+            <a:prstGeom prst="arc">
+              <a:avLst>
+                <a:gd name="adj1" fmla="val 11630177"/>
+                <a:gd name="adj2" fmla="val 20652701"/>
+              </a:avLst>
+            </a:prstGeom>
+            <a:ln w="25400">
+              <a:solidFill>
+                <a:schemeClr val="tx1"/>
+              </a:solidFill>
+              <a:headEnd type="triangle"/>
+              <a:tailEnd type="triangle"/>
+            </a:ln>
+          </p:spPr>
+          <p:style>
+            <a:lnRef idx="1">
+              <a:schemeClr val="accent1"/>
+            </a:lnRef>
+            <a:fillRef idx="0">
+              <a:schemeClr val="accent1"/>
+            </a:fillRef>
+            <a:effectRef idx="0">
+              <a:schemeClr val="accent1"/>
+            </a:effectRef>
+            <a:fontRef idx="minor">
+              <a:schemeClr val="tx1"/>
+            </a:fontRef>
+          </p:style>
+          <p:txBody>
+            <a:bodyPr rtlCol="0" anchor="ctr"/>
+            <a:lstStyle/>
+            <a:p>
+              <a:pPr algn="ctr"/>
+              <a:endParaRPr lang="en-US"/>
+            </a:p>
+          </p:txBody>
+        </p:sp>
+        <p:sp>
+          <p:nvSpPr>
+            <p:cNvPr id="24" name="TextBox 23"/>
+            <p:cNvSpPr txBox="1"/>
+            <p:nvPr/>
+          </p:nvSpPr>
+          <p:spPr>
+            <a:xfrm>
+              <a:off x="1000100" y="214290"/>
+              <a:ext cx="3011209" cy="584775"/>
+            </a:xfrm>
+            <a:prstGeom prst="rect">
+              <a:avLst/>
+            </a:prstGeom>
+            <a:noFill/>
+          </p:spPr>
+          <p:txBody>
+            <a:bodyPr wrap="none" rtlCol="0">
+              <a:spAutoFit/>
+            </a:bodyPr>
+            <a:lstStyle/>
+            <a:p>
+              <a:r>
+                <a:rPr lang="es-ES" sz="3200" dirty="0" smtClean="0"/>
+                <a:t>Anchura pantalla</a:t>
+              </a:r>
+              <a:endParaRPr lang="en-US" sz="3200" dirty="0"/>
+            </a:p>
+          </p:txBody>
+        </p:sp>
+        <p:sp>
+          <p:nvSpPr>
+            <p:cNvPr id="25" name="TextBox 24"/>
+            <p:cNvSpPr txBox="1"/>
+            <p:nvPr/>
+          </p:nvSpPr>
+          <p:spPr>
+            <a:xfrm rot="16200000">
+              <a:off x="4143372" y="2643182"/>
+              <a:ext cx="1699504" cy="584775"/>
+            </a:xfrm>
+            <a:prstGeom prst="rect">
+              <a:avLst/>
+            </a:prstGeom>
+            <a:noFill/>
+          </p:spPr>
+          <p:txBody>
+            <a:bodyPr wrap="none" rtlCol="0">
+              <a:spAutoFit/>
+            </a:bodyPr>
+            <a:lstStyle/>
+            <a:p>
+              <a:r>
+                <a:rPr lang="es-ES" sz="3200" dirty="0" smtClean="0"/>
+                <a:t>Distancia</a:t>
+              </a:r>
+              <a:endParaRPr lang="en-US" sz="3200" dirty="0"/>
+            </a:p>
+          </p:txBody>
+        </p:sp>
+        <p:sp>
+          <p:nvSpPr>
+            <p:cNvPr id="26" name="TextBox 25"/>
+            <p:cNvSpPr txBox="1"/>
+            <p:nvPr/>
+          </p:nvSpPr>
+          <p:spPr>
+            <a:xfrm>
+              <a:off x="1142976" y="2500306"/>
+              <a:ext cx="1713931" cy="523220"/>
+            </a:xfrm>
+            <a:prstGeom prst="rect">
+              <a:avLst/>
+            </a:prstGeom>
+            <a:noFill/>
+          </p:spPr>
+          <p:txBody>
+            <a:bodyPr wrap="none" rtlCol="0">
+              <a:spAutoFit/>
+            </a:bodyPr>
+            <a:lstStyle/>
+            <a:p>
+              <a:r>
+                <a:rPr lang="es-ES" sz="2800" dirty="0" smtClean="0"/>
+                <a:t>Ángulo (</a:t>
+              </a:r>
+              <a:r>
+                <a:rPr lang="el-GR" sz="2800" dirty="0" smtClean="0"/>
+                <a:t>α</a:t>
+              </a:r>
+              <a:r>
+                <a:rPr lang="es-ES" sz="2800" dirty="0" smtClean="0"/>
+                <a:t>)</a:t>
+              </a:r>
+              <a:endParaRPr lang="en-US" sz="2800" dirty="0"/>
+            </a:p>
+          </p:txBody>
+        </p:sp>
+      </p:grpSp>
     </p:spTree>
   </p:cSld>
   <p:clrMapOvr>

</xml_diff>

<commit_message>
Avances generales. Faltan como tochos enteros reconocimiento de gestos y problemas del desarrollo.
</commit_message>
<xml_diff>
--- a/Imagenes/imagenesGeneradas.pptx
+++ b/Imagenes/imagenesGeneradas.pptx
@@ -12,6 +12,7 @@
     <p:sldId id="260" r:id="rId6"/>
     <p:sldId id="261" r:id="rId7"/>
     <p:sldId id="262" r:id="rId8"/>
+    <p:sldId id="263" r:id="rId9"/>
   </p:sldIdLst>
   <p:sldSz cx="9144000" cy="6858000" type="screen4x3"/>
   <p:notesSz cx="6858000" cy="9144000"/>
@@ -295,7 +296,7 @@
             <a:fld id="{D4B18A11-21C1-4B8F-B2BB-5EB1E0F497C6}" type="datetimeFigureOut">
               <a:rPr lang="en-US" smtClean="0"/>
               <a:pPr/>
-              <a:t>6/1/2010</a:t>
+              <a:t>6/3/2010</a:t>
             </a:fld>
             <a:endParaRPr lang="en-US"/>
           </a:p>
@@ -462,7 +463,7 @@
             <a:fld id="{D4B18A11-21C1-4B8F-B2BB-5EB1E0F497C6}" type="datetimeFigureOut">
               <a:rPr lang="en-US" smtClean="0"/>
               <a:pPr/>
-              <a:t>6/1/2010</a:t>
+              <a:t>6/3/2010</a:t>
             </a:fld>
             <a:endParaRPr lang="en-US"/>
           </a:p>
@@ -639,7 +640,7 @@
             <a:fld id="{D4B18A11-21C1-4B8F-B2BB-5EB1E0F497C6}" type="datetimeFigureOut">
               <a:rPr lang="en-US" smtClean="0"/>
               <a:pPr/>
-              <a:t>6/1/2010</a:t>
+              <a:t>6/3/2010</a:t>
             </a:fld>
             <a:endParaRPr lang="en-US"/>
           </a:p>
@@ -806,7 +807,7 @@
             <a:fld id="{D4B18A11-21C1-4B8F-B2BB-5EB1E0F497C6}" type="datetimeFigureOut">
               <a:rPr lang="en-US" smtClean="0"/>
               <a:pPr/>
-              <a:t>6/1/2010</a:t>
+              <a:t>6/3/2010</a:t>
             </a:fld>
             <a:endParaRPr lang="en-US"/>
           </a:p>
@@ -1049,7 +1050,7 @@
             <a:fld id="{D4B18A11-21C1-4B8F-B2BB-5EB1E0F497C6}" type="datetimeFigureOut">
               <a:rPr lang="en-US" smtClean="0"/>
               <a:pPr/>
-              <a:t>6/1/2010</a:t>
+              <a:t>6/3/2010</a:t>
             </a:fld>
             <a:endParaRPr lang="en-US"/>
           </a:p>
@@ -1334,7 +1335,7 @@
             <a:fld id="{D4B18A11-21C1-4B8F-B2BB-5EB1E0F497C6}" type="datetimeFigureOut">
               <a:rPr lang="en-US" smtClean="0"/>
               <a:pPr/>
-              <a:t>6/1/2010</a:t>
+              <a:t>6/3/2010</a:t>
             </a:fld>
             <a:endParaRPr lang="en-US"/>
           </a:p>
@@ -1753,7 +1754,7 @@
             <a:fld id="{D4B18A11-21C1-4B8F-B2BB-5EB1E0F497C6}" type="datetimeFigureOut">
               <a:rPr lang="en-US" smtClean="0"/>
               <a:pPr/>
-              <a:t>6/1/2010</a:t>
+              <a:t>6/3/2010</a:t>
             </a:fld>
             <a:endParaRPr lang="en-US"/>
           </a:p>
@@ -1868,7 +1869,7 @@
             <a:fld id="{D4B18A11-21C1-4B8F-B2BB-5EB1E0F497C6}" type="datetimeFigureOut">
               <a:rPr lang="en-US" smtClean="0"/>
               <a:pPr/>
-              <a:t>6/1/2010</a:t>
+              <a:t>6/3/2010</a:t>
             </a:fld>
             <a:endParaRPr lang="en-US"/>
           </a:p>
@@ -1960,7 +1961,7 @@
             <a:fld id="{D4B18A11-21C1-4B8F-B2BB-5EB1E0F497C6}" type="datetimeFigureOut">
               <a:rPr lang="en-US" smtClean="0"/>
               <a:pPr/>
-              <a:t>6/1/2010</a:t>
+              <a:t>6/3/2010</a:t>
             </a:fld>
             <a:endParaRPr lang="en-US"/>
           </a:p>
@@ -2234,7 +2235,7 @@
             <a:fld id="{D4B18A11-21C1-4B8F-B2BB-5EB1E0F497C6}" type="datetimeFigureOut">
               <a:rPr lang="en-US" smtClean="0"/>
               <a:pPr/>
-              <a:t>6/1/2010</a:t>
+              <a:t>6/3/2010</a:t>
             </a:fld>
             <a:endParaRPr lang="en-US"/>
           </a:p>
@@ -2484,7 +2485,7 @@
             <a:fld id="{D4B18A11-21C1-4B8F-B2BB-5EB1E0F497C6}" type="datetimeFigureOut">
               <a:rPr lang="en-US" smtClean="0"/>
               <a:pPr/>
-              <a:t>6/1/2010</a:t>
+              <a:t>6/3/2010</a:t>
             </a:fld>
             <a:endParaRPr lang="en-US"/>
           </a:p>
@@ -2694,7 +2695,7 @@
             <a:fld id="{D4B18A11-21C1-4B8F-B2BB-5EB1E0F497C6}" type="datetimeFigureOut">
               <a:rPr lang="en-US" smtClean="0"/>
               <a:pPr/>
-              <a:t>6/1/2010</a:t>
+              <a:t>6/3/2010</a:t>
             </a:fld>
             <a:endParaRPr lang="en-US"/>
           </a:p>
@@ -8324,6 +8325,1441 @@
 </p:sld>
 </file>
 
+<file path=ppt/slides/slide8.xml><?xml version="1.0" encoding="utf-8"?>
+<p:sld xmlns:a="http://schemas.openxmlformats.org/drawingml/2006/main" xmlns:r="http://schemas.openxmlformats.org/officeDocument/2006/relationships" xmlns:p="http://schemas.openxmlformats.org/presentationml/2006/main">
+  <p:cSld>
+    <p:spTree>
+      <p:nvGrpSpPr>
+        <p:cNvPr id="1" name=""/>
+        <p:cNvGrpSpPr/>
+        <p:nvPr/>
+      </p:nvGrpSpPr>
+      <p:grpSpPr>
+        <a:xfrm>
+          <a:off x="0" y="0"/>
+          <a:ext cx="0" cy="0"/>
+          <a:chOff x="0" y="0"/>
+          <a:chExt cx="0" cy="0"/>
+        </a:xfrm>
+      </p:grpSpPr>
+      <p:grpSp>
+        <p:nvGrpSpPr>
+          <p:cNvPr id="26" name="Group 25"/>
+          <p:cNvGrpSpPr/>
+          <p:nvPr/>
+        </p:nvGrpSpPr>
+        <p:grpSpPr>
+          <a:xfrm>
+            <a:off x="2285984" y="285728"/>
+            <a:ext cx="1447900" cy="1440902"/>
+            <a:chOff x="571472" y="2000240"/>
+            <a:chExt cx="1447900" cy="1440902"/>
+          </a:xfrm>
+        </p:grpSpPr>
+        <p:grpSp>
+          <p:nvGrpSpPr>
+            <p:cNvPr id="8" name="Group 7"/>
+            <p:cNvGrpSpPr/>
+            <p:nvPr/>
+          </p:nvGrpSpPr>
+          <p:grpSpPr>
+            <a:xfrm>
+              <a:off x="714348" y="2072472"/>
+              <a:ext cx="1285884" cy="1356528"/>
+              <a:chOff x="714348" y="2072472"/>
+              <a:chExt cx="1285884" cy="1356528"/>
+            </a:xfrm>
+          </p:grpSpPr>
+          <p:cxnSp>
+            <p:nvCxnSpPr>
+              <p:cNvPr id="3" name="Straight Arrow Connector 2"/>
+              <p:cNvCxnSpPr/>
+              <p:nvPr/>
+            </p:nvCxnSpPr>
+            <p:spPr>
+              <a:xfrm rot="5400000" flipH="1" flipV="1">
+                <a:off x="607191" y="2536025"/>
+                <a:ext cx="928694" cy="1588"/>
+              </a:xfrm>
+              <a:prstGeom prst="straightConnector1">
+                <a:avLst/>
+              </a:prstGeom>
+              <a:ln>
+                <a:tailEnd type="arrow"/>
+              </a:ln>
+            </p:spPr>
+            <p:style>
+              <a:lnRef idx="1">
+                <a:schemeClr val="accent1"/>
+              </a:lnRef>
+              <a:fillRef idx="0">
+                <a:schemeClr val="accent1"/>
+              </a:fillRef>
+              <a:effectRef idx="0">
+                <a:schemeClr val="accent1"/>
+              </a:effectRef>
+              <a:fontRef idx="minor">
+                <a:schemeClr val="tx1"/>
+              </a:fontRef>
+            </p:style>
+          </p:cxnSp>
+          <p:cxnSp>
+            <p:nvCxnSpPr>
+              <p:cNvPr id="5" name="Straight Arrow Connector 4"/>
+              <p:cNvCxnSpPr/>
+              <p:nvPr/>
+            </p:nvCxnSpPr>
+            <p:spPr>
+              <a:xfrm>
+                <a:off x="1071538" y="3000372"/>
+                <a:ext cx="928694" cy="1588"/>
+              </a:xfrm>
+              <a:prstGeom prst="straightConnector1">
+                <a:avLst/>
+              </a:prstGeom>
+              <a:ln>
+                <a:tailEnd type="arrow"/>
+              </a:ln>
+            </p:spPr>
+            <p:style>
+              <a:lnRef idx="1">
+                <a:schemeClr val="accent1"/>
+              </a:lnRef>
+              <a:fillRef idx="0">
+                <a:schemeClr val="accent1"/>
+              </a:fillRef>
+              <a:effectRef idx="0">
+                <a:schemeClr val="accent1"/>
+              </a:effectRef>
+              <a:fontRef idx="minor">
+                <a:schemeClr val="tx1"/>
+              </a:fontRef>
+            </p:style>
+          </p:cxnSp>
+          <p:cxnSp>
+            <p:nvCxnSpPr>
+              <p:cNvPr id="7" name="Straight Arrow Connector 6"/>
+              <p:cNvCxnSpPr/>
+              <p:nvPr/>
+            </p:nvCxnSpPr>
+            <p:spPr>
+              <a:xfrm rot="5400000">
+                <a:off x="678629" y="3036091"/>
+                <a:ext cx="428628" cy="357190"/>
+              </a:xfrm>
+              <a:prstGeom prst="straightConnector1">
+                <a:avLst/>
+              </a:prstGeom>
+              <a:ln>
+                <a:tailEnd type="arrow"/>
+              </a:ln>
+            </p:spPr>
+            <p:style>
+              <a:lnRef idx="1">
+                <a:schemeClr val="accent1"/>
+              </a:lnRef>
+              <a:fillRef idx="0">
+                <a:schemeClr val="accent1"/>
+              </a:fillRef>
+              <a:effectRef idx="0">
+                <a:schemeClr val="accent1"/>
+              </a:effectRef>
+              <a:fontRef idx="minor">
+                <a:schemeClr val="tx1"/>
+              </a:fontRef>
+            </p:style>
+          </p:cxnSp>
+        </p:grpSp>
+        <p:sp>
+          <p:nvSpPr>
+            <p:cNvPr id="9" name="TextBox 8"/>
+            <p:cNvSpPr txBox="1"/>
+            <p:nvPr/>
+          </p:nvSpPr>
+          <p:spPr>
+            <a:xfrm>
+              <a:off x="1714480" y="2643182"/>
+              <a:ext cx="304892" cy="369332"/>
+            </a:xfrm>
+            <a:prstGeom prst="rect">
+              <a:avLst/>
+            </a:prstGeom>
+            <a:noFill/>
+          </p:spPr>
+          <p:txBody>
+            <a:bodyPr wrap="none" rtlCol="0">
+              <a:spAutoFit/>
+            </a:bodyPr>
+            <a:lstStyle/>
+            <a:p>
+              <a:r>
+                <a:rPr lang="es-ES" dirty="0" smtClean="0"/>
+                <a:t>X</a:t>
+              </a:r>
+            </a:p>
+          </p:txBody>
+        </p:sp>
+        <p:sp>
+          <p:nvSpPr>
+            <p:cNvPr id="10" name="TextBox 9"/>
+            <p:cNvSpPr txBox="1"/>
+            <p:nvPr/>
+          </p:nvSpPr>
+          <p:spPr>
+            <a:xfrm>
+              <a:off x="571472" y="3071810"/>
+              <a:ext cx="292068" cy="369332"/>
+            </a:xfrm>
+            <a:prstGeom prst="rect">
+              <a:avLst/>
+            </a:prstGeom>
+            <a:noFill/>
+          </p:spPr>
+          <p:txBody>
+            <a:bodyPr wrap="none" rtlCol="0">
+              <a:spAutoFit/>
+            </a:bodyPr>
+            <a:lstStyle/>
+            <a:p>
+              <a:r>
+                <a:rPr lang="es-ES" dirty="0" smtClean="0"/>
+                <a:t>Z</a:t>
+              </a:r>
+            </a:p>
+          </p:txBody>
+        </p:sp>
+        <p:sp>
+          <p:nvSpPr>
+            <p:cNvPr id="11" name="TextBox 10"/>
+            <p:cNvSpPr txBox="1"/>
+            <p:nvPr/>
+          </p:nvSpPr>
+          <p:spPr>
+            <a:xfrm>
+              <a:off x="1058156" y="2000240"/>
+              <a:ext cx="304892" cy="369332"/>
+            </a:xfrm>
+            <a:prstGeom prst="rect">
+              <a:avLst/>
+            </a:prstGeom>
+            <a:noFill/>
+          </p:spPr>
+          <p:txBody>
+            <a:bodyPr wrap="none" rtlCol="0">
+              <a:spAutoFit/>
+            </a:bodyPr>
+            <a:lstStyle/>
+            <a:p>
+              <a:r>
+                <a:rPr lang="es-ES" dirty="0" smtClean="0"/>
+                <a:t>Y</a:t>
+              </a:r>
+            </a:p>
+          </p:txBody>
+        </p:sp>
+      </p:grpSp>
+      <p:grpSp>
+        <p:nvGrpSpPr>
+          <p:cNvPr id="25" name="Group 24"/>
+          <p:cNvGrpSpPr/>
+          <p:nvPr/>
+        </p:nvGrpSpPr>
+        <p:grpSpPr>
+          <a:xfrm>
+            <a:off x="428596" y="285728"/>
+            <a:ext cx="1091504" cy="1583778"/>
+            <a:chOff x="6072198" y="1285860"/>
+            <a:chExt cx="1091504" cy="1583778"/>
+          </a:xfrm>
+        </p:grpSpPr>
+        <p:grpSp>
+          <p:nvGrpSpPr>
+            <p:cNvPr id="24" name="Group 23"/>
+            <p:cNvGrpSpPr/>
+            <p:nvPr/>
+          </p:nvGrpSpPr>
+          <p:grpSpPr>
+            <a:xfrm>
+              <a:off x="6072198" y="1357298"/>
+              <a:ext cx="929488" cy="1357322"/>
+              <a:chOff x="4499768" y="3000372"/>
+              <a:chExt cx="929488" cy="1357322"/>
+            </a:xfrm>
+          </p:grpSpPr>
+          <p:cxnSp>
+            <p:nvCxnSpPr>
+              <p:cNvPr id="13" name="Straight Arrow Connector 12"/>
+              <p:cNvCxnSpPr/>
+              <p:nvPr/>
+            </p:nvCxnSpPr>
+            <p:spPr>
+              <a:xfrm rot="16200000" flipH="1">
+                <a:off x="4035671" y="3892009"/>
+                <a:ext cx="929782" cy="1588"/>
+              </a:xfrm>
+              <a:prstGeom prst="straightConnector1">
+                <a:avLst/>
+              </a:prstGeom>
+              <a:ln>
+                <a:solidFill>
+                  <a:schemeClr val="accent3"/>
+                </a:solidFill>
+                <a:tailEnd type="arrow"/>
+              </a:ln>
+            </p:spPr>
+            <p:style>
+              <a:lnRef idx="1">
+                <a:schemeClr val="accent1"/>
+              </a:lnRef>
+              <a:fillRef idx="0">
+                <a:schemeClr val="accent1"/>
+              </a:fillRef>
+              <a:effectRef idx="0">
+                <a:schemeClr val="accent1"/>
+              </a:effectRef>
+              <a:fontRef idx="minor">
+                <a:schemeClr val="tx1"/>
+              </a:fontRef>
+            </p:style>
+          </p:cxnSp>
+          <p:cxnSp>
+            <p:nvCxnSpPr>
+              <p:cNvPr id="14" name="Straight Arrow Connector 13"/>
+              <p:cNvCxnSpPr/>
+              <p:nvPr/>
+            </p:nvCxnSpPr>
+            <p:spPr>
+              <a:xfrm flipV="1">
+                <a:off x="4500562" y="3427118"/>
+                <a:ext cx="928694" cy="1590"/>
+              </a:xfrm>
+              <a:prstGeom prst="straightConnector1">
+                <a:avLst/>
+              </a:prstGeom>
+              <a:ln>
+                <a:solidFill>
+                  <a:schemeClr val="accent3"/>
+                </a:solidFill>
+                <a:tailEnd type="arrow"/>
+              </a:ln>
+            </p:spPr>
+            <p:style>
+              <a:lnRef idx="1">
+                <a:schemeClr val="accent1"/>
+              </a:lnRef>
+              <a:fillRef idx="0">
+                <a:schemeClr val="accent1"/>
+              </a:fillRef>
+              <a:effectRef idx="0">
+                <a:schemeClr val="accent1"/>
+              </a:effectRef>
+              <a:fontRef idx="minor">
+                <a:schemeClr val="tx1"/>
+              </a:fontRef>
+            </p:style>
+          </p:cxnSp>
+          <p:cxnSp>
+            <p:nvCxnSpPr>
+              <p:cNvPr id="15" name="Straight Arrow Connector 14"/>
+              <p:cNvCxnSpPr/>
+              <p:nvPr/>
+            </p:nvCxnSpPr>
+            <p:spPr>
+              <a:xfrm flipV="1">
+                <a:off x="4500562" y="3000372"/>
+                <a:ext cx="500066" cy="428336"/>
+              </a:xfrm>
+              <a:prstGeom prst="straightConnector1">
+                <a:avLst/>
+              </a:prstGeom>
+              <a:ln>
+                <a:solidFill>
+                  <a:schemeClr val="accent3"/>
+                </a:solidFill>
+                <a:tailEnd type="arrow"/>
+              </a:ln>
+            </p:spPr>
+            <p:style>
+              <a:lnRef idx="1">
+                <a:schemeClr val="accent1"/>
+              </a:lnRef>
+              <a:fillRef idx="0">
+                <a:schemeClr val="accent1"/>
+              </a:fillRef>
+              <a:effectRef idx="0">
+                <a:schemeClr val="accent1"/>
+              </a:effectRef>
+              <a:fontRef idx="minor">
+                <a:schemeClr val="tx1"/>
+              </a:fontRef>
+            </p:style>
+          </p:cxnSp>
+        </p:grpSp>
+        <p:sp>
+          <p:nvSpPr>
+            <p:cNvPr id="16" name="TextBox 15"/>
+            <p:cNvSpPr txBox="1"/>
+            <p:nvPr/>
+          </p:nvSpPr>
+          <p:spPr>
+            <a:xfrm>
+              <a:off x="6858810" y="1714488"/>
+              <a:ext cx="304892" cy="369332"/>
+            </a:xfrm>
+            <a:prstGeom prst="rect">
+              <a:avLst/>
+            </a:prstGeom>
+            <a:noFill/>
+          </p:spPr>
+          <p:txBody>
+            <a:bodyPr wrap="none" rtlCol="0">
+              <a:spAutoFit/>
+            </a:bodyPr>
+            <a:lstStyle/>
+            <a:p>
+              <a:r>
+                <a:rPr lang="es-ES" dirty="0" smtClean="0"/>
+                <a:t>X</a:t>
+              </a:r>
+            </a:p>
+          </p:txBody>
+        </p:sp>
+        <p:sp>
+          <p:nvSpPr>
+            <p:cNvPr id="17" name="TextBox 16"/>
+            <p:cNvSpPr txBox="1"/>
+            <p:nvPr/>
+          </p:nvSpPr>
+          <p:spPr>
+            <a:xfrm>
+              <a:off x="6072992" y="2500306"/>
+              <a:ext cx="292068" cy="369332"/>
+            </a:xfrm>
+            <a:prstGeom prst="rect">
+              <a:avLst/>
+            </a:prstGeom>
+            <a:noFill/>
+          </p:spPr>
+          <p:txBody>
+            <a:bodyPr wrap="none" rtlCol="0">
+              <a:spAutoFit/>
+            </a:bodyPr>
+            <a:lstStyle/>
+            <a:p>
+              <a:r>
+                <a:rPr lang="es-ES" dirty="0" smtClean="0"/>
+                <a:t>Z</a:t>
+              </a:r>
+            </a:p>
+          </p:txBody>
+        </p:sp>
+        <p:sp>
+          <p:nvSpPr>
+            <p:cNvPr id="18" name="TextBox 17"/>
+            <p:cNvSpPr txBox="1"/>
+            <p:nvPr/>
+          </p:nvSpPr>
+          <p:spPr>
+            <a:xfrm>
+              <a:off x="6573058" y="1285860"/>
+              <a:ext cx="304892" cy="369332"/>
+            </a:xfrm>
+            <a:prstGeom prst="rect">
+              <a:avLst/>
+            </a:prstGeom>
+            <a:noFill/>
+          </p:spPr>
+          <p:txBody>
+            <a:bodyPr wrap="none" rtlCol="0">
+              <a:spAutoFit/>
+            </a:bodyPr>
+            <a:lstStyle/>
+            <a:p>
+              <a:r>
+                <a:rPr lang="es-ES" dirty="0" smtClean="0"/>
+                <a:t>Y</a:t>
+              </a:r>
+            </a:p>
+          </p:txBody>
+        </p:sp>
+      </p:grpSp>
+      <p:sp>
+        <p:nvSpPr>
+          <p:cNvPr id="28" name="Oval 27"/>
+          <p:cNvSpPr/>
+          <p:nvPr/>
+        </p:nvSpPr>
+        <p:spPr>
+          <a:xfrm>
+            <a:off x="1000100" y="1357298"/>
+            <a:ext cx="428628" cy="428628"/>
+          </a:xfrm>
+          <a:prstGeom prst="ellipse">
+            <a:avLst/>
+          </a:prstGeom>
+        </p:spPr>
+        <p:style>
+          <a:lnRef idx="2">
+            <a:schemeClr val="accent1"/>
+          </a:lnRef>
+          <a:fillRef idx="1">
+            <a:schemeClr val="lt1"/>
+          </a:fillRef>
+          <a:effectRef idx="0">
+            <a:schemeClr val="accent1"/>
+          </a:effectRef>
+          <a:fontRef idx="minor">
+            <a:schemeClr val="dk1"/>
+          </a:fontRef>
+        </p:style>
+        <p:txBody>
+          <a:bodyPr rtlCol="0" anchor="ctr"/>
+          <a:lstStyle/>
+          <a:p>
+            <a:pPr algn="ctr"/>
+            <a:r>
+              <a:rPr lang="es-ES" dirty="0" smtClean="0"/>
+              <a:t>A</a:t>
+            </a:r>
+            <a:endParaRPr lang="en-US" dirty="0"/>
+          </a:p>
+        </p:txBody>
+      </p:sp>
+      <p:sp>
+        <p:nvSpPr>
+          <p:cNvPr id="29" name="Oval 28"/>
+          <p:cNvSpPr/>
+          <p:nvPr/>
+        </p:nvSpPr>
+        <p:spPr>
+          <a:xfrm>
+            <a:off x="3286116" y="1428736"/>
+            <a:ext cx="428628" cy="428628"/>
+          </a:xfrm>
+          <a:prstGeom prst="ellipse">
+            <a:avLst/>
+          </a:prstGeom>
+        </p:spPr>
+        <p:style>
+          <a:lnRef idx="2">
+            <a:schemeClr val="accent1"/>
+          </a:lnRef>
+          <a:fillRef idx="1">
+            <a:schemeClr val="lt1"/>
+          </a:fillRef>
+          <a:effectRef idx="0">
+            <a:schemeClr val="accent1"/>
+          </a:effectRef>
+          <a:fontRef idx="minor">
+            <a:schemeClr val="dk1"/>
+          </a:fontRef>
+        </p:style>
+        <p:txBody>
+          <a:bodyPr rtlCol="0" anchor="ctr"/>
+          <a:lstStyle/>
+          <a:p>
+            <a:pPr algn="ctr"/>
+            <a:r>
+              <a:rPr lang="es-ES" dirty="0" smtClean="0"/>
+              <a:t>B</a:t>
+            </a:r>
+            <a:endParaRPr lang="en-US" dirty="0"/>
+          </a:p>
+        </p:txBody>
+      </p:sp>
+      <p:grpSp>
+        <p:nvGrpSpPr>
+          <p:cNvPr id="38" name="Group 37"/>
+          <p:cNvGrpSpPr/>
+          <p:nvPr/>
+        </p:nvGrpSpPr>
+        <p:grpSpPr>
+          <a:xfrm>
+            <a:off x="2214546" y="2143116"/>
+            <a:ext cx="1447900" cy="1440902"/>
+            <a:chOff x="571472" y="2000240"/>
+            <a:chExt cx="1447900" cy="1440902"/>
+          </a:xfrm>
+        </p:grpSpPr>
+        <p:grpSp>
+          <p:nvGrpSpPr>
+            <p:cNvPr id="39" name="Group 7"/>
+            <p:cNvGrpSpPr/>
+            <p:nvPr/>
+          </p:nvGrpSpPr>
+          <p:grpSpPr>
+            <a:xfrm>
+              <a:off x="714348" y="2072472"/>
+              <a:ext cx="1285884" cy="1356528"/>
+              <a:chOff x="714348" y="2072472"/>
+              <a:chExt cx="1285884" cy="1356528"/>
+            </a:xfrm>
+          </p:grpSpPr>
+          <p:cxnSp>
+            <p:nvCxnSpPr>
+              <p:cNvPr id="43" name="Straight Arrow Connector 2"/>
+              <p:cNvCxnSpPr/>
+              <p:nvPr/>
+            </p:nvCxnSpPr>
+            <p:spPr>
+              <a:xfrm rot="5400000" flipH="1" flipV="1">
+                <a:off x="607191" y="2536025"/>
+                <a:ext cx="928694" cy="1588"/>
+              </a:xfrm>
+              <a:prstGeom prst="straightConnector1">
+                <a:avLst/>
+              </a:prstGeom>
+              <a:ln>
+                <a:tailEnd type="arrow"/>
+              </a:ln>
+            </p:spPr>
+            <p:style>
+              <a:lnRef idx="1">
+                <a:schemeClr val="accent1"/>
+              </a:lnRef>
+              <a:fillRef idx="0">
+                <a:schemeClr val="accent1"/>
+              </a:fillRef>
+              <a:effectRef idx="0">
+                <a:schemeClr val="accent1"/>
+              </a:effectRef>
+              <a:fontRef idx="minor">
+                <a:schemeClr val="tx1"/>
+              </a:fontRef>
+            </p:style>
+          </p:cxnSp>
+          <p:cxnSp>
+            <p:nvCxnSpPr>
+              <p:cNvPr id="44" name="Straight Arrow Connector 43"/>
+              <p:cNvCxnSpPr/>
+              <p:nvPr/>
+            </p:nvCxnSpPr>
+            <p:spPr>
+              <a:xfrm>
+                <a:off x="1071538" y="3000372"/>
+                <a:ext cx="928694" cy="1588"/>
+              </a:xfrm>
+              <a:prstGeom prst="straightConnector1">
+                <a:avLst/>
+              </a:prstGeom>
+              <a:ln>
+                <a:tailEnd type="arrow"/>
+              </a:ln>
+            </p:spPr>
+            <p:style>
+              <a:lnRef idx="1">
+                <a:schemeClr val="accent1"/>
+              </a:lnRef>
+              <a:fillRef idx="0">
+                <a:schemeClr val="accent1"/>
+              </a:fillRef>
+              <a:effectRef idx="0">
+                <a:schemeClr val="accent1"/>
+              </a:effectRef>
+              <a:fontRef idx="minor">
+                <a:schemeClr val="tx1"/>
+              </a:fontRef>
+            </p:style>
+          </p:cxnSp>
+          <p:cxnSp>
+            <p:nvCxnSpPr>
+              <p:cNvPr id="45" name="Straight Arrow Connector 44"/>
+              <p:cNvCxnSpPr/>
+              <p:nvPr/>
+            </p:nvCxnSpPr>
+            <p:spPr>
+              <a:xfrm rot="5400000">
+                <a:off x="678629" y="3036091"/>
+                <a:ext cx="428628" cy="357190"/>
+              </a:xfrm>
+              <a:prstGeom prst="straightConnector1">
+                <a:avLst/>
+              </a:prstGeom>
+              <a:ln>
+                <a:tailEnd type="arrow"/>
+              </a:ln>
+            </p:spPr>
+            <p:style>
+              <a:lnRef idx="1">
+                <a:schemeClr val="accent1"/>
+              </a:lnRef>
+              <a:fillRef idx="0">
+                <a:schemeClr val="accent1"/>
+              </a:fillRef>
+              <a:effectRef idx="0">
+                <a:schemeClr val="accent1"/>
+              </a:effectRef>
+              <a:fontRef idx="minor">
+                <a:schemeClr val="tx1"/>
+              </a:fontRef>
+            </p:style>
+          </p:cxnSp>
+        </p:grpSp>
+        <p:sp>
+          <p:nvSpPr>
+            <p:cNvPr id="40" name="TextBox 39"/>
+            <p:cNvSpPr txBox="1"/>
+            <p:nvPr/>
+          </p:nvSpPr>
+          <p:spPr>
+            <a:xfrm>
+              <a:off x="1714480" y="2643182"/>
+              <a:ext cx="304892" cy="369332"/>
+            </a:xfrm>
+            <a:prstGeom prst="rect">
+              <a:avLst/>
+            </a:prstGeom>
+            <a:noFill/>
+          </p:spPr>
+          <p:txBody>
+            <a:bodyPr wrap="none" rtlCol="0">
+              <a:spAutoFit/>
+            </a:bodyPr>
+            <a:lstStyle/>
+            <a:p>
+              <a:r>
+                <a:rPr lang="es-ES" dirty="0" smtClean="0"/>
+                <a:t>X</a:t>
+              </a:r>
+            </a:p>
+          </p:txBody>
+        </p:sp>
+        <p:sp>
+          <p:nvSpPr>
+            <p:cNvPr id="41" name="TextBox 40"/>
+            <p:cNvSpPr txBox="1"/>
+            <p:nvPr/>
+          </p:nvSpPr>
+          <p:spPr>
+            <a:xfrm>
+              <a:off x="571472" y="3071810"/>
+              <a:ext cx="292068" cy="369332"/>
+            </a:xfrm>
+            <a:prstGeom prst="rect">
+              <a:avLst/>
+            </a:prstGeom>
+            <a:noFill/>
+          </p:spPr>
+          <p:txBody>
+            <a:bodyPr wrap="none" rtlCol="0">
+              <a:spAutoFit/>
+            </a:bodyPr>
+            <a:lstStyle/>
+            <a:p>
+              <a:r>
+                <a:rPr lang="es-ES" dirty="0" smtClean="0"/>
+                <a:t>Z</a:t>
+              </a:r>
+            </a:p>
+          </p:txBody>
+        </p:sp>
+        <p:sp>
+          <p:nvSpPr>
+            <p:cNvPr id="42" name="TextBox 41"/>
+            <p:cNvSpPr txBox="1"/>
+            <p:nvPr/>
+          </p:nvSpPr>
+          <p:spPr>
+            <a:xfrm>
+              <a:off x="1058156" y="2000240"/>
+              <a:ext cx="304892" cy="369332"/>
+            </a:xfrm>
+            <a:prstGeom prst="rect">
+              <a:avLst/>
+            </a:prstGeom>
+            <a:noFill/>
+          </p:spPr>
+          <p:txBody>
+            <a:bodyPr wrap="none" rtlCol="0">
+              <a:spAutoFit/>
+            </a:bodyPr>
+            <a:lstStyle/>
+            <a:p>
+              <a:r>
+                <a:rPr lang="es-ES" dirty="0" smtClean="0"/>
+                <a:t>Y</a:t>
+              </a:r>
+            </a:p>
+          </p:txBody>
+        </p:sp>
+      </p:grpSp>
+      <p:cxnSp>
+        <p:nvCxnSpPr>
+          <p:cNvPr id="47" name="Straight Connector 46"/>
+          <p:cNvCxnSpPr/>
+          <p:nvPr/>
+        </p:nvCxnSpPr>
+        <p:spPr>
+          <a:xfrm>
+            <a:off x="571472" y="2571744"/>
+            <a:ext cx="71438" cy="0"/>
+          </a:xfrm>
+          <a:prstGeom prst="line">
+            <a:avLst/>
+          </a:prstGeom>
+        </p:spPr>
+        <p:style>
+          <a:lnRef idx="1">
+            <a:schemeClr val="dk1"/>
+          </a:lnRef>
+          <a:fillRef idx="0">
+            <a:schemeClr val="dk1"/>
+          </a:fillRef>
+          <a:effectRef idx="0">
+            <a:schemeClr val="dk1"/>
+          </a:effectRef>
+          <a:fontRef idx="minor">
+            <a:schemeClr val="tx1"/>
+          </a:fontRef>
+        </p:style>
+      </p:cxnSp>
+      <p:cxnSp>
+        <p:nvCxnSpPr>
+          <p:cNvPr id="49" name="Straight Connector 48"/>
+          <p:cNvCxnSpPr/>
+          <p:nvPr/>
+        </p:nvCxnSpPr>
+        <p:spPr>
+          <a:xfrm rot="5400000">
+            <a:off x="981050" y="2676520"/>
+            <a:ext cx="71438" cy="71438"/>
+          </a:xfrm>
+          <a:prstGeom prst="line">
+            <a:avLst/>
+          </a:prstGeom>
+        </p:spPr>
+        <p:style>
+          <a:lnRef idx="1">
+            <a:schemeClr val="dk1"/>
+          </a:lnRef>
+          <a:fillRef idx="0">
+            <a:schemeClr val="dk1"/>
+          </a:fillRef>
+          <a:effectRef idx="0">
+            <a:schemeClr val="dk1"/>
+          </a:effectRef>
+          <a:fontRef idx="minor">
+            <a:schemeClr val="tx1"/>
+          </a:fontRef>
+        </p:style>
+      </p:cxnSp>
+      <p:sp>
+        <p:nvSpPr>
+          <p:cNvPr id="51" name="TextBox 50"/>
+          <p:cNvSpPr txBox="1"/>
+          <p:nvPr/>
+        </p:nvSpPr>
+        <p:spPr>
+          <a:xfrm>
+            <a:off x="357158" y="2428868"/>
+            <a:ext cx="250390" cy="246221"/>
+          </a:xfrm>
+          <a:prstGeom prst="rect">
+            <a:avLst/>
+          </a:prstGeom>
+          <a:noFill/>
+        </p:spPr>
+        <p:txBody>
+          <a:bodyPr wrap="none" rtlCol="0">
+            <a:spAutoFit/>
+          </a:bodyPr>
+          <a:lstStyle/>
+          <a:p>
+            <a:r>
+              <a:rPr lang="es-ES" sz="1000" dirty="0" smtClean="0"/>
+              <a:t>1</a:t>
+            </a:r>
+            <a:endParaRPr lang="en-US" sz="1000" dirty="0"/>
+          </a:p>
+        </p:txBody>
+      </p:sp>
+      <p:grpSp>
+        <p:nvGrpSpPr>
+          <p:cNvPr id="30" name="Group 29"/>
+          <p:cNvGrpSpPr/>
+          <p:nvPr/>
+        </p:nvGrpSpPr>
+        <p:grpSpPr>
+          <a:xfrm>
+            <a:off x="428596" y="2214554"/>
+            <a:ext cx="1091504" cy="1583778"/>
+            <a:chOff x="6072198" y="1285860"/>
+            <a:chExt cx="1091504" cy="1583778"/>
+          </a:xfrm>
+        </p:grpSpPr>
+        <p:grpSp>
+          <p:nvGrpSpPr>
+            <p:cNvPr id="31" name="Group 23"/>
+            <p:cNvGrpSpPr/>
+            <p:nvPr/>
+          </p:nvGrpSpPr>
+          <p:grpSpPr>
+            <a:xfrm>
+              <a:off x="6072198" y="1357298"/>
+              <a:ext cx="929488" cy="1357322"/>
+              <a:chOff x="4499768" y="3000372"/>
+              <a:chExt cx="929488" cy="1357322"/>
+            </a:xfrm>
+          </p:grpSpPr>
+          <p:cxnSp>
+            <p:nvCxnSpPr>
+              <p:cNvPr id="35" name="Straight Arrow Connector 34"/>
+              <p:cNvCxnSpPr/>
+              <p:nvPr/>
+            </p:nvCxnSpPr>
+            <p:spPr>
+              <a:xfrm rot="16200000" flipH="1">
+                <a:off x="4035671" y="3892009"/>
+                <a:ext cx="929782" cy="1588"/>
+              </a:xfrm>
+              <a:prstGeom prst="straightConnector1">
+                <a:avLst/>
+              </a:prstGeom>
+              <a:ln>
+                <a:solidFill>
+                  <a:schemeClr val="accent3"/>
+                </a:solidFill>
+                <a:tailEnd type="arrow"/>
+              </a:ln>
+            </p:spPr>
+            <p:style>
+              <a:lnRef idx="1">
+                <a:schemeClr val="accent1"/>
+              </a:lnRef>
+              <a:fillRef idx="0">
+                <a:schemeClr val="accent1"/>
+              </a:fillRef>
+              <a:effectRef idx="0">
+                <a:schemeClr val="accent1"/>
+              </a:effectRef>
+              <a:fontRef idx="minor">
+                <a:schemeClr val="tx1"/>
+              </a:fontRef>
+            </p:style>
+          </p:cxnSp>
+          <p:cxnSp>
+            <p:nvCxnSpPr>
+              <p:cNvPr id="36" name="Straight Arrow Connector 35"/>
+              <p:cNvCxnSpPr/>
+              <p:nvPr/>
+            </p:nvCxnSpPr>
+            <p:spPr>
+              <a:xfrm flipV="1">
+                <a:off x="4500562" y="3427118"/>
+                <a:ext cx="928694" cy="1590"/>
+              </a:xfrm>
+              <a:prstGeom prst="straightConnector1">
+                <a:avLst/>
+              </a:prstGeom>
+              <a:ln>
+                <a:solidFill>
+                  <a:schemeClr val="accent3"/>
+                </a:solidFill>
+                <a:tailEnd type="arrow"/>
+              </a:ln>
+            </p:spPr>
+            <p:style>
+              <a:lnRef idx="1">
+                <a:schemeClr val="accent1"/>
+              </a:lnRef>
+              <a:fillRef idx="0">
+                <a:schemeClr val="accent1"/>
+              </a:fillRef>
+              <a:effectRef idx="0">
+                <a:schemeClr val="accent1"/>
+              </a:effectRef>
+              <a:fontRef idx="minor">
+                <a:schemeClr val="tx1"/>
+              </a:fontRef>
+            </p:style>
+          </p:cxnSp>
+          <p:cxnSp>
+            <p:nvCxnSpPr>
+              <p:cNvPr id="37" name="Straight Arrow Connector 36"/>
+              <p:cNvCxnSpPr/>
+              <p:nvPr/>
+            </p:nvCxnSpPr>
+            <p:spPr>
+              <a:xfrm flipV="1">
+                <a:off x="4500562" y="3000372"/>
+                <a:ext cx="500066" cy="428336"/>
+              </a:xfrm>
+              <a:prstGeom prst="straightConnector1">
+                <a:avLst/>
+              </a:prstGeom>
+              <a:ln>
+                <a:solidFill>
+                  <a:schemeClr val="accent3"/>
+                </a:solidFill>
+                <a:tailEnd type="arrow"/>
+              </a:ln>
+            </p:spPr>
+            <p:style>
+              <a:lnRef idx="1">
+                <a:schemeClr val="accent1"/>
+              </a:lnRef>
+              <a:fillRef idx="0">
+                <a:schemeClr val="accent1"/>
+              </a:fillRef>
+              <a:effectRef idx="0">
+                <a:schemeClr val="accent1"/>
+              </a:effectRef>
+              <a:fontRef idx="minor">
+                <a:schemeClr val="tx1"/>
+              </a:fontRef>
+            </p:style>
+          </p:cxnSp>
+        </p:grpSp>
+        <p:sp>
+          <p:nvSpPr>
+            <p:cNvPr id="32" name="TextBox 31"/>
+            <p:cNvSpPr txBox="1"/>
+            <p:nvPr/>
+          </p:nvSpPr>
+          <p:spPr>
+            <a:xfrm>
+              <a:off x="6858810" y="1714488"/>
+              <a:ext cx="304892" cy="369332"/>
+            </a:xfrm>
+            <a:prstGeom prst="rect">
+              <a:avLst/>
+            </a:prstGeom>
+            <a:noFill/>
+          </p:spPr>
+          <p:txBody>
+            <a:bodyPr wrap="none" rtlCol="0">
+              <a:spAutoFit/>
+            </a:bodyPr>
+            <a:lstStyle/>
+            <a:p>
+              <a:r>
+                <a:rPr lang="es-ES" dirty="0" smtClean="0"/>
+                <a:t>X</a:t>
+              </a:r>
+            </a:p>
+          </p:txBody>
+        </p:sp>
+        <p:sp>
+          <p:nvSpPr>
+            <p:cNvPr id="33" name="TextBox 32"/>
+            <p:cNvSpPr txBox="1"/>
+            <p:nvPr/>
+          </p:nvSpPr>
+          <p:spPr>
+            <a:xfrm>
+              <a:off x="6072992" y="2500306"/>
+              <a:ext cx="292068" cy="369332"/>
+            </a:xfrm>
+            <a:prstGeom prst="rect">
+              <a:avLst/>
+            </a:prstGeom>
+            <a:noFill/>
+          </p:spPr>
+          <p:txBody>
+            <a:bodyPr wrap="none" rtlCol="0">
+              <a:spAutoFit/>
+            </a:bodyPr>
+            <a:lstStyle/>
+            <a:p>
+              <a:r>
+                <a:rPr lang="es-ES" dirty="0" smtClean="0"/>
+                <a:t>Z</a:t>
+              </a:r>
+            </a:p>
+          </p:txBody>
+        </p:sp>
+        <p:sp>
+          <p:nvSpPr>
+            <p:cNvPr id="34" name="TextBox 33"/>
+            <p:cNvSpPr txBox="1"/>
+            <p:nvPr/>
+          </p:nvSpPr>
+          <p:spPr>
+            <a:xfrm>
+              <a:off x="6573058" y="1285860"/>
+              <a:ext cx="304892" cy="369332"/>
+            </a:xfrm>
+            <a:prstGeom prst="rect">
+              <a:avLst/>
+            </a:prstGeom>
+            <a:noFill/>
+          </p:spPr>
+          <p:txBody>
+            <a:bodyPr wrap="none" rtlCol="0">
+              <a:spAutoFit/>
+            </a:bodyPr>
+            <a:lstStyle/>
+            <a:p>
+              <a:r>
+                <a:rPr lang="es-ES" dirty="0" smtClean="0"/>
+                <a:t>Y</a:t>
+              </a:r>
+            </a:p>
+          </p:txBody>
+        </p:sp>
+      </p:grpSp>
+      <p:sp>
+        <p:nvSpPr>
+          <p:cNvPr id="52" name="TextBox 51"/>
+          <p:cNvSpPr txBox="1"/>
+          <p:nvPr/>
+        </p:nvSpPr>
+        <p:spPr>
+          <a:xfrm>
+            <a:off x="817536" y="2676520"/>
+            <a:ext cx="250390" cy="246221"/>
+          </a:xfrm>
+          <a:prstGeom prst="rect">
+            <a:avLst/>
+          </a:prstGeom>
+          <a:noFill/>
+        </p:spPr>
+        <p:txBody>
+          <a:bodyPr wrap="none" rtlCol="0">
+            <a:spAutoFit/>
+          </a:bodyPr>
+          <a:lstStyle/>
+          <a:p>
+            <a:r>
+              <a:rPr lang="es-ES" sz="1000" dirty="0" smtClean="0"/>
+              <a:t>2</a:t>
+            </a:r>
+            <a:endParaRPr lang="en-US" sz="1000" dirty="0"/>
+          </a:p>
+        </p:txBody>
+      </p:sp>
+      <p:cxnSp>
+        <p:nvCxnSpPr>
+          <p:cNvPr id="54" name="Straight Connector 53"/>
+          <p:cNvCxnSpPr/>
+          <p:nvPr/>
+        </p:nvCxnSpPr>
+        <p:spPr>
+          <a:xfrm rot="5400000" flipH="1" flipV="1">
+            <a:off x="2678893" y="2821777"/>
+            <a:ext cx="357190" cy="285752"/>
+          </a:xfrm>
+          <a:prstGeom prst="line">
+            <a:avLst/>
+          </a:prstGeom>
+          <a:ln>
+            <a:solidFill>
+              <a:schemeClr val="tx1"/>
+            </a:solidFill>
+            <a:prstDash val="sysDash"/>
+          </a:ln>
+        </p:spPr>
+        <p:style>
+          <a:lnRef idx="1">
+            <a:schemeClr val="accent1"/>
+          </a:lnRef>
+          <a:fillRef idx="0">
+            <a:schemeClr val="accent1"/>
+          </a:fillRef>
+          <a:effectRef idx="0">
+            <a:schemeClr val="accent1"/>
+          </a:effectRef>
+          <a:fontRef idx="minor">
+            <a:schemeClr val="tx1"/>
+          </a:fontRef>
+        </p:style>
+      </p:cxnSp>
+      <p:cxnSp>
+        <p:nvCxnSpPr>
+          <p:cNvPr id="55" name="Straight Connector 54"/>
+          <p:cNvCxnSpPr/>
+          <p:nvPr/>
+        </p:nvCxnSpPr>
+        <p:spPr>
+          <a:xfrm rot="5400000">
+            <a:off x="3214678" y="3109910"/>
+            <a:ext cx="71438" cy="71438"/>
+          </a:xfrm>
+          <a:prstGeom prst="line">
+            <a:avLst/>
+          </a:prstGeom>
+        </p:spPr>
+        <p:style>
+          <a:lnRef idx="1">
+            <a:schemeClr val="dk1"/>
+          </a:lnRef>
+          <a:fillRef idx="0">
+            <a:schemeClr val="dk1"/>
+          </a:fillRef>
+          <a:effectRef idx="0">
+            <a:schemeClr val="dk1"/>
+          </a:effectRef>
+          <a:fontRef idx="minor">
+            <a:schemeClr val="tx1"/>
+          </a:fontRef>
+        </p:style>
+      </p:cxnSp>
+      <p:cxnSp>
+        <p:nvCxnSpPr>
+          <p:cNvPr id="57" name="Straight Connector 56"/>
+          <p:cNvCxnSpPr/>
+          <p:nvPr/>
+        </p:nvCxnSpPr>
+        <p:spPr>
+          <a:xfrm>
+            <a:off x="2813038" y="2967034"/>
+            <a:ext cx="71438" cy="0"/>
+          </a:xfrm>
+          <a:prstGeom prst="line">
+            <a:avLst/>
+          </a:prstGeom>
+        </p:spPr>
+        <p:style>
+          <a:lnRef idx="1">
+            <a:schemeClr val="dk1"/>
+          </a:lnRef>
+          <a:fillRef idx="0">
+            <a:schemeClr val="dk1"/>
+          </a:fillRef>
+          <a:effectRef idx="0">
+            <a:schemeClr val="dk1"/>
+          </a:effectRef>
+          <a:fontRef idx="minor">
+            <a:schemeClr val="tx1"/>
+          </a:fontRef>
+        </p:style>
+      </p:cxnSp>
+      <p:sp>
+        <p:nvSpPr>
+          <p:cNvPr id="60" name="TextBox 59"/>
+          <p:cNvSpPr txBox="1"/>
+          <p:nvPr/>
+        </p:nvSpPr>
+        <p:spPr>
+          <a:xfrm>
+            <a:off x="3038464" y="3111341"/>
+            <a:ext cx="250390" cy="246221"/>
+          </a:xfrm>
+          <a:prstGeom prst="rect">
+            <a:avLst/>
+          </a:prstGeom>
+          <a:noFill/>
+        </p:spPr>
+        <p:txBody>
+          <a:bodyPr wrap="none" rtlCol="0">
+            <a:spAutoFit/>
+          </a:bodyPr>
+          <a:lstStyle/>
+          <a:p>
+            <a:r>
+              <a:rPr lang="es-ES" sz="1000" dirty="0" smtClean="0"/>
+              <a:t>2</a:t>
+            </a:r>
+            <a:endParaRPr lang="en-US" sz="1000" dirty="0"/>
+          </a:p>
+        </p:txBody>
+      </p:sp>
+      <p:sp>
+        <p:nvSpPr>
+          <p:cNvPr id="61" name="TextBox 60"/>
+          <p:cNvSpPr txBox="1"/>
+          <p:nvPr/>
+        </p:nvSpPr>
+        <p:spPr>
+          <a:xfrm>
+            <a:off x="2643174" y="2747958"/>
+            <a:ext cx="288862" cy="246221"/>
+          </a:xfrm>
+          <a:prstGeom prst="rect">
+            <a:avLst/>
+          </a:prstGeom>
+          <a:noFill/>
+        </p:spPr>
+        <p:txBody>
+          <a:bodyPr wrap="none" rtlCol="0">
+            <a:spAutoFit/>
+          </a:bodyPr>
+          <a:lstStyle/>
+          <a:p>
+            <a:r>
+              <a:rPr lang="es-ES" sz="1000" dirty="0" smtClean="0"/>
+              <a:t>-1</a:t>
+            </a:r>
+            <a:endParaRPr lang="en-US" sz="1000" dirty="0"/>
+          </a:p>
+        </p:txBody>
+      </p:sp>
+      <p:cxnSp>
+        <p:nvCxnSpPr>
+          <p:cNvPr id="63" name="Straight Arrow Connector 62"/>
+          <p:cNvCxnSpPr>
+            <a:endCxn id="34" idx="2"/>
+          </p:cNvCxnSpPr>
+          <p:nvPr/>
+        </p:nvCxnSpPr>
+        <p:spPr>
+          <a:xfrm flipV="1">
+            <a:off x="428596" y="2583886"/>
+            <a:ext cx="653306" cy="130734"/>
+          </a:xfrm>
+          <a:prstGeom prst="straightConnector1">
+            <a:avLst/>
+          </a:prstGeom>
+          <a:ln>
+            <a:solidFill>
+              <a:srgbClr val="FF0000"/>
+            </a:solidFill>
+            <a:headEnd type="none"/>
+            <a:tailEnd type="triangle"/>
+          </a:ln>
+        </p:spPr>
+        <p:style>
+          <a:lnRef idx="1">
+            <a:schemeClr val="accent1"/>
+          </a:lnRef>
+          <a:fillRef idx="0">
+            <a:schemeClr val="accent1"/>
+          </a:fillRef>
+          <a:effectRef idx="0">
+            <a:schemeClr val="accent1"/>
+          </a:effectRef>
+          <a:fontRef idx="minor">
+            <a:schemeClr val="tx1"/>
+          </a:fontRef>
+        </p:style>
+      </p:cxnSp>
+      <p:cxnSp>
+        <p:nvCxnSpPr>
+          <p:cNvPr id="64" name="Straight Arrow Connector 63"/>
+          <p:cNvCxnSpPr/>
+          <p:nvPr/>
+        </p:nvCxnSpPr>
+        <p:spPr>
+          <a:xfrm flipV="1">
+            <a:off x="2714612" y="3000372"/>
+            <a:ext cx="653306" cy="130734"/>
+          </a:xfrm>
+          <a:prstGeom prst="straightConnector1">
+            <a:avLst/>
+          </a:prstGeom>
+          <a:ln>
+            <a:solidFill>
+              <a:srgbClr val="FF0000"/>
+            </a:solidFill>
+            <a:headEnd type="none"/>
+            <a:tailEnd type="triangle"/>
+          </a:ln>
+        </p:spPr>
+        <p:style>
+          <a:lnRef idx="1">
+            <a:schemeClr val="accent1"/>
+          </a:lnRef>
+          <a:fillRef idx="0">
+            <a:schemeClr val="accent1"/>
+          </a:fillRef>
+          <a:effectRef idx="0">
+            <a:schemeClr val="accent1"/>
+          </a:effectRef>
+          <a:fontRef idx="minor">
+            <a:schemeClr val="tx1"/>
+          </a:fontRef>
+        </p:style>
+      </p:cxnSp>
+      <p:sp>
+        <p:nvSpPr>
+          <p:cNvPr id="65" name="TextBox 64"/>
+          <p:cNvSpPr txBox="1"/>
+          <p:nvPr/>
+        </p:nvSpPr>
+        <p:spPr>
+          <a:xfrm>
+            <a:off x="642910" y="2357430"/>
+            <a:ext cx="346570" cy="369332"/>
+          </a:xfrm>
+          <a:prstGeom prst="rect">
+            <a:avLst/>
+          </a:prstGeom>
+          <a:noFill/>
+        </p:spPr>
+        <p:txBody>
+          <a:bodyPr wrap="none" rtlCol="0">
+            <a:spAutoFit/>
+          </a:bodyPr>
+          <a:lstStyle/>
+          <a:p>
+            <a:r>
+              <a:rPr lang="es-ES" dirty="0" smtClean="0">
+                <a:solidFill>
+                  <a:srgbClr val="FF0000"/>
+                </a:solidFill>
+              </a:rPr>
+              <a:t>v</a:t>
+            </a:r>
+            <a:r>
+              <a:rPr lang="es-ES" sz="900" dirty="0" smtClean="0">
+                <a:solidFill>
+                  <a:srgbClr val="FF0000"/>
+                </a:solidFill>
+              </a:rPr>
+              <a:t>0</a:t>
+            </a:r>
+            <a:endParaRPr lang="en-US" sz="900" dirty="0">
+              <a:solidFill>
+                <a:srgbClr val="FF0000"/>
+              </a:solidFill>
+            </a:endParaRPr>
+          </a:p>
+        </p:txBody>
+      </p:sp>
+      <p:sp>
+        <p:nvSpPr>
+          <p:cNvPr id="66" name="TextBox 65"/>
+          <p:cNvSpPr txBox="1"/>
+          <p:nvPr/>
+        </p:nvSpPr>
+        <p:spPr>
+          <a:xfrm>
+            <a:off x="2928926" y="2714620"/>
+            <a:ext cx="346570" cy="369332"/>
+          </a:xfrm>
+          <a:prstGeom prst="rect">
+            <a:avLst/>
+          </a:prstGeom>
+          <a:noFill/>
+        </p:spPr>
+        <p:txBody>
+          <a:bodyPr wrap="none" rtlCol="0">
+            <a:spAutoFit/>
+          </a:bodyPr>
+          <a:lstStyle/>
+          <a:p>
+            <a:r>
+              <a:rPr lang="es-ES" dirty="0" smtClean="0">
+                <a:solidFill>
+                  <a:srgbClr val="FF0000"/>
+                </a:solidFill>
+              </a:rPr>
+              <a:t>v</a:t>
+            </a:r>
+            <a:r>
+              <a:rPr lang="es-ES" sz="900" dirty="0" smtClean="0">
+                <a:solidFill>
+                  <a:srgbClr val="FF0000"/>
+                </a:solidFill>
+              </a:rPr>
+              <a:t>1</a:t>
+            </a:r>
+            <a:endParaRPr lang="en-US" sz="900" dirty="0">
+              <a:solidFill>
+                <a:srgbClr val="FF0000"/>
+              </a:solidFill>
+            </a:endParaRPr>
+          </a:p>
+        </p:txBody>
+      </p:sp>
+    </p:spTree>
+  </p:cSld>
+  <p:clrMapOvr>
+    <a:masterClrMapping/>
+  </p:clrMapOvr>
+</p:sld>
+</file>
+
 <file path=ppt/theme/theme1.xml><?xml version="1.0" encoding="utf-8"?>
 <a:theme xmlns:a="http://schemas.openxmlformats.org/drawingml/2006/main" name="Office Theme">
   <a:themeElements>

</xml_diff>